<commit_message>
Fixed Disk space issue + Numbers formatting
Fixed Disk space issue + Numbers formatting
</commit_message>
<xml_diff>
--- a/Solutions/ppt/Vantage Health Check Trends v1.0.pptx
+++ b/Solutions/ppt/Vantage Health Check Trends v1.0.pptx
@@ -192,14 +192,6 @@
     </p:ext>
   </p:extLst>
 </p:presentation>
-</file>
-
-<file path=ppt/revisionInfo.xml><?xml version="1.0" encoding="utf-8"?>
-<p1510:revInfo xmlns:a="http://schemas.openxmlformats.org/drawingml/2006/main" xmlns:r="http://schemas.openxmlformats.org/officeDocument/2006/relationships" xmlns:p1510="http://schemas.microsoft.com/office/powerpoint/2015/10/main">
-  <p1510:revLst>
-    <p1510:client id="{C63D52CF-18E6-48F3-8229-1D00FF5E9F7F}" v="47" dt="2024-06-27T09:44:40.372"/>
-  </p1510:revLst>
-</p1510:revInfo>
 </file>
 
 <file path=ppt/changesInfos/changesInfo1.xml><?xml version="1.0" encoding="utf-8"?>
@@ -1027,6 +1019,75 @@
       </pc:sldMasterChg>
     </pc:docChg>
   </pc:docChgLst>
+  <pc:docChgLst>
+    <pc:chgData name="Munir, Hassan" userId="72b44764-6718-4eb5-979c-fc4e67a1d4a7" providerId="ADAL" clId="{70D282DB-D3CD-4B48-AB57-217D54FE7229}"/>
+    <pc:docChg chg="undo custSel modSld">
+      <pc:chgData name="Munir, Hassan" userId="72b44764-6718-4eb5-979c-fc4e67a1d4a7" providerId="ADAL" clId="{70D282DB-D3CD-4B48-AB57-217D54FE7229}" dt="2024-10-03T11:38:37.039" v="15" actId="203"/>
+      <pc:docMkLst>
+        <pc:docMk/>
+      </pc:docMkLst>
+      <pc:sldChg chg="modSp mod">
+        <pc:chgData name="Munir, Hassan" userId="72b44764-6718-4eb5-979c-fc4e67a1d4a7" providerId="ADAL" clId="{70D282DB-D3CD-4B48-AB57-217D54FE7229}" dt="2024-10-03T11:37:00.560" v="7" actId="203"/>
+        <pc:sldMkLst>
+          <pc:docMk/>
+          <pc:sldMk cId="840630454" sldId="2142532959"/>
+        </pc:sldMkLst>
+        <pc:graphicFrameChg chg="modGraphic">
+          <ac:chgData name="Munir, Hassan" userId="72b44764-6718-4eb5-979c-fc4e67a1d4a7" providerId="ADAL" clId="{70D282DB-D3CD-4B48-AB57-217D54FE7229}" dt="2024-10-03T11:37:00.560" v="7" actId="203"/>
+          <ac:graphicFrameMkLst>
+            <pc:docMk/>
+            <pc:sldMk cId="840630454" sldId="2142532959"/>
+            <ac:graphicFrameMk id="11" creationId="{513391DA-ECD0-9947-A231-3700ADE07DC6}"/>
+          </ac:graphicFrameMkLst>
+        </pc:graphicFrameChg>
+      </pc:sldChg>
+      <pc:sldChg chg="modSp mod">
+        <pc:chgData name="Munir, Hassan" userId="72b44764-6718-4eb5-979c-fc4e67a1d4a7" providerId="ADAL" clId="{70D282DB-D3CD-4B48-AB57-217D54FE7229}" dt="2024-10-03T11:37:36.973" v="9" actId="203"/>
+        <pc:sldMkLst>
+          <pc:docMk/>
+          <pc:sldMk cId="4119546744" sldId="2142532960"/>
+        </pc:sldMkLst>
+        <pc:graphicFrameChg chg="modGraphic">
+          <ac:chgData name="Munir, Hassan" userId="72b44764-6718-4eb5-979c-fc4e67a1d4a7" providerId="ADAL" clId="{70D282DB-D3CD-4B48-AB57-217D54FE7229}" dt="2024-10-03T11:37:36.973" v="9" actId="203"/>
+          <ac:graphicFrameMkLst>
+            <pc:docMk/>
+            <pc:sldMk cId="4119546744" sldId="2142532960"/>
+            <ac:graphicFrameMk id="11" creationId="{513391DA-ECD0-9947-A231-3700ADE07DC6}"/>
+          </ac:graphicFrameMkLst>
+        </pc:graphicFrameChg>
+      </pc:sldChg>
+      <pc:sldChg chg="modSp mod">
+        <pc:chgData name="Munir, Hassan" userId="72b44764-6718-4eb5-979c-fc4e67a1d4a7" providerId="ADAL" clId="{70D282DB-D3CD-4B48-AB57-217D54FE7229}" dt="2024-10-03T11:38:24.418" v="13" actId="203"/>
+        <pc:sldMkLst>
+          <pc:docMk/>
+          <pc:sldMk cId="1784479315" sldId="2142532961"/>
+        </pc:sldMkLst>
+        <pc:graphicFrameChg chg="modGraphic">
+          <ac:chgData name="Munir, Hassan" userId="72b44764-6718-4eb5-979c-fc4e67a1d4a7" providerId="ADAL" clId="{70D282DB-D3CD-4B48-AB57-217D54FE7229}" dt="2024-10-03T11:38:24.418" v="13" actId="203"/>
+          <ac:graphicFrameMkLst>
+            <pc:docMk/>
+            <pc:sldMk cId="1784479315" sldId="2142532961"/>
+            <ac:graphicFrameMk id="11" creationId="{513391DA-ECD0-9947-A231-3700ADE07DC6}"/>
+          </ac:graphicFrameMkLst>
+        </pc:graphicFrameChg>
+      </pc:sldChg>
+      <pc:sldChg chg="modSp mod">
+        <pc:chgData name="Munir, Hassan" userId="72b44764-6718-4eb5-979c-fc4e67a1d4a7" providerId="ADAL" clId="{70D282DB-D3CD-4B48-AB57-217D54FE7229}" dt="2024-10-03T11:38:37.039" v="15" actId="203"/>
+        <pc:sldMkLst>
+          <pc:docMk/>
+          <pc:sldMk cId="2243563852" sldId="2142532962"/>
+        </pc:sldMkLst>
+        <pc:graphicFrameChg chg="modGraphic">
+          <ac:chgData name="Munir, Hassan" userId="72b44764-6718-4eb5-979c-fc4e67a1d4a7" providerId="ADAL" clId="{70D282DB-D3CD-4B48-AB57-217D54FE7229}" dt="2024-10-03T11:38:37.039" v="15" actId="203"/>
+          <ac:graphicFrameMkLst>
+            <pc:docMk/>
+            <pc:sldMk cId="2243563852" sldId="2142532962"/>
+            <ac:graphicFrameMk id="11" creationId="{513391DA-ECD0-9947-A231-3700ADE07DC6}"/>
+          </ac:graphicFrameMkLst>
+        </pc:graphicFrameChg>
+      </pc:sldChg>
+    </pc:docChg>
+  </pc:docChgLst>
 </pc:chgInfo>
 </file>
 
@@ -1124,7 +1185,7 @@
           <a:p>
             <a:fld id="{91CB54DF-B86B-46FB-8D6A-C2382CF829E1}" type="datetimeFigureOut">
               <a:rPr lang="en-US" smtClean="0"/>
-              <a:t>7/29/2024</a:t>
+              <a:t>10/3/2024</a:t>
             </a:fld>
             <a:endParaRPr lang="en-US" dirty="0"/>
           </a:p>
@@ -1301,7 +1362,7 @@
           <a:p>
             <a:fld id="{A0D39379-ACCC-A94F-B10E-ED7DE222C28C}" type="datetimeFigureOut">
               <a:rPr lang="en-US"/>
-              <a:t>7/29/2024</a:t>
+              <a:t>10/3/2024</a:t>
             </a:fld>
             <a:endParaRPr lang="en-US" dirty="0"/>
           </a:p>
@@ -26391,14 +26452,14 @@
           <p:nvPr>
             <p:extLst>
               <p:ext uri="{D42A27DB-BD31-4B8C-83A1-F6EECF244321}">
-                <p14:modId xmlns:p14="http://schemas.microsoft.com/office/powerpoint/2010/main" val="3714523270"/>
+                <p14:modId xmlns:p14="http://schemas.microsoft.com/office/powerpoint/2010/main" val="3815466657"/>
               </p:ext>
             </p:extLst>
           </p:nvPr>
         </p:nvGraphicFramePr>
         <p:xfrm>
           <a:off x="587481" y="1059386"/>
-          <a:ext cx="10972800" cy="2705972"/>
+          <a:ext cx="10972800" cy="2843132"/>
         </p:xfrm>
         <a:graphic>
           <a:graphicData uri="http://schemas.openxmlformats.org/drawingml/2006/table">
@@ -27191,7 +27252,7 @@
                     <a:bodyPr/>
                     <a:lstStyle/>
                     <a:p>
-                      <a:pPr marL="0" algn="ctr" defTabSz="914400" rtl="0" eaLnBrk="1" fontAlgn="b" latinLnBrk="0" hangingPunct="1">
+                      <a:pPr marL="0" algn="r" defTabSz="914400" rtl="0" eaLnBrk="1" fontAlgn="b" latinLnBrk="0" hangingPunct="1">
                         <a:defRPr sz="900">
                           <a:solidFill>
                             <a:srgbClr val="6B767D"/>
@@ -27242,7 +27303,7 @@
                       </a:endParaRPr>
                     </a:p>
                   </a:txBody>
-                  <a:tcPr marL="90000" marR="182880" marT="8095" marB="0" anchor="ctr">
+                  <a:tcPr marL="90000" marR="365760" marT="8095" marB="0" anchor="ctr">
                     <a:lnL>
                       <a:noFill/>
                     </a:lnL>
@@ -27270,86 +27331,7 @@
                     <a:bodyPr/>
                     <a:lstStyle/>
                     <a:p>
-                      <a:pPr marL="0" algn="ctr" defTabSz="914400" rtl="0" eaLnBrk="1" fontAlgn="b" latinLnBrk="0" hangingPunct="1">
-                        <a:defRPr sz="900">
-                          <a:solidFill>
-                            <a:srgbClr val="6B767D"/>
-                          </a:solidFill>
-                          <a:latin typeface="+mn-lt"/>
-                        </a:defRPr>
-                      </a:pPr>
-                      <a:r>
-                        <a:rPr lang="en-GB" sz="900" b="0" kern="1200" dirty="0">
-                          <a:solidFill>
-                            <a:srgbClr val="6B767D"/>
-                          </a:solidFill>
-                          <a:latin typeface="+mn-lt"/>
-                          <a:ea typeface="+mn-ea"/>
-                          <a:cs typeface="+mn-cs"/>
-                        </a:rPr>
-                        <a:t>{{</a:t>
-                      </a:r>
-                      <a:r>
-                        <a:rPr lang="en-GB" sz="900" b="0" kern="1200" dirty="0" err="1">
-                          <a:solidFill>
-                            <a:srgbClr val="6B767D"/>
-                          </a:solidFill>
-                          <a:latin typeface="+mn-lt"/>
-                          <a:ea typeface="+mn-ea"/>
-                          <a:cs typeface="+mn-cs"/>
-                        </a:rPr>
-                        <a:t>col:vhc</a:t>
-                      </a:r>
-                      <a:r>
-                        <a:rPr lang="en-GB" sz="900" b="0" kern="1200" dirty="0">
-                          <a:solidFill>
-                            <a:srgbClr val="6B767D"/>
-                          </a:solidFill>
-                          <a:latin typeface="+mn-lt"/>
-                          <a:ea typeface="+mn-ea"/>
-                          <a:cs typeface="+mn-cs"/>
-                        </a:rPr>
-                        <a:t>--activity_counts_monthly_summary.csv[4]}}</a:t>
-                      </a:r>
-                      <a:endParaRPr sz="900" b="0" kern="1200" dirty="0">
-                        <a:solidFill>
-                          <a:srgbClr val="6B767D"/>
-                        </a:solidFill>
-                        <a:latin typeface="+mn-lt"/>
-                        <a:ea typeface="+mn-ea"/>
-                        <a:cs typeface="+mn-cs"/>
-                      </a:endParaRPr>
-                    </a:p>
-                  </a:txBody>
-                  <a:tcPr marL="90000" marR="182880" marT="8095" marB="0" anchor="ctr">
-                    <a:lnL>
-                      <a:noFill/>
-                    </a:lnL>
-                    <a:lnR>
-                      <a:noFill/>
-                    </a:lnR>
-                    <a:lnT w="12700" cmpd="sng">
-                      <a:noFill/>
-                    </a:lnT>
-                    <a:lnB w="12700" cmpd="sng">
-                      <a:noFill/>
-                    </a:lnB>
-                    <a:lnTlToBr w="12700" cmpd="sng">
-                      <a:noFill/>
-                      <a:prstDash val="solid"/>
-                    </a:lnTlToBr>
-                    <a:lnBlToTr w="12700" cmpd="sng">
-                      <a:noFill/>
-                      <a:prstDash val="solid"/>
-                    </a:lnBlToTr>
-                  </a:tcPr>
-                </a:tc>
-                <a:tc>
-                  <a:txBody>
-                    <a:bodyPr/>
-                    <a:lstStyle/>
-                    <a:p>
-                      <a:pPr marL="0" algn="ctr" defTabSz="914400" rtl="0" eaLnBrk="1" fontAlgn="b" latinLnBrk="0" hangingPunct="1">
+                      <a:pPr marL="0" algn="r" defTabSz="914400" rtl="0" eaLnBrk="1" fontAlgn="b" latinLnBrk="0" hangingPunct="1">
                         <a:defRPr sz="900">
                           <a:solidFill>
                             <a:srgbClr val="6B767D"/>
@@ -27400,7 +27382,7 @@
                       </a:endParaRPr>
                     </a:p>
                   </a:txBody>
-                  <a:tcPr marL="90000" marR="182880" marT="8095" marB="0" anchor="ctr">
+                  <a:tcPr marL="90000" marR="365760" marT="8095" marB="0" anchor="ctr">
                     <a:lnL>
                       <a:noFill/>
                     </a:lnL>
@@ -27428,7 +27410,7 @@
                     <a:bodyPr/>
                     <a:lstStyle/>
                     <a:p>
-                      <a:pPr marL="0" algn="ctr" defTabSz="914400" rtl="0" eaLnBrk="1" fontAlgn="b" latinLnBrk="0" hangingPunct="1">
+                      <a:pPr marL="0" algn="r" defTabSz="914400" rtl="0" eaLnBrk="1" fontAlgn="b" latinLnBrk="0" hangingPunct="1">
                         <a:defRPr sz="900">
                           <a:solidFill>
                             <a:srgbClr val="6B767D"/>
@@ -27467,7 +27449,7 @@
                           <a:ea typeface="+mn-ea"/>
                           <a:cs typeface="+mn-cs"/>
                         </a:rPr>
-                        <a:t>--activity_counts_monthly_summary.csv[6]}}</a:t>
+                        <a:t>--activity_counts_monthly_summary.csv[7]}}</a:t>
                       </a:r>
                       <a:endParaRPr sz="900" b="0" kern="1200" dirty="0">
                         <a:solidFill>
@@ -27479,7 +27461,7 @@
                       </a:endParaRPr>
                     </a:p>
                   </a:txBody>
-                  <a:tcPr marL="90000" marR="182880" marT="8095" marB="0" anchor="ctr">
+                  <a:tcPr marL="90000" marR="365760" marT="8095" marB="0" anchor="ctr">
                     <a:lnL>
                       <a:noFill/>
                     </a:lnL>
@@ -27507,7 +27489,7 @@
                     <a:bodyPr/>
                     <a:lstStyle/>
                     <a:p>
-                      <a:pPr marL="0" algn="ctr" defTabSz="914400" rtl="0" eaLnBrk="1" fontAlgn="b" latinLnBrk="0" hangingPunct="1">
+                      <a:pPr marL="0" algn="r" defTabSz="914400" rtl="0" eaLnBrk="1" fontAlgn="b" latinLnBrk="0" hangingPunct="1">
                         <a:defRPr sz="900">
                           <a:solidFill>
                             <a:srgbClr val="6B767D"/>
@@ -27527,7 +27509,7 @@
                         <a:t>{{</a:t>
                       </a:r>
                       <a:r>
-                        <a:rPr lang="en-GB" sz="900" b="0" kern="1200" err="1">
+                        <a:rPr lang="en-GB" sz="900" b="0" kern="1200" dirty="0" err="1">
                           <a:solidFill>
                             <a:srgbClr val="6B767D"/>
                           </a:solidFill>
@@ -27535,18 +27517,7 @@
                           <a:ea typeface="+mn-ea"/>
                           <a:cs typeface="+mn-cs"/>
                         </a:rPr>
-                        <a:t>col</a:t>
-                      </a:r>
-                      <a:r>
-                        <a:rPr lang="en-GB" sz="900" b="0" kern="1200">
-                          <a:solidFill>
-                            <a:srgbClr val="6B767D"/>
-                          </a:solidFill>
-                          <a:latin typeface="+mn-lt"/>
-                          <a:ea typeface="+mn-ea"/>
-                          <a:cs typeface="+mn-cs"/>
-                        </a:rPr>
-                        <a:t>:vhc--activity_counts_monthly_summary.</a:t>
+                        <a:t>col:vhc</a:t>
                       </a:r>
                       <a:r>
                         <a:rPr lang="en-GB" sz="900" b="0" kern="1200" dirty="0">
@@ -27557,7 +27528,7 @@
                           <a:ea typeface="+mn-ea"/>
                           <a:cs typeface="+mn-cs"/>
                         </a:rPr>
-                        <a:t>csv[7]}}</a:t>
+                        <a:t>--activity_counts_monthly_summary.csv[8]}}</a:t>
                       </a:r>
                       <a:endParaRPr sz="900" b="0" kern="1200" dirty="0">
                         <a:solidFill>
@@ -27569,7 +27540,7 @@
                       </a:endParaRPr>
                     </a:p>
                   </a:txBody>
-                  <a:tcPr marL="90000" marR="182880" marT="8095" marB="0" anchor="ctr">
+                  <a:tcPr marL="90000" marR="365760" marT="8095" marB="0" anchor="ctr">
                     <a:lnL>
                       <a:noFill/>
                     </a:lnL>
@@ -27597,7 +27568,7 @@
                     <a:bodyPr/>
                     <a:lstStyle/>
                     <a:p>
-                      <a:pPr marL="0" algn="ctr" defTabSz="914400" rtl="0" eaLnBrk="1" fontAlgn="b" latinLnBrk="0" hangingPunct="1">
+                      <a:pPr marL="0" algn="r" defTabSz="914400" rtl="0" eaLnBrk="1" fontAlgn="b" latinLnBrk="0" hangingPunct="1">
                         <a:defRPr sz="900">
                           <a:solidFill>
                             <a:srgbClr val="6B767D"/>
@@ -27617,7 +27588,7 @@
                         <a:t>{{</a:t>
                       </a:r>
                       <a:r>
-                        <a:rPr lang="en-GB" sz="900" b="0" kern="1200" err="1">
+                        <a:rPr lang="en-GB" sz="900" b="0" kern="1200" dirty="0" err="1">
                           <a:solidFill>
                             <a:srgbClr val="6B767D"/>
                           </a:solidFill>
@@ -27625,18 +27596,7 @@
                           <a:ea typeface="+mn-ea"/>
                           <a:cs typeface="+mn-cs"/>
                         </a:rPr>
-                        <a:t>col</a:t>
-                      </a:r>
-                      <a:r>
-                        <a:rPr lang="en-GB" sz="900" b="0" kern="1200">
-                          <a:solidFill>
-                            <a:srgbClr val="6B767D"/>
-                          </a:solidFill>
-                          <a:latin typeface="+mn-lt"/>
-                          <a:ea typeface="+mn-ea"/>
-                          <a:cs typeface="+mn-cs"/>
-                        </a:rPr>
-                        <a:t>:vhc--activity_counts_monthly_summary.</a:t>
+                        <a:t>col:vhc</a:t>
                       </a:r>
                       <a:r>
                         <a:rPr lang="en-GB" sz="900" b="0" kern="1200" dirty="0">
@@ -27647,7 +27607,7 @@
                           <a:ea typeface="+mn-ea"/>
                           <a:cs typeface="+mn-cs"/>
                         </a:rPr>
-                        <a:t>csv[8]}}</a:t>
+                        <a:t>--activity_counts_monthly_summary.csv[9]}}</a:t>
                       </a:r>
                       <a:endParaRPr sz="900" b="0" kern="1200" dirty="0">
                         <a:solidFill>
@@ -27659,7 +27619,97 @@
                       </a:endParaRPr>
                     </a:p>
                   </a:txBody>
-                  <a:tcPr marL="90000" marR="182880" marT="8095" marB="0" anchor="ctr">
+                  <a:tcPr marL="90000" marR="365760" marT="8095" marB="0" anchor="ctr">
+                    <a:lnL>
+                      <a:noFill/>
+                    </a:lnL>
+                    <a:lnR>
+                      <a:noFill/>
+                    </a:lnR>
+                    <a:lnT w="12700" cmpd="sng">
+                      <a:noFill/>
+                    </a:lnT>
+                    <a:lnB w="12700" cmpd="sng">
+                      <a:noFill/>
+                    </a:lnB>
+                    <a:lnTlToBr w="12700" cmpd="sng">
+                      <a:noFill/>
+                      <a:prstDash val="solid"/>
+                    </a:lnTlToBr>
+                    <a:lnBlToTr w="12700" cmpd="sng">
+                      <a:noFill/>
+                      <a:prstDash val="solid"/>
+                    </a:lnBlToTr>
+                  </a:tcPr>
+                </a:tc>
+                <a:tc>
+                  <a:txBody>
+                    <a:bodyPr/>
+                    <a:lstStyle/>
+                    <a:p>
+                      <a:pPr marL="0" algn="r" defTabSz="914400" rtl="0" eaLnBrk="1" fontAlgn="b" latinLnBrk="0" hangingPunct="1">
+                        <a:defRPr sz="900">
+                          <a:solidFill>
+                            <a:srgbClr val="6B767D"/>
+                          </a:solidFill>
+                          <a:latin typeface="+mn-lt"/>
+                        </a:defRPr>
+                      </a:pPr>
+                      <a:r>
+                        <a:rPr lang="en-GB" sz="900" b="0" kern="1200" dirty="0">
+                          <a:solidFill>
+                            <a:srgbClr val="6B767D"/>
+                          </a:solidFill>
+                          <a:latin typeface="+mn-lt"/>
+                          <a:ea typeface="+mn-ea"/>
+                          <a:cs typeface="+mn-cs"/>
+                        </a:rPr>
+                        <a:t>{{</a:t>
+                      </a:r>
+                      <a:r>
+                        <a:rPr lang="en-GB" sz="900" b="0" kern="1200" dirty="0" err="1">
+                          <a:solidFill>
+                            <a:srgbClr val="6B767D"/>
+                          </a:solidFill>
+                          <a:latin typeface="+mn-lt"/>
+                          <a:ea typeface="+mn-ea"/>
+                          <a:cs typeface="+mn-cs"/>
+                        </a:rPr>
+                        <a:t>col:vhc</a:t>
+                      </a:r>
+                      <a:r>
+                        <a:rPr lang="en-GB" sz="900" b="0" kern="1200" dirty="0">
+                          <a:solidFill>
+                            <a:srgbClr val="6B767D"/>
+                          </a:solidFill>
+                          <a:latin typeface="+mn-lt"/>
+                          <a:ea typeface="+mn-ea"/>
+                          <a:cs typeface="+mn-cs"/>
+                        </a:rPr>
+                        <a:t>--activity_counts_monthly_summary.csv</a:t>
+                      </a:r>
+                      <a:r>
+                        <a:rPr lang="en-GB" sz="900" b="0" kern="1200">
+                          <a:solidFill>
+                            <a:srgbClr val="6B767D"/>
+                          </a:solidFill>
+                          <a:latin typeface="+mn-lt"/>
+                          <a:ea typeface="+mn-ea"/>
+                          <a:cs typeface="+mn-cs"/>
+                        </a:rPr>
+                        <a:t>[11]}}</a:t>
+                      </a:r>
+                      <a:endParaRPr sz="900" b="0" kern="1200" dirty="0">
+                        <a:solidFill>
+                          <a:srgbClr val="6B767D"/>
+                        </a:solidFill>
+                        <a:latin typeface="+mn-lt"/>
+                        <a:ea typeface="+mn-ea"/>
+                        <a:cs typeface="+mn-cs"/>
+                      </a:endParaRPr>
+                    </a:p>
+                  </a:txBody>
+                  <a:tcPr marL="90000" marR="365760" marT="8095" marB="0" anchor="ctr">
                     <a:lnL>
                       <a:noFill/>
                     </a:lnL>
@@ -27778,7 +27828,7 @@
                     <a:bodyPr/>
                     <a:lstStyle/>
                     <a:p>
-                      <a:pPr algn="ctr" fontAlgn="b">
+                      <a:pPr algn="r" fontAlgn="b">
                         <a:defRPr sz="900">
                           <a:solidFill>
                             <a:srgbClr val="6B767D"/>
@@ -27789,7 +27839,7 @@
                       <a:endParaRPr sz="900" b="0"/>
                     </a:p>
                   </a:txBody>
-                  <a:tcPr marL="90000" marR="182880" marT="8095" marB="0" anchor="ctr">
+                  <a:tcPr marL="90000" marR="365760" marT="8095" marB="0" anchor="ctr">
                     <a:lnL>
                       <a:noFill/>
                     </a:lnL>
@@ -27817,7 +27867,46 @@
                     <a:bodyPr/>
                     <a:lstStyle/>
                     <a:p>
-                      <a:pPr algn="ctr" fontAlgn="b">
+                      <a:pPr algn="r" fontAlgn="b">
+                        <a:defRPr sz="900">
+                          <a:solidFill>
+                            <a:srgbClr val="6B767D"/>
+                          </a:solidFill>
+                          <a:latin typeface="+mn-lt"/>
+                        </a:defRPr>
+                      </a:pPr>
+                      <a:endParaRPr sz="900" b="0" dirty="0"/>
+                    </a:p>
+                  </a:txBody>
+                  <a:tcPr marL="90000" marR="365760" marT="8095" marB="0" anchor="ctr">
+                    <a:lnL>
+                      <a:noFill/>
+                    </a:lnL>
+                    <a:lnR>
+                      <a:noFill/>
+                    </a:lnR>
+                    <a:lnT w="12700" cmpd="sng">
+                      <a:noFill/>
+                    </a:lnT>
+                    <a:lnB w="12700" cmpd="sng">
+                      <a:noFill/>
+                    </a:lnB>
+                    <a:lnTlToBr w="12700" cmpd="sng">
+                      <a:noFill/>
+                      <a:prstDash val="solid"/>
+                    </a:lnTlToBr>
+                    <a:lnBlToTr w="12700" cmpd="sng">
+                      <a:noFill/>
+                      <a:prstDash val="solid"/>
+                    </a:lnBlToTr>
+                  </a:tcPr>
+                </a:tc>
+                <a:tc>
+                  <a:txBody>
+                    <a:bodyPr/>
+                    <a:lstStyle/>
+                    <a:p>
+                      <a:pPr algn="r" fontAlgn="b">
                         <a:defRPr sz="900">
                           <a:solidFill>
                             <a:srgbClr val="6B767D"/>
@@ -27828,7 +27917,7 @@
                       <a:endParaRPr sz="900" b="0"/>
                     </a:p>
                   </a:txBody>
-                  <a:tcPr marL="90000" marR="182880" marT="8095" marB="0" anchor="ctr">
+                  <a:tcPr marL="90000" marR="365760" marT="8095" marB="0" anchor="ctr">
                     <a:lnL>
                       <a:noFill/>
                     </a:lnL>
@@ -27856,7 +27945,7 @@
                     <a:bodyPr/>
                     <a:lstStyle/>
                     <a:p>
-                      <a:pPr algn="ctr" fontAlgn="b">
+                      <a:pPr algn="r" fontAlgn="b">
                         <a:defRPr sz="900">
                           <a:solidFill>
                             <a:srgbClr val="6B767D"/>
@@ -27867,7 +27956,7 @@
                       <a:endParaRPr sz="900" b="0"/>
                     </a:p>
                   </a:txBody>
-                  <a:tcPr marL="90000" marR="182880" marT="8095" marB="0" anchor="ctr">
+                  <a:tcPr marL="90000" marR="365760" marT="8095" marB="0" anchor="ctr">
                     <a:lnL>
                       <a:noFill/>
                     </a:lnL>
@@ -27895,46 +27984,7 @@
                     <a:bodyPr/>
                     <a:lstStyle/>
                     <a:p>
-                      <a:pPr algn="ctr" fontAlgn="b">
-                        <a:defRPr sz="900">
-                          <a:solidFill>
-                            <a:srgbClr val="6B767D"/>
-                          </a:solidFill>
-                          <a:latin typeface="+mn-lt"/>
-                        </a:defRPr>
-                      </a:pPr>
-                      <a:endParaRPr sz="900" b="0"/>
-                    </a:p>
-                  </a:txBody>
-                  <a:tcPr marL="90000" marR="182880" marT="8095" marB="0" anchor="ctr">
-                    <a:lnL>
-                      <a:noFill/>
-                    </a:lnL>
-                    <a:lnR>
-                      <a:noFill/>
-                    </a:lnR>
-                    <a:lnT w="12700" cmpd="sng">
-                      <a:noFill/>
-                    </a:lnT>
-                    <a:lnB w="12700" cmpd="sng">
-                      <a:noFill/>
-                    </a:lnB>
-                    <a:lnTlToBr w="12700" cmpd="sng">
-                      <a:noFill/>
-                      <a:prstDash val="solid"/>
-                    </a:lnTlToBr>
-                    <a:lnBlToTr w="12700" cmpd="sng">
-                      <a:noFill/>
-                      <a:prstDash val="solid"/>
-                    </a:lnBlToTr>
-                  </a:tcPr>
-                </a:tc>
-                <a:tc>
-                  <a:txBody>
-                    <a:bodyPr/>
-                    <a:lstStyle/>
-                    <a:p>
-                      <a:pPr algn="ctr" fontAlgn="b">
+                      <a:pPr algn="r" fontAlgn="b">
                         <a:defRPr sz="900">
                           <a:solidFill>
                             <a:srgbClr val="6B767D"/>
@@ -27945,7 +27995,7 @@
                       <a:endParaRPr sz="900" b="0" dirty="0"/>
                     </a:p>
                   </a:txBody>
-                  <a:tcPr marL="90000" marR="182880" marT="8095" marB="0" anchor="ctr">
+                  <a:tcPr marL="90000" marR="365760" marT="8095" marB="0" anchor="ctr">
                     <a:lnL>
                       <a:noFill/>
                     </a:lnL>
@@ -27973,7 +28023,7 @@
                     <a:bodyPr/>
                     <a:lstStyle/>
                     <a:p>
-                      <a:pPr algn="ctr" fontAlgn="b">
+                      <a:pPr algn="r" fontAlgn="b">
                         <a:defRPr sz="900">
                           <a:solidFill>
                             <a:srgbClr val="6B767D"/>
@@ -27984,7 +28034,7 @@
                       <a:endParaRPr sz="900" b="0" dirty="0"/>
                     </a:p>
                   </a:txBody>
-                  <a:tcPr marL="90000" marR="182880" marT="8095" marB="0" anchor="ctr">
+                  <a:tcPr marL="90000" marR="365760" marT="8095" marB="0" anchor="ctr">
                     <a:lnL>
                       <a:noFill/>
                     </a:lnL>
@@ -28103,7 +28153,46 @@
                     <a:bodyPr/>
                     <a:lstStyle/>
                     <a:p>
-                      <a:pPr algn="ctr" fontAlgn="b">
+                      <a:pPr algn="r" fontAlgn="b">
+                        <a:defRPr sz="900">
+                          <a:solidFill>
+                            <a:srgbClr val="6B767D"/>
+                          </a:solidFill>
+                          <a:latin typeface="+mn-lt"/>
+                        </a:defRPr>
+                      </a:pPr>
+                      <a:endParaRPr sz="900" b="0" dirty="0"/>
+                    </a:p>
+                  </a:txBody>
+                  <a:tcPr marL="90000" marR="365760" marT="8095" marB="0" anchor="ctr">
+                    <a:lnL>
+                      <a:noFill/>
+                    </a:lnL>
+                    <a:lnR>
+                      <a:noFill/>
+                    </a:lnR>
+                    <a:lnT w="12700" cmpd="sng">
+                      <a:noFill/>
+                    </a:lnT>
+                    <a:lnB w="12700" cmpd="sng">
+                      <a:noFill/>
+                    </a:lnB>
+                    <a:lnTlToBr w="12700" cmpd="sng">
+                      <a:noFill/>
+                      <a:prstDash val="solid"/>
+                    </a:lnTlToBr>
+                    <a:lnBlToTr w="12700" cmpd="sng">
+                      <a:noFill/>
+                      <a:prstDash val="solid"/>
+                    </a:lnBlToTr>
+                  </a:tcPr>
+                </a:tc>
+                <a:tc>
+                  <a:txBody>
+                    <a:bodyPr/>
+                    <a:lstStyle/>
+                    <a:p>
+                      <a:pPr algn="r" fontAlgn="b">
                         <a:defRPr sz="900">
                           <a:solidFill>
                             <a:srgbClr val="6B767D"/>
@@ -28114,7 +28203,7 @@
                       <a:endParaRPr sz="900" b="0"/>
                     </a:p>
                   </a:txBody>
-                  <a:tcPr marL="90000" marR="182880" marT="8095" marB="0" anchor="ctr">
+                  <a:tcPr marL="90000" marR="365760" marT="8095" marB="0" anchor="ctr">
                     <a:lnL>
                       <a:noFill/>
                     </a:lnL>
@@ -28142,7 +28231,7 @@
                     <a:bodyPr/>
                     <a:lstStyle/>
                     <a:p>
-                      <a:pPr algn="ctr" fontAlgn="b">
+                      <a:pPr algn="r" fontAlgn="b">
                         <a:defRPr sz="900">
                           <a:solidFill>
                             <a:srgbClr val="6B767D"/>
@@ -28153,7 +28242,7 @@
                       <a:endParaRPr sz="900" b="0"/>
                     </a:p>
                   </a:txBody>
-                  <a:tcPr marL="90000" marR="182880" marT="8095" marB="0" anchor="ctr">
+                  <a:tcPr marL="90000" marR="365760" marT="8095" marB="0" anchor="ctr">
                     <a:lnL>
                       <a:noFill/>
                     </a:lnL>
@@ -28181,7 +28270,7 @@
                     <a:bodyPr/>
                     <a:lstStyle/>
                     <a:p>
-                      <a:pPr algn="ctr" fontAlgn="b">
+                      <a:pPr algn="r" fontAlgn="b">
                         <a:defRPr sz="900">
                           <a:solidFill>
                             <a:srgbClr val="6B767D"/>
@@ -28192,7 +28281,7 @@
                       <a:endParaRPr sz="900" b="0"/>
                     </a:p>
                   </a:txBody>
-                  <a:tcPr marL="90000" marR="182880" marT="8095" marB="0" anchor="ctr">
+                  <a:tcPr marL="90000" marR="365760" marT="8095" marB="0" anchor="ctr">
                     <a:lnL>
                       <a:noFill/>
                     </a:lnL>
@@ -28220,7 +28309,7 @@
                     <a:bodyPr/>
                     <a:lstStyle/>
                     <a:p>
-                      <a:pPr algn="ctr" fontAlgn="b">
+                      <a:pPr algn="r" fontAlgn="b">
                         <a:defRPr sz="900">
                           <a:solidFill>
                             <a:srgbClr val="6B767D"/>
@@ -28231,7 +28320,7 @@
                       <a:endParaRPr sz="900" b="0"/>
                     </a:p>
                   </a:txBody>
-                  <a:tcPr marL="90000" marR="182880" marT="8095" marB="0" anchor="ctr">
+                  <a:tcPr marL="90000" marR="365760" marT="8095" marB="0" anchor="ctr">
                     <a:lnL>
                       <a:noFill/>
                     </a:lnL>
@@ -28259,46 +28348,7 @@
                     <a:bodyPr/>
                     <a:lstStyle/>
                     <a:p>
-                      <a:pPr algn="ctr" fontAlgn="b">
-                        <a:defRPr sz="900">
-                          <a:solidFill>
-                            <a:srgbClr val="6B767D"/>
-                          </a:solidFill>
-                          <a:latin typeface="+mn-lt"/>
-                        </a:defRPr>
-                      </a:pPr>
-                      <a:endParaRPr sz="900" b="0"/>
-                    </a:p>
-                  </a:txBody>
-                  <a:tcPr marL="90000" marR="182880" marT="8095" marB="0" anchor="ctr">
-                    <a:lnL>
-                      <a:noFill/>
-                    </a:lnL>
-                    <a:lnR>
-                      <a:noFill/>
-                    </a:lnR>
-                    <a:lnT w="12700" cmpd="sng">
-                      <a:noFill/>
-                    </a:lnT>
-                    <a:lnB w="12700" cmpd="sng">
-                      <a:noFill/>
-                    </a:lnB>
-                    <a:lnTlToBr w="12700" cmpd="sng">
-                      <a:noFill/>
-                      <a:prstDash val="solid"/>
-                    </a:lnTlToBr>
-                    <a:lnBlToTr w="12700" cmpd="sng">
-                      <a:noFill/>
-                      <a:prstDash val="solid"/>
-                    </a:lnBlToTr>
-                  </a:tcPr>
-                </a:tc>
-                <a:tc>
-                  <a:txBody>
-                    <a:bodyPr/>
-                    <a:lstStyle/>
-                    <a:p>
-                      <a:pPr algn="ctr" fontAlgn="b">
+                      <a:pPr algn="r" fontAlgn="b">
                         <a:defRPr sz="900">
                           <a:solidFill>
                             <a:srgbClr val="6B767D"/>
@@ -28309,7 +28359,7 @@
                       <a:endParaRPr sz="900" b="0" dirty="0"/>
                     </a:p>
                   </a:txBody>
-                  <a:tcPr marL="90000" marR="182880" marT="8095" marB="0" anchor="ctr">
+                  <a:tcPr marL="90000" marR="365760" marT="8095" marB="0" anchor="ctr">
                     <a:lnL>
                       <a:noFill/>
                     </a:lnL>
@@ -28428,7 +28478,7 @@
                     <a:bodyPr/>
                     <a:lstStyle/>
                     <a:p>
-                      <a:pPr algn="ctr" fontAlgn="b">
+                      <a:pPr algn="r" fontAlgn="b">
                         <a:defRPr sz="900">
                           <a:solidFill>
                             <a:srgbClr val="6B767D"/>
@@ -28439,7 +28489,7 @@
                       <a:endParaRPr sz="900" b="0"/>
                     </a:p>
                   </a:txBody>
-                  <a:tcPr marL="90000" marR="182880" marT="8095" marB="0" anchor="ctr">
+                  <a:tcPr marL="90000" marR="365760" marT="8095" marB="0" anchor="ctr">
                     <a:lnL>
                       <a:noFill/>
                     </a:lnL>
@@ -28467,7 +28517,85 @@
                     <a:bodyPr/>
                     <a:lstStyle/>
                     <a:p>
-                      <a:pPr algn="ctr" fontAlgn="b">
+                      <a:pPr algn="r" fontAlgn="b">
+                        <a:defRPr sz="900">
+                          <a:solidFill>
+                            <a:srgbClr val="6B767D"/>
+                          </a:solidFill>
+                          <a:latin typeface="+mn-lt"/>
+                        </a:defRPr>
+                      </a:pPr>
+                      <a:endParaRPr sz="900" b="0" dirty="0"/>
+                    </a:p>
+                  </a:txBody>
+                  <a:tcPr marL="90000" marR="365760" marT="8095" marB="0" anchor="ctr">
+                    <a:lnL>
+                      <a:noFill/>
+                    </a:lnL>
+                    <a:lnR>
+                      <a:noFill/>
+                    </a:lnR>
+                    <a:lnT w="12700" cmpd="sng">
+                      <a:noFill/>
+                    </a:lnT>
+                    <a:lnB w="12700" cmpd="sng">
+                      <a:noFill/>
+                    </a:lnB>
+                    <a:lnTlToBr w="12700" cmpd="sng">
+                      <a:noFill/>
+                      <a:prstDash val="solid"/>
+                    </a:lnTlToBr>
+                    <a:lnBlToTr w="12700" cmpd="sng">
+                      <a:noFill/>
+                      <a:prstDash val="solid"/>
+                    </a:lnBlToTr>
+                  </a:tcPr>
+                </a:tc>
+                <a:tc>
+                  <a:txBody>
+                    <a:bodyPr/>
+                    <a:lstStyle/>
+                    <a:p>
+                      <a:pPr algn="r" fontAlgn="b">
+                        <a:defRPr sz="900">
+                          <a:solidFill>
+                            <a:srgbClr val="6B767D"/>
+                          </a:solidFill>
+                          <a:latin typeface="+mn-lt"/>
+                        </a:defRPr>
+                      </a:pPr>
+                      <a:endParaRPr sz="900" b="0" dirty="0"/>
+                    </a:p>
+                  </a:txBody>
+                  <a:tcPr marL="90000" marR="365760" marT="8095" marB="0" anchor="ctr">
+                    <a:lnL>
+                      <a:noFill/>
+                    </a:lnL>
+                    <a:lnR>
+                      <a:noFill/>
+                    </a:lnR>
+                    <a:lnT w="12700" cmpd="sng">
+                      <a:noFill/>
+                    </a:lnT>
+                    <a:lnB w="12700" cmpd="sng">
+                      <a:noFill/>
+                    </a:lnB>
+                    <a:lnTlToBr w="12700" cmpd="sng">
+                      <a:noFill/>
+                      <a:prstDash val="solid"/>
+                    </a:lnTlToBr>
+                    <a:lnBlToTr w="12700" cmpd="sng">
+                      <a:noFill/>
+                      <a:prstDash val="solid"/>
+                    </a:lnBlToTr>
+                  </a:tcPr>
+                </a:tc>
+                <a:tc>
+                  <a:txBody>
+                    <a:bodyPr/>
+                    <a:lstStyle/>
+                    <a:p>
+                      <a:pPr algn="r" fontAlgn="b">
                         <a:defRPr sz="900">
                           <a:solidFill>
                             <a:srgbClr val="6B767D"/>
@@ -28478,7 +28606,7 @@
                       <a:endParaRPr sz="900" b="0"/>
                     </a:p>
                   </a:txBody>
-                  <a:tcPr marL="90000" marR="182880" marT="8095" marB="0" anchor="ctr">
+                  <a:tcPr marL="90000" marR="365760" marT="8095" marB="0" anchor="ctr">
                     <a:lnL>
                       <a:noFill/>
                     </a:lnL>
@@ -28506,7 +28634,7 @@
                     <a:bodyPr/>
                     <a:lstStyle/>
                     <a:p>
-                      <a:pPr algn="ctr" fontAlgn="b">
+                      <a:pPr algn="r" fontAlgn="b">
                         <a:defRPr sz="900">
                           <a:solidFill>
                             <a:srgbClr val="6B767D"/>
@@ -28517,7 +28645,7 @@
                       <a:endParaRPr sz="900" b="0"/>
                     </a:p>
                   </a:txBody>
-                  <a:tcPr marL="90000" marR="182880" marT="8095" marB="0" anchor="ctr">
+                  <a:tcPr marL="90000" marR="365760" marT="8095" marB="0" anchor="ctr">
                     <a:lnL>
                       <a:noFill/>
                     </a:lnL>
@@ -28545,7 +28673,7 @@
                     <a:bodyPr/>
                     <a:lstStyle/>
                     <a:p>
-                      <a:pPr algn="ctr" fontAlgn="b">
+                      <a:pPr algn="r" fontAlgn="b">
                         <a:defRPr sz="900">
                           <a:solidFill>
                             <a:srgbClr val="6B767D"/>
@@ -28556,85 +28684,7 @@
                       <a:endParaRPr sz="900" b="0"/>
                     </a:p>
                   </a:txBody>
-                  <a:tcPr marL="90000" marR="182880" marT="8095" marB="0" anchor="ctr">
-                    <a:lnL>
-                      <a:noFill/>
-                    </a:lnL>
-                    <a:lnR>
-                      <a:noFill/>
-                    </a:lnR>
-                    <a:lnT w="12700" cmpd="sng">
-                      <a:noFill/>
-                    </a:lnT>
-                    <a:lnB w="12700" cmpd="sng">
-                      <a:noFill/>
-                    </a:lnB>
-                    <a:lnTlToBr w="12700" cmpd="sng">
-                      <a:noFill/>
-                      <a:prstDash val="solid"/>
-                    </a:lnTlToBr>
-                    <a:lnBlToTr w="12700" cmpd="sng">
-                      <a:noFill/>
-                      <a:prstDash val="solid"/>
-                    </a:lnBlToTr>
-                  </a:tcPr>
-                </a:tc>
-                <a:tc>
-                  <a:txBody>
-                    <a:bodyPr/>
-                    <a:lstStyle/>
-                    <a:p>
-                      <a:pPr algn="ctr" fontAlgn="b">
-                        <a:defRPr sz="900">
-                          <a:solidFill>
-                            <a:srgbClr val="6B767D"/>
-                          </a:solidFill>
-                          <a:latin typeface="+mn-lt"/>
-                        </a:defRPr>
-                      </a:pPr>
-                      <a:endParaRPr sz="900" b="0"/>
-                    </a:p>
-                  </a:txBody>
-                  <a:tcPr marL="90000" marR="182880" marT="8095" marB="0" anchor="ctr">
-                    <a:lnL>
-                      <a:noFill/>
-                    </a:lnL>
-                    <a:lnR>
-                      <a:noFill/>
-                    </a:lnR>
-                    <a:lnT w="12700" cmpd="sng">
-                      <a:noFill/>
-                    </a:lnT>
-                    <a:lnB w="12700" cmpd="sng">
-                      <a:noFill/>
-                    </a:lnB>
-                    <a:lnTlToBr w="12700" cmpd="sng">
-                      <a:noFill/>
-                      <a:prstDash val="solid"/>
-                    </a:lnTlToBr>
-                    <a:lnBlToTr w="12700" cmpd="sng">
-                      <a:noFill/>
-                      <a:prstDash val="solid"/>
-                    </a:lnBlToTr>
-                  </a:tcPr>
-                </a:tc>
-                <a:tc>
-                  <a:txBody>
-                    <a:bodyPr/>
-                    <a:lstStyle/>
-                    <a:p>
-                      <a:pPr algn="ctr" fontAlgn="b">
-                        <a:defRPr sz="900">
-                          <a:solidFill>
-                            <a:srgbClr val="6B767D"/>
-                          </a:solidFill>
-                          <a:latin typeface="+mn-lt"/>
-                        </a:defRPr>
-                      </a:pPr>
-                      <a:endParaRPr sz="900" b="0"/>
-                    </a:p>
-                  </a:txBody>
-                  <a:tcPr marL="90000" marR="182880" marT="8095" marB="0" anchor="ctr">
+                  <a:tcPr marL="90000" marR="365760" marT="8095" marB="0" anchor="ctr">
                     <a:lnL>
                       <a:noFill/>
                     </a:lnL>
@@ -28753,7 +28803,7 @@
                     <a:bodyPr/>
                     <a:lstStyle/>
                     <a:p>
-                      <a:pPr algn="ctr" fontAlgn="b">
+                      <a:pPr algn="r" fontAlgn="b">
                         <a:defRPr sz="900">
                           <a:solidFill>
                             <a:srgbClr val="6B767D"/>
@@ -28764,7 +28814,7 @@
                       <a:endParaRPr sz="900" b="0"/>
                     </a:p>
                   </a:txBody>
-                  <a:tcPr marL="90000" marR="182880" marT="8095" marB="0" anchor="ctr">
+                  <a:tcPr marL="90000" marR="365760" marT="8095" marB="0" anchor="ctr">
                     <a:lnL>
                       <a:noFill/>
                     </a:lnL>
@@ -28792,7 +28842,85 @@
                     <a:bodyPr/>
                     <a:lstStyle/>
                     <a:p>
-                      <a:pPr algn="ctr" fontAlgn="b">
+                      <a:pPr algn="r" fontAlgn="b">
+                        <a:defRPr sz="900">
+                          <a:solidFill>
+                            <a:srgbClr val="6B767D"/>
+                          </a:solidFill>
+                          <a:latin typeface="+mn-lt"/>
+                        </a:defRPr>
+                      </a:pPr>
+                      <a:endParaRPr sz="900" b="0" dirty="0"/>
+                    </a:p>
+                  </a:txBody>
+                  <a:tcPr marL="90000" marR="365760" marT="8095" marB="0" anchor="ctr">
+                    <a:lnL>
+                      <a:noFill/>
+                    </a:lnL>
+                    <a:lnR>
+                      <a:noFill/>
+                    </a:lnR>
+                    <a:lnT w="12700" cmpd="sng">
+                      <a:noFill/>
+                    </a:lnT>
+                    <a:lnB w="12700" cmpd="sng">
+                      <a:noFill/>
+                    </a:lnB>
+                    <a:lnTlToBr w="12700" cmpd="sng">
+                      <a:noFill/>
+                      <a:prstDash val="solid"/>
+                    </a:lnTlToBr>
+                    <a:lnBlToTr w="12700" cmpd="sng">
+                      <a:noFill/>
+                      <a:prstDash val="solid"/>
+                    </a:lnBlToTr>
+                  </a:tcPr>
+                </a:tc>
+                <a:tc>
+                  <a:txBody>
+                    <a:bodyPr/>
+                    <a:lstStyle/>
+                    <a:p>
+                      <a:pPr algn="r" fontAlgn="b">
+                        <a:defRPr sz="900">
+                          <a:solidFill>
+                            <a:srgbClr val="6B767D"/>
+                          </a:solidFill>
+                          <a:latin typeface="+mn-lt"/>
+                        </a:defRPr>
+                      </a:pPr>
+                      <a:endParaRPr sz="900" b="0" dirty="0"/>
+                    </a:p>
+                  </a:txBody>
+                  <a:tcPr marL="90000" marR="365760" marT="8095" marB="0" anchor="ctr">
+                    <a:lnL>
+                      <a:noFill/>
+                    </a:lnL>
+                    <a:lnR>
+                      <a:noFill/>
+                    </a:lnR>
+                    <a:lnT w="12700" cmpd="sng">
+                      <a:noFill/>
+                    </a:lnT>
+                    <a:lnB w="12700" cmpd="sng">
+                      <a:noFill/>
+                    </a:lnB>
+                    <a:lnTlToBr w="12700" cmpd="sng">
+                      <a:noFill/>
+                      <a:prstDash val="solid"/>
+                    </a:lnTlToBr>
+                    <a:lnBlToTr w="12700" cmpd="sng">
+                      <a:noFill/>
+                      <a:prstDash val="solid"/>
+                    </a:lnBlToTr>
+                  </a:tcPr>
+                </a:tc>
+                <a:tc>
+                  <a:txBody>
+                    <a:bodyPr/>
+                    <a:lstStyle/>
+                    <a:p>
+                      <a:pPr algn="r" fontAlgn="b">
                         <a:defRPr sz="900">
                           <a:solidFill>
                             <a:srgbClr val="6B767D"/>
@@ -28803,7 +28931,7 @@
                       <a:endParaRPr sz="900" b="0"/>
                     </a:p>
                   </a:txBody>
-                  <a:tcPr marL="90000" marR="182880" marT="8095" marB="0" anchor="ctr">
+                  <a:tcPr marL="90000" marR="365760" marT="8095" marB="0" anchor="ctr">
                     <a:lnL>
                       <a:noFill/>
                     </a:lnL>
@@ -28831,85 +28959,7 @@
                     <a:bodyPr/>
                     <a:lstStyle/>
                     <a:p>
-                      <a:pPr algn="ctr" fontAlgn="b">
-                        <a:defRPr sz="900">
-                          <a:solidFill>
-                            <a:srgbClr val="6B767D"/>
-                          </a:solidFill>
-                          <a:latin typeface="+mn-lt"/>
-                        </a:defRPr>
-                      </a:pPr>
-                      <a:endParaRPr sz="900" b="0"/>
-                    </a:p>
-                  </a:txBody>
-                  <a:tcPr marL="90000" marR="182880" marT="8095" marB="0" anchor="ctr">
-                    <a:lnL>
-                      <a:noFill/>
-                    </a:lnL>
-                    <a:lnR>
-                      <a:noFill/>
-                    </a:lnR>
-                    <a:lnT w="12700" cmpd="sng">
-                      <a:noFill/>
-                    </a:lnT>
-                    <a:lnB w="12700" cmpd="sng">
-                      <a:noFill/>
-                    </a:lnB>
-                    <a:lnTlToBr w="12700" cmpd="sng">
-                      <a:noFill/>
-                      <a:prstDash val="solid"/>
-                    </a:lnTlToBr>
-                    <a:lnBlToTr w="12700" cmpd="sng">
-                      <a:noFill/>
-                      <a:prstDash val="solid"/>
-                    </a:lnBlToTr>
-                  </a:tcPr>
-                </a:tc>
-                <a:tc>
-                  <a:txBody>
-                    <a:bodyPr/>
-                    <a:lstStyle/>
-                    <a:p>
-                      <a:pPr algn="ctr" fontAlgn="b">
-                        <a:defRPr sz="900">
-                          <a:solidFill>
-                            <a:srgbClr val="6B767D"/>
-                          </a:solidFill>
-                          <a:latin typeface="+mn-lt"/>
-                        </a:defRPr>
-                      </a:pPr>
-                      <a:endParaRPr sz="900" b="0"/>
-                    </a:p>
-                  </a:txBody>
-                  <a:tcPr marL="90000" marR="182880" marT="8095" marB="0" anchor="ctr">
-                    <a:lnL>
-                      <a:noFill/>
-                    </a:lnL>
-                    <a:lnR>
-                      <a:noFill/>
-                    </a:lnR>
-                    <a:lnT w="12700" cmpd="sng">
-                      <a:noFill/>
-                    </a:lnT>
-                    <a:lnB w="12700" cmpd="sng">
-                      <a:noFill/>
-                    </a:lnB>
-                    <a:lnTlToBr w="12700" cmpd="sng">
-                      <a:noFill/>
-                      <a:prstDash val="solid"/>
-                    </a:lnTlToBr>
-                    <a:lnBlToTr w="12700" cmpd="sng">
-                      <a:noFill/>
-                      <a:prstDash val="solid"/>
-                    </a:lnBlToTr>
-                  </a:tcPr>
-                </a:tc>
-                <a:tc>
-                  <a:txBody>
-                    <a:bodyPr/>
-                    <a:lstStyle/>
-                    <a:p>
-                      <a:pPr algn="ctr" fontAlgn="b">
+                      <a:pPr algn="r" fontAlgn="b">
                         <a:defRPr sz="900">
                           <a:solidFill>
                             <a:srgbClr val="6B767D"/>
@@ -28920,7 +28970,7 @@
                       <a:endParaRPr sz="900" b="0" dirty="0"/>
                     </a:p>
                   </a:txBody>
-                  <a:tcPr marL="90000" marR="182880" marT="8095" marB="0" anchor="ctr">
+                  <a:tcPr marL="90000" marR="365760" marT="8095" marB="0" anchor="ctr">
                     <a:lnL>
                       <a:noFill/>
                     </a:lnL>
@@ -28948,7 +28998,7 @@
                     <a:bodyPr/>
                     <a:lstStyle/>
                     <a:p>
-                      <a:pPr algn="ctr" fontAlgn="b">
+                      <a:pPr algn="r" fontAlgn="b">
                         <a:defRPr sz="900">
                           <a:solidFill>
                             <a:srgbClr val="6B767D"/>
@@ -28959,7 +29009,7 @@
                       <a:endParaRPr sz="900" b="0" dirty="0"/>
                     </a:p>
                   </a:txBody>
-                  <a:tcPr marL="90000" marR="182880" marT="8095" marB="0" anchor="ctr">
+                  <a:tcPr marL="90000" marR="365760" marT="8095" marB="0" anchor="ctr">
                     <a:lnL>
                       <a:noFill/>
                     </a:lnL>
@@ -29078,7 +29128,7 @@
                     <a:bodyPr/>
                     <a:lstStyle/>
                     <a:p>
-                      <a:pPr algn="ctr" fontAlgn="b">
+                      <a:pPr algn="r" fontAlgn="b">
                         <a:defRPr sz="900">
                           <a:solidFill>
                             <a:srgbClr val="6B767D"/>
@@ -29089,7 +29139,7 @@
                       <a:endParaRPr sz="900" b="0"/>
                     </a:p>
                   </a:txBody>
-                  <a:tcPr marL="90000" marR="182880" marT="8095" marB="0" anchor="ctr">
+                  <a:tcPr marL="90000" marR="365760" marT="8095" marB="0" anchor="ctr">
                     <a:lnL>
                       <a:noFill/>
                     </a:lnL>
@@ -29117,7 +29167,7 @@
                     <a:bodyPr/>
                     <a:lstStyle/>
                     <a:p>
-                      <a:pPr algn="ctr" fontAlgn="b">
+                      <a:pPr algn="r" fontAlgn="b">
                         <a:defRPr sz="900">
                           <a:solidFill>
                             <a:srgbClr val="6B767D"/>
@@ -29128,7 +29178,7 @@
                       <a:endParaRPr sz="900" b="0"/>
                     </a:p>
                   </a:txBody>
-                  <a:tcPr marL="90000" marR="182880" marT="8095" marB="0" anchor="ctr">
+                  <a:tcPr marL="90000" marR="365760" marT="8095" marB="0" anchor="ctr">
                     <a:lnL>
                       <a:noFill/>
                     </a:lnL>
@@ -29156,85 +29206,7 @@
                     <a:bodyPr/>
                     <a:lstStyle/>
                     <a:p>
-                      <a:pPr algn="ctr" fontAlgn="b">
-                        <a:defRPr sz="900">
-                          <a:solidFill>
-                            <a:srgbClr val="6B767D"/>
-                          </a:solidFill>
-                          <a:latin typeface="+mn-lt"/>
-                        </a:defRPr>
-                      </a:pPr>
-                      <a:endParaRPr sz="900" b="0"/>
-                    </a:p>
-                  </a:txBody>
-                  <a:tcPr marL="90000" marR="182880" marT="8095" marB="0" anchor="ctr">
-                    <a:lnL>
-                      <a:noFill/>
-                    </a:lnL>
-                    <a:lnR>
-                      <a:noFill/>
-                    </a:lnR>
-                    <a:lnT w="12700" cmpd="sng">
-                      <a:noFill/>
-                    </a:lnT>
-                    <a:lnB w="12700" cmpd="sng">
-                      <a:noFill/>
-                    </a:lnB>
-                    <a:lnTlToBr w="12700" cmpd="sng">
-                      <a:noFill/>
-                      <a:prstDash val="solid"/>
-                    </a:lnTlToBr>
-                    <a:lnBlToTr w="12700" cmpd="sng">
-                      <a:noFill/>
-                      <a:prstDash val="solid"/>
-                    </a:lnBlToTr>
-                  </a:tcPr>
-                </a:tc>
-                <a:tc>
-                  <a:txBody>
-                    <a:bodyPr/>
-                    <a:lstStyle/>
-                    <a:p>
-                      <a:pPr algn="ctr" fontAlgn="b">
-                        <a:defRPr sz="900">
-                          <a:solidFill>
-                            <a:srgbClr val="6B767D"/>
-                          </a:solidFill>
-                          <a:latin typeface="+mn-lt"/>
-                        </a:defRPr>
-                      </a:pPr>
-                      <a:endParaRPr sz="900" b="0"/>
-                    </a:p>
-                  </a:txBody>
-                  <a:tcPr marL="90000" marR="182880" marT="8095" marB="0" anchor="ctr">
-                    <a:lnL>
-                      <a:noFill/>
-                    </a:lnL>
-                    <a:lnR>
-                      <a:noFill/>
-                    </a:lnR>
-                    <a:lnT w="12700" cmpd="sng">
-                      <a:noFill/>
-                    </a:lnT>
-                    <a:lnB w="12700" cmpd="sng">
-                      <a:noFill/>
-                    </a:lnB>
-                    <a:lnTlToBr w="12700" cmpd="sng">
-                      <a:noFill/>
-                      <a:prstDash val="solid"/>
-                    </a:lnTlToBr>
-                    <a:lnBlToTr w="12700" cmpd="sng">
-                      <a:noFill/>
-                      <a:prstDash val="solid"/>
-                    </a:lnBlToTr>
-                  </a:tcPr>
-                </a:tc>
-                <a:tc>
-                  <a:txBody>
-                    <a:bodyPr/>
-                    <a:lstStyle/>
-                    <a:p>
-                      <a:pPr algn="ctr" fontAlgn="b">
+                      <a:pPr algn="r" fontAlgn="b">
                         <a:defRPr sz="900">
                           <a:solidFill>
                             <a:srgbClr val="6B767D"/>
@@ -29245,7 +29217,7 @@
                       <a:endParaRPr sz="900" b="0" dirty="0"/>
                     </a:p>
                   </a:txBody>
-                  <a:tcPr marL="90000" marR="182880" marT="8095" marB="0" anchor="ctr">
+                  <a:tcPr marL="90000" marR="365760" marT="8095" marB="0" anchor="ctr">
                     <a:lnL>
                       <a:noFill/>
                     </a:lnL>
@@ -29273,7 +29245,7 @@
                     <a:bodyPr/>
                     <a:lstStyle/>
                     <a:p>
-                      <a:pPr algn="ctr" fontAlgn="b">
+                      <a:pPr algn="r" fontAlgn="b">
                         <a:defRPr sz="900">
                           <a:solidFill>
                             <a:srgbClr val="6B767D"/>
@@ -29284,7 +29256,85 @@
                       <a:endParaRPr sz="900" b="0" dirty="0"/>
                     </a:p>
                   </a:txBody>
-                  <a:tcPr marL="90000" marR="182880" marT="8095" marB="0" anchor="ctr">
+                  <a:tcPr marL="90000" marR="365760" marT="8095" marB="0" anchor="ctr">
+                    <a:lnL>
+                      <a:noFill/>
+                    </a:lnL>
+                    <a:lnR>
+                      <a:noFill/>
+                    </a:lnR>
+                    <a:lnT w="12700" cmpd="sng">
+                      <a:noFill/>
+                    </a:lnT>
+                    <a:lnB w="12700" cmpd="sng">
+                      <a:noFill/>
+                    </a:lnB>
+                    <a:lnTlToBr w="12700" cmpd="sng">
+                      <a:noFill/>
+                      <a:prstDash val="solid"/>
+                    </a:lnTlToBr>
+                    <a:lnBlToTr w="12700" cmpd="sng">
+                      <a:noFill/>
+                      <a:prstDash val="solid"/>
+                    </a:lnBlToTr>
+                  </a:tcPr>
+                </a:tc>
+                <a:tc>
+                  <a:txBody>
+                    <a:bodyPr/>
+                    <a:lstStyle/>
+                    <a:p>
+                      <a:pPr algn="r" fontAlgn="b">
+                        <a:defRPr sz="900">
+                          <a:solidFill>
+                            <a:srgbClr val="6B767D"/>
+                          </a:solidFill>
+                          <a:latin typeface="+mn-lt"/>
+                        </a:defRPr>
+                      </a:pPr>
+                      <a:endParaRPr sz="900" b="0" dirty="0"/>
+                    </a:p>
+                  </a:txBody>
+                  <a:tcPr marL="90000" marR="365760" marT="8095" marB="0" anchor="ctr">
+                    <a:lnL>
+                      <a:noFill/>
+                    </a:lnL>
+                    <a:lnR>
+                      <a:noFill/>
+                    </a:lnR>
+                    <a:lnT w="12700" cmpd="sng">
+                      <a:noFill/>
+                    </a:lnT>
+                    <a:lnB w="12700" cmpd="sng">
+                      <a:noFill/>
+                    </a:lnB>
+                    <a:lnTlToBr w="12700" cmpd="sng">
+                      <a:noFill/>
+                      <a:prstDash val="solid"/>
+                    </a:lnTlToBr>
+                    <a:lnBlToTr w="12700" cmpd="sng">
+                      <a:noFill/>
+                      <a:prstDash val="solid"/>
+                    </a:lnBlToTr>
+                  </a:tcPr>
+                </a:tc>
+                <a:tc>
+                  <a:txBody>
+                    <a:bodyPr/>
+                    <a:lstStyle/>
+                    <a:p>
+                      <a:pPr algn="r" fontAlgn="b">
+                        <a:defRPr sz="900">
+                          <a:solidFill>
+                            <a:srgbClr val="6B767D"/>
+                          </a:solidFill>
+                          <a:latin typeface="+mn-lt"/>
+                        </a:defRPr>
+                      </a:pPr>
+                      <a:endParaRPr sz="900" b="0" dirty="0"/>
+                    </a:p>
+                  </a:txBody>
+                  <a:tcPr marL="90000" marR="365760" marT="8095" marB="0" anchor="ctr">
                     <a:lnL>
                       <a:noFill/>
                     </a:lnL>
@@ -29403,7 +29453,7 @@
                     <a:bodyPr/>
                     <a:lstStyle/>
                     <a:p>
-                      <a:pPr algn="ctr" fontAlgn="b">
+                      <a:pPr algn="r" fontAlgn="b">
                         <a:defRPr sz="900">
                           <a:solidFill>
                             <a:srgbClr val="6B767D"/>
@@ -29414,7 +29464,7 @@
                       <a:endParaRPr sz="900" b="0"/>
                     </a:p>
                   </a:txBody>
-                  <a:tcPr marL="90000" marR="182880" marT="8095" marB="0" anchor="ctr">
+                  <a:tcPr marL="90000" marR="365760" marT="8095" marB="0" anchor="ctr">
                     <a:lnL>
                       <a:noFill/>
                     </a:lnL>
@@ -29442,7 +29492,7 @@
                     <a:bodyPr/>
                     <a:lstStyle/>
                     <a:p>
-                      <a:pPr algn="ctr" fontAlgn="b">
+                      <a:pPr algn="r" fontAlgn="b">
                         <a:defRPr sz="900">
                           <a:solidFill>
                             <a:srgbClr val="6B767D"/>
@@ -29453,7 +29503,7 @@
                       <a:endParaRPr sz="900" b="0"/>
                     </a:p>
                   </a:txBody>
-                  <a:tcPr marL="90000" marR="182880" marT="8095" marB="0" anchor="ctr">
+                  <a:tcPr marL="90000" marR="365760" marT="8095" marB="0" anchor="ctr">
                     <a:lnL>
                       <a:noFill/>
                     </a:lnL>
@@ -29481,85 +29531,7 @@
                     <a:bodyPr/>
                     <a:lstStyle/>
                     <a:p>
-                      <a:pPr algn="ctr" fontAlgn="b">
-                        <a:defRPr sz="900">
-                          <a:solidFill>
-                            <a:srgbClr val="6B767D"/>
-                          </a:solidFill>
-                          <a:latin typeface="+mn-lt"/>
-                        </a:defRPr>
-                      </a:pPr>
-                      <a:endParaRPr sz="900" b="0"/>
-                    </a:p>
-                  </a:txBody>
-                  <a:tcPr marL="90000" marR="182880" marT="8095" marB="0" anchor="ctr">
-                    <a:lnL>
-                      <a:noFill/>
-                    </a:lnL>
-                    <a:lnR>
-                      <a:noFill/>
-                    </a:lnR>
-                    <a:lnT w="12700" cmpd="sng">
-                      <a:noFill/>
-                    </a:lnT>
-                    <a:lnB w="12700" cmpd="sng">
-                      <a:noFill/>
-                    </a:lnB>
-                    <a:lnTlToBr w="12700" cmpd="sng">
-                      <a:noFill/>
-                      <a:prstDash val="solid"/>
-                    </a:lnTlToBr>
-                    <a:lnBlToTr w="12700" cmpd="sng">
-                      <a:noFill/>
-                      <a:prstDash val="solid"/>
-                    </a:lnBlToTr>
-                  </a:tcPr>
-                </a:tc>
-                <a:tc>
-                  <a:txBody>
-                    <a:bodyPr/>
-                    <a:lstStyle/>
-                    <a:p>
-                      <a:pPr algn="ctr" fontAlgn="b">
-                        <a:defRPr sz="900">
-                          <a:solidFill>
-                            <a:srgbClr val="6B767D"/>
-                          </a:solidFill>
-                          <a:latin typeface="+mn-lt"/>
-                        </a:defRPr>
-                      </a:pPr>
-                      <a:endParaRPr sz="900" b="0"/>
-                    </a:p>
-                  </a:txBody>
-                  <a:tcPr marL="90000" marR="182880" marT="8095" marB="0" anchor="ctr">
-                    <a:lnL>
-                      <a:noFill/>
-                    </a:lnL>
-                    <a:lnR>
-                      <a:noFill/>
-                    </a:lnR>
-                    <a:lnT w="12700" cmpd="sng">
-                      <a:noFill/>
-                    </a:lnT>
-                    <a:lnB w="12700" cmpd="sng">
-                      <a:noFill/>
-                    </a:lnB>
-                    <a:lnTlToBr w="12700" cmpd="sng">
-                      <a:noFill/>
-                      <a:prstDash val="solid"/>
-                    </a:lnTlToBr>
-                    <a:lnBlToTr w="12700" cmpd="sng">
-                      <a:noFill/>
-                      <a:prstDash val="solid"/>
-                    </a:lnBlToTr>
-                  </a:tcPr>
-                </a:tc>
-                <a:tc>
-                  <a:txBody>
-                    <a:bodyPr/>
-                    <a:lstStyle/>
-                    <a:p>
-                      <a:pPr algn="ctr" fontAlgn="b">
+                      <a:pPr algn="r" fontAlgn="b">
                         <a:defRPr sz="900">
                           <a:solidFill>
                             <a:srgbClr val="6B767D"/>
@@ -29570,7 +29542,7 @@
                       <a:endParaRPr sz="900" b="0" dirty="0"/>
                     </a:p>
                   </a:txBody>
-                  <a:tcPr marL="90000" marR="182880" marT="8095" marB="0" anchor="ctr">
+                  <a:tcPr marL="90000" marR="365760" marT="8095" marB="0" anchor="ctr">
                     <a:lnL>
                       <a:noFill/>
                     </a:lnL>
@@ -29598,7 +29570,7 @@
                     <a:bodyPr/>
                     <a:lstStyle/>
                     <a:p>
-                      <a:pPr algn="ctr" fontAlgn="b">
+                      <a:pPr algn="r" fontAlgn="b">
                         <a:defRPr sz="900">
                           <a:solidFill>
                             <a:srgbClr val="6B767D"/>
@@ -29609,7 +29581,85 @@
                       <a:endParaRPr sz="900" b="0" dirty="0"/>
                     </a:p>
                   </a:txBody>
-                  <a:tcPr marL="90000" marR="182880" marT="8095" marB="0" anchor="ctr">
+                  <a:tcPr marL="90000" marR="365760" marT="8095" marB="0" anchor="ctr">
+                    <a:lnL>
+                      <a:noFill/>
+                    </a:lnL>
+                    <a:lnR>
+                      <a:noFill/>
+                    </a:lnR>
+                    <a:lnT w="12700" cmpd="sng">
+                      <a:noFill/>
+                    </a:lnT>
+                    <a:lnB w="12700" cmpd="sng">
+                      <a:noFill/>
+                    </a:lnB>
+                    <a:lnTlToBr w="12700" cmpd="sng">
+                      <a:noFill/>
+                      <a:prstDash val="solid"/>
+                    </a:lnTlToBr>
+                    <a:lnBlToTr w="12700" cmpd="sng">
+                      <a:noFill/>
+                      <a:prstDash val="solid"/>
+                    </a:lnBlToTr>
+                  </a:tcPr>
+                </a:tc>
+                <a:tc>
+                  <a:txBody>
+                    <a:bodyPr/>
+                    <a:lstStyle/>
+                    <a:p>
+                      <a:pPr algn="r" fontAlgn="b">
+                        <a:defRPr sz="900">
+                          <a:solidFill>
+                            <a:srgbClr val="6B767D"/>
+                          </a:solidFill>
+                          <a:latin typeface="+mn-lt"/>
+                        </a:defRPr>
+                      </a:pPr>
+                      <a:endParaRPr sz="900" b="0" dirty="0"/>
+                    </a:p>
+                  </a:txBody>
+                  <a:tcPr marL="90000" marR="365760" marT="8095" marB="0" anchor="ctr">
+                    <a:lnL>
+                      <a:noFill/>
+                    </a:lnL>
+                    <a:lnR>
+                      <a:noFill/>
+                    </a:lnR>
+                    <a:lnT w="12700" cmpd="sng">
+                      <a:noFill/>
+                    </a:lnT>
+                    <a:lnB w="12700" cmpd="sng">
+                      <a:noFill/>
+                    </a:lnB>
+                    <a:lnTlToBr w="12700" cmpd="sng">
+                      <a:noFill/>
+                      <a:prstDash val="solid"/>
+                    </a:lnTlToBr>
+                    <a:lnBlToTr w="12700" cmpd="sng">
+                      <a:noFill/>
+                      <a:prstDash val="solid"/>
+                    </a:lnBlToTr>
+                  </a:tcPr>
+                </a:tc>
+                <a:tc>
+                  <a:txBody>
+                    <a:bodyPr/>
+                    <a:lstStyle/>
+                    <a:p>
+                      <a:pPr algn="r" fontAlgn="b">
+                        <a:defRPr sz="900">
+                          <a:solidFill>
+                            <a:srgbClr val="6B767D"/>
+                          </a:solidFill>
+                          <a:latin typeface="+mn-lt"/>
+                        </a:defRPr>
+                      </a:pPr>
+                      <a:endParaRPr sz="900" b="0" dirty="0"/>
+                    </a:p>
+                  </a:txBody>
+                  <a:tcPr marL="90000" marR="365760" marT="8095" marB="0" anchor="ctr">
                     <a:lnL>
                       <a:noFill/>
                     </a:lnL>
@@ -29728,7 +29778,7 @@
                     <a:bodyPr/>
                     <a:lstStyle/>
                     <a:p>
-                      <a:pPr algn="ctr" fontAlgn="b">
+                      <a:pPr algn="r" fontAlgn="b">
                         <a:defRPr sz="900">
                           <a:solidFill>
                             <a:srgbClr val="6B767D"/>
@@ -29739,7 +29789,7 @@
                       <a:endParaRPr sz="900" b="0"/>
                     </a:p>
                   </a:txBody>
-                  <a:tcPr marL="90000" marR="182880" marT="8095" marB="0" anchor="ctr">
+                  <a:tcPr marL="90000" marR="365760" marT="8095" marB="0" anchor="ctr">
                     <a:lnL>
                       <a:noFill/>
                     </a:lnL>
@@ -29767,7 +29817,7 @@
                     <a:bodyPr/>
                     <a:lstStyle/>
                     <a:p>
-                      <a:pPr algn="ctr" fontAlgn="b">
+                      <a:pPr algn="r" fontAlgn="b">
                         <a:defRPr sz="900">
                           <a:solidFill>
                             <a:srgbClr val="6B767D"/>
@@ -29778,7 +29828,7 @@
                       <a:endParaRPr sz="900" b="0"/>
                     </a:p>
                   </a:txBody>
-                  <a:tcPr marL="90000" marR="182880" marT="8095" marB="0" anchor="ctr">
+                  <a:tcPr marL="90000" marR="365760" marT="8095" marB="0" anchor="ctr">
                     <a:lnL>
                       <a:noFill/>
                     </a:lnL>
@@ -29806,7 +29856,7 @@
                     <a:bodyPr/>
                     <a:lstStyle/>
                     <a:p>
-                      <a:pPr algn="ctr" fontAlgn="b">
+                      <a:pPr algn="r" fontAlgn="b">
                         <a:defRPr sz="900">
                           <a:solidFill>
                             <a:srgbClr val="6B767D"/>
@@ -29817,7 +29867,7 @@
                       <a:endParaRPr sz="900" b="0"/>
                     </a:p>
                   </a:txBody>
-                  <a:tcPr marL="90000" marR="182880" marT="8095" marB="0" anchor="ctr">
+                  <a:tcPr marL="90000" marR="365760" marT="8095" marB="0" anchor="ctr">
                     <a:lnL>
                       <a:noFill/>
                     </a:lnL>
@@ -29845,46 +29895,7 @@
                     <a:bodyPr/>
                     <a:lstStyle/>
                     <a:p>
-                      <a:pPr algn="ctr" fontAlgn="b">
-                        <a:defRPr sz="900">
-                          <a:solidFill>
-                            <a:srgbClr val="6B767D"/>
-                          </a:solidFill>
-                          <a:latin typeface="+mn-lt"/>
-                        </a:defRPr>
-                      </a:pPr>
-                      <a:endParaRPr sz="900" b="0"/>
-                    </a:p>
-                  </a:txBody>
-                  <a:tcPr marL="90000" marR="182880" marT="8095" marB="0" anchor="ctr">
-                    <a:lnL>
-                      <a:noFill/>
-                    </a:lnL>
-                    <a:lnR>
-                      <a:noFill/>
-                    </a:lnR>
-                    <a:lnT w="12700" cmpd="sng">
-                      <a:noFill/>
-                    </a:lnT>
-                    <a:lnB w="12700" cmpd="sng">
-                      <a:noFill/>
-                    </a:lnB>
-                    <a:lnTlToBr w="12700" cmpd="sng">
-                      <a:noFill/>
-                      <a:prstDash val="solid"/>
-                    </a:lnTlToBr>
-                    <a:lnBlToTr w="12700" cmpd="sng">
-                      <a:noFill/>
-                      <a:prstDash val="solid"/>
-                    </a:lnBlToTr>
-                  </a:tcPr>
-                </a:tc>
-                <a:tc>
-                  <a:txBody>
-                    <a:bodyPr/>
-                    <a:lstStyle/>
-                    <a:p>
-                      <a:pPr algn="ctr" fontAlgn="b">
+                      <a:pPr algn="r" fontAlgn="b">
                         <a:defRPr sz="900">
                           <a:solidFill>
                             <a:srgbClr val="6B767D"/>
@@ -29895,7 +29906,7 @@
                       <a:endParaRPr sz="900" b="0" dirty="0"/>
                     </a:p>
                   </a:txBody>
-                  <a:tcPr marL="90000" marR="182880" marT="8095" marB="0" anchor="ctr">
+                  <a:tcPr marL="90000" marR="365760" marT="8095" marB="0" anchor="ctr">
                     <a:lnL>
                       <a:noFill/>
                     </a:lnL>
@@ -29923,7 +29934,7 @@
                     <a:bodyPr/>
                     <a:lstStyle/>
                     <a:p>
-                      <a:pPr algn="ctr" fontAlgn="b">
+                      <a:pPr algn="r" fontAlgn="b">
                         <a:defRPr sz="900">
                           <a:solidFill>
                             <a:srgbClr val="6B767D"/>
@@ -29934,7 +29945,46 @@
                       <a:endParaRPr sz="900" b="0" dirty="0"/>
                     </a:p>
                   </a:txBody>
-                  <a:tcPr marL="90000" marR="182880" marT="8095" marB="0" anchor="ctr">
+                  <a:tcPr marL="90000" marR="365760" marT="8095" marB="0" anchor="ctr">
+                    <a:lnL>
+                      <a:noFill/>
+                    </a:lnL>
+                    <a:lnR>
+                      <a:noFill/>
+                    </a:lnR>
+                    <a:lnT w="12700" cmpd="sng">
+                      <a:noFill/>
+                    </a:lnT>
+                    <a:lnB w="12700" cmpd="sng">
+                      <a:noFill/>
+                    </a:lnB>
+                    <a:lnTlToBr w="12700" cmpd="sng">
+                      <a:noFill/>
+                      <a:prstDash val="solid"/>
+                    </a:lnTlToBr>
+                    <a:lnBlToTr w="12700" cmpd="sng">
+                      <a:noFill/>
+                      <a:prstDash val="solid"/>
+                    </a:lnBlToTr>
+                  </a:tcPr>
+                </a:tc>
+                <a:tc>
+                  <a:txBody>
+                    <a:bodyPr/>
+                    <a:lstStyle/>
+                    <a:p>
+                      <a:pPr algn="r" fontAlgn="b">
+                        <a:defRPr sz="900">
+                          <a:solidFill>
+                            <a:srgbClr val="6B767D"/>
+                          </a:solidFill>
+                          <a:latin typeface="+mn-lt"/>
+                        </a:defRPr>
+                      </a:pPr>
+                      <a:endParaRPr sz="900" b="0" dirty="0"/>
+                    </a:p>
+                  </a:txBody>
+                  <a:tcPr marL="90000" marR="365760" marT="8095" marB="0" anchor="ctr">
                     <a:lnL>
                       <a:noFill/>
                     </a:lnL>
@@ -30053,7 +30103,7 @@
                     <a:bodyPr/>
                     <a:lstStyle/>
                     <a:p>
-                      <a:pPr algn="ctr" fontAlgn="b">
+                      <a:pPr algn="r" fontAlgn="b">
                         <a:defRPr sz="900">
                           <a:solidFill>
                             <a:srgbClr val="6B767D"/>
@@ -30064,7 +30114,7 @@
                       <a:endParaRPr sz="900" b="0"/>
                     </a:p>
                   </a:txBody>
-                  <a:tcPr marL="90000" marR="182880" marT="8095" marB="0" anchor="ctr">
+                  <a:tcPr marL="90000" marR="365760" marT="8095" marB="0" anchor="ctr">
                     <a:lnL>
                       <a:noFill/>
                     </a:lnL>
@@ -30092,7 +30142,7 @@
                     <a:bodyPr/>
                     <a:lstStyle/>
                     <a:p>
-                      <a:pPr algn="ctr" fontAlgn="b">
+                      <a:pPr algn="r" fontAlgn="b">
                         <a:defRPr sz="900">
                           <a:solidFill>
                             <a:srgbClr val="6B767D"/>
@@ -30103,7 +30153,7 @@
                       <a:endParaRPr sz="900" b="0"/>
                     </a:p>
                   </a:txBody>
-                  <a:tcPr marL="90000" marR="182880" marT="8095" marB="0" anchor="ctr">
+                  <a:tcPr marL="90000" marR="365760" marT="8095" marB="0" anchor="ctr">
                     <a:lnL>
                       <a:noFill/>
                     </a:lnL>
@@ -30131,7 +30181,7 @@
                     <a:bodyPr/>
                     <a:lstStyle/>
                     <a:p>
-                      <a:pPr algn="ctr" fontAlgn="b">
+                      <a:pPr algn="r" fontAlgn="b">
                         <a:defRPr sz="900">
                           <a:solidFill>
                             <a:srgbClr val="6B767D"/>
@@ -30142,7 +30192,7 @@
                       <a:endParaRPr sz="900" b="0"/>
                     </a:p>
                   </a:txBody>
-                  <a:tcPr marL="90000" marR="182880" marT="8095" marB="0" anchor="ctr">
+                  <a:tcPr marL="90000" marR="365760" marT="8095" marB="0" anchor="ctr">
                     <a:lnL>
                       <a:noFill/>
                     </a:lnL>
@@ -30170,7 +30220,7 @@
                     <a:bodyPr/>
                     <a:lstStyle/>
                     <a:p>
-                      <a:pPr algn="ctr" fontAlgn="b">
+                      <a:pPr algn="r" fontAlgn="b">
                         <a:defRPr sz="900">
                           <a:solidFill>
                             <a:srgbClr val="6B767D"/>
@@ -30181,7 +30231,7 @@
                       <a:endParaRPr sz="900" b="0"/>
                     </a:p>
                   </a:txBody>
-                  <a:tcPr marL="90000" marR="182880" marT="8095" marB="0" anchor="ctr">
+                  <a:tcPr marL="90000" marR="365760" marT="8095" marB="0" anchor="ctr">
                     <a:lnL>
                       <a:noFill/>
                     </a:lnL>
@@ -30209,46 +30259,7 @@
                     <a:bodyPr/>
                     <a:lstStyle/>
                     <a:p>
-                      <a:pPr algn="ctr" fontAlgn="b">
-                        <a:defRPr sz="900">
-                          <a:solidFill>
-                            <a:srgbClr val="6B767D"/>
-                          </a:solidFill>
-                          <a:latin typeface="+mn-lt"/>
-                        </a:defRPr>
-                      </a:pPr>
-                      <a:endParaRPr sz="900" b="0"/>
-                    </a:p>
-                  </a:txBody>
-                  <a:tcPr marL="90000" marR="182880" marT="8095" marB="0" anchor="ctr">
-                    <a:lnL>
-                      <a:noFill/>
-                    </a:lnL>
-                    <a:lnR>
-                      <a:noFill/>
-                    </a:lnR>
-                    <a:lnT w="12700" cmpd="sng">
-                      <a:noFill/>
-                    </a:lnT>
-                    <a:lnB w="12700" cmpd="sng">
-                      <a:noFill/>
-                    </a:lnB>
-                    <a:lnTlToBr w="12700" cmpd="sng">
-                      <a:noFill/>
-                      <a:prstDash val="solid"/>
-                    </a:lnTlToBr>
-                    <a:lnBlToTr w="12700" cmpd="sng">
-                      <a:noFill/>
-                      <a:prstDash val="solid"/>
-                    </a:lnBlToTr>
-                  </a:tcPr>
-                </a:tc>
-                <a:tc>
-                  <a:txBody>
-                    <a:bodyPr/>
-                    <a:lstStyle/>
-                    <a:p>
-                      <a:pPr algn="ctr" fontAlgn="b">
+                      <a:pPr algn="r" fontAlgn="b">
                         <a:defRPr sz="900">
                           <a:solidFill>
                             <a:srgbClr val="6B767D"/>
@@ -30259,7 +30270,46 @@
                       <a:endParaRPr sz="900" b="0" dirty="0"/>
                     </a:p>
                   </a:txBody>
-                  <a:tcPr marL="90000" marR="182880" marT="8095" marB="0" anchor="ctr">
+                  <a:tcPr marL="90000" marR="365760" marT="8095" marB="0" anchor="ctr">
+                    <a:lnL>
+                      <a:noFill/>
+                    </a:lnL>
+                    <a:lnR>
+                      <a:noFill/>
+                    </a:lnR>
+                    <a:lnT w="12700" cmpd="sng">
+                      <a:noFill/>
+                    </a:lnT>
+                    <a:lnB w="12700" cmpd="sng">
+                      <a:noFill/>
+                    </a:lnB>
+                    <a:lnTlToBr w="12700" cmpd="sng">
+                      <a:noFill/>
+                      <a:prstDash val="solid"/>
+                    </a:lnTlToBr>
+                    <a:lnBlToTr w="12700" cmpd="sng">
+                      <a:noFill/>
+                      <a:prstDash val="solid"/>
+                    </a:lnBlToTr>
+                  </a:tcPr>
+                </a:tc>
+                <a:tc>
+                  <a:txBody>
+                    <a:bodyPr/>
+                    <a:lstStyle/>
+                    <a:p>
+                      <a:pPr algn="r" fontAlgn="b">
+                        <a:defRPr sz="900">
+                          <a:solidFill>
+                            <a:srgbClr val="6B767D"/>
+                          </a:solidFill>
+                          <a:latin typeface="+mn-lt"/>
+                        </a:defRPr>
+                      </a:pPr>
+                      <a:endParaRPr sz="900" b="0" dirty="0"/>
+                    </a:p>
+                  </a:txBody>
+                  <a:tcPr marL="90000" marR="365760" marT="8095" marB="0" anchor="ctr">
                     <a:lnL>
                       <a:noFill/>
                     </a:lnL>
@@ -30378,7 +30428,7 @@
                     <a:bodyPr/>
                     <a:lstStyle/>
                     <a:p>
-                      <a:pPr algn="ctr" fontAlgn="b">
+                      <a:pPr algn="r" fontAlgn="b">
                         <a:defRPr sz="900">
                           <a:solidFill>
                             <a:srgbClr val="6B767D"/>
@@ -30389,7 +30439,7 @@
                       <a:endParaRPr sz="900" b="0"/>
                     </a:p>
                   </a:txBody>
-                  <a:tcPr marL="90000" marR="182880" marT="8095" marB="0" anchor="ctr">
+                  <a:tcPr marL="90000" marR="365760" marT="8095" marB="0" anchor="ctr">
                     <a:lnL>
                       <a:noFill/>
                     </a:lnL>
@@ -30417,7 +30467,7 @@
                     <a:bodyPr/>
                     <a:lstStyle/>
                     <a:p>
-                      <a:pPr algn="ctr" fontAlgn="b">
+                      <a:pPr algn="r" fontAlgn="b">
                         <a:defRPr sz="900">
                           <a:solidFill>
                             <a:srgbClr val="6B767D"/>
@@ -30428,7 +30478,7 @@
                       <a:endParaRPr sz="900" b="0"/>
                     </a:p>
                   </a:txBody>
-                  <a:tcPr marL="90000" marR="182880" marT="8095" marB="0" anchor="ctr">
+                  <a:tcPr marL="90000" marR="365760" marT="8095" marB="0" anchor="ctr">
                     <a:lnL>
                       <a:noFill/>
                     </a:lnL>
@@ -30456,7 +30506,7 @@
                     <a:bodyPr/>
                     <a:lstStyle/>
                     <a:p>
-                      <a:pPr algn="ctr" fontAlgn="b">
+                      <a:pPr algn="r" fontAlgn="b">
                         <a:defRPr sz="900">
                           <a:solidFill>
                             <a:srgbClr val="6B767D"/>
@@ -30467,7 +30517,7 @@
                       <a:endParaRPr sz="900" b="0"/>
                     </a:p>
                   </a:txBody>
-                  <a:tcPr marL="90000" marR="182880" marT="8095" marB="0" anchor="ctr">
+                  <a:tcPr marL="90000" marR="365760" marT="8095" marB="0" anchor="ctr">
                     <a:lnL>
                       <a:noFill/>
                     </a:lnL>
@@ -30495,7 +30545,7 @@
                     <a:bodyPr/>
                     <a:lstStyle/>
                     <a:p>
-                      <a:pPr algn="ctr" fontAlgn="b">
+                      <a:pPr algn="r" fontAlgn="b">
                         <a:defRPr sz="900">
                           <a:solidFill>
                             <a:srgbClr val="6B767D"/>
@@ -30506,7 +30556,7 @@
                       <a:endParaRPr sz="900" b="0"/>
                     </a:p>
                   </a:txBody>
-                  <a:tcPr marL="90000" marR="182880" marT="8095" marB="0" anchor="ctr">
+                  <a:tcPr marL="90000" marR="365760" marT="8095" marB="0" anchor="ctr">
                     <a:lnL>
                       <a:noFill/>
                     </a:lnL>
@@ -30534,46 +30584,7 @@
                     <a:bodyPr/>
                     <a:lstStyle/>
                     <a:p>
-                      <a:pPr algn="ctr" fontAlgn="b">
-                        <a:defRPr sz="900">
-                          <a:solidFill>
-                            <a:srgbClr val="6B767D"/>
-                          </a:solidFill>
-                          <a:latin typeface="+mn-lt"/>
-                        </a:defRPr>
-                      </a:pPr>
-                      <a:endParaRPr sz="900" b="0"/>
-                    </a:p>
-                  </a:txBody>
-                  <a:tcPr marL="90000" marR="182880" marT="8095" marB="0" anchor="ctr">
-                    <a:lnL>
-                      <a:noFill/>
-                    </a:lnL>
-                    <a:lnR>
-                      <a:noFill/>
-                    </a:lnR>
-                    <a:lnT w="12700" cmpd="sng">
-                      <a:noFill/>
-                    </a:lnT>
-                    <a:lnB w="12700" cmpd="sng">
-                      <a:noFill/>
-                    </a:lnB>
-                    <a:lnTlToBr w="12700" cmpd="sng">
-                      <a:noFill/>
-                      <a:prstDash val="solid"/>
-                    </a:lnTlToBr>
-                    <a:lnBlToTr w="12700" cmpd="sng">
-                      <a:noFill/>
-                      <a:prstDash val="solid"/>
-                    </a:lnBlToTr>
-                  </a:tcPr>
-                </a:tc>
-                <a:tc>
-                  <a:txBody>
-                    <a:bodyPr/>
-                    <a:lstStyle/>
-                    <a:p>
-                      <a:pPr algn="ctr" fontAlgn="b">
+                      <a:pPr algn="r" fontAlgn="b">
                         <a:defRPr sz="900">
                           <a:solidFill>
                             <a:srgbClr val="6B767D"/>
@@ -30584,7 +30595,46 @@
                       <a:endParaRPr sz="900" b="0" dirty="0"/>
                     </a:p>
                   </a:txBody>
-                  <a:tcPr marL="90000" marR="182880" marT="8095" marB="0" anchor="ctr">
+                  <a:tcPr marL="90000" marR="365760" marT="8095" marB="0" anchor="ctr">
+                    <a:lnL>
+                      <a:noFill/>
+                    </a:lnL>
+                    <a:lnR>
+                      <a:noFill/>
+                    </a:lnR>
+                    <a:lnT w="12700" cmpd="sng">
+                      <a:noFill/>
+                    </a:lnT>
+                    <a:lnB w="12700" cmpd="sng">
+                      <a:noFill/>
+                    </a:lnB>
+                    <a:lnTlToBr w="12700" cmpd="sng">
+                      <a:noFill/>
+                      <a:prstDash val="solid"/>
+                    </a:lnTlToBr>
+                    <a:lnBlToTr w="12700" cmpd="sng">
+                      <a:noFill/>
+                      <a:prstDash val="solid"/>
+                    </a:lnBlToTr>
+                  </a:tcPr>
+                </a:tc>
+                <a:tc>
+                  <a:txBody>
+                    <a:bodyPr/>
+                    <a:lstStyle/>
+                    <a:p>
+                      <a:pPr algn="r" fontAlgn="b">
+                        <a:defRPr sz="900">
+                          <a:solidFill>
+                            <a:srgbClr val="6B767D"/>
+                          </a:solidFill>
+                          <a:latin typeface="+mn-lt"/>
+                        </a:defRPr>
+                      </a:pPr>
+                      <a:endParaRPr sz="900" b="0" dirty="0"/>
+                    </a:p>
+                  </a:txBody>
+                  <a:tcPr marL="90000" marR="365760" marT="8095" marB="0" anchor="ctr">
                     <a:lnL>
                       <a:noFill/>
                     </a:lnL>
@@ -30703,7 +30753,7 @@
                     <a:bodyPr/>
                     <a:lstStyle/>
                     <a:p>
-                      <a:pPr algn="ctr" fontAlgn="b">
+                      <a:pPr algn="r" fontAlgn="b">
                         <a:defRPr sz="900">
                           <a:solidFill>
                             <a:srgbClr val="6B767D"/>
@@ -30714,7 +30764,7 @@
                       <a:endParaRPr sz="900" b="0"/>
                     </a:p>
                   </a:txBody>
-                  <a:tcPr marL="90000" marR="182880" marT="8095" marB="0" anchor="ctr">
+                  <a:tcPr marL="90000" marR="365760" marT="8095" marB="0" anchor="ctr">
                     <a:lnL>
                       <a:noFill/>
                     </a:lnL>
@@ -30742,7 +30792,7 @@
                     <a:bodyPr/>
                     <a:lstStyle/>
                     <a:p>
-                      <a:pPr algn="ctr" fontAlgn="b">
+                      <a:pPr algn="r" fontAlgn="b">
                         <a:defRPr sz="900">
                           <a:solidFill>
                             <a:srgbClr val="6B767D"/>
@@ -30753,7 +30803,7 @@
                       <a:endParaRPr sz="900" b="0"/>
                     </a:p>
                   </a:txBody>
-                  <a:tcPr marL="90000" marR="182880" marT="8095" marB="0" anchor="ctr">
+                  <a:tcPr marL="90000" marR="365760" marT="8095" marB="0" anchor="ctr">
                     <a:lnL>
                       <a:noFill/>
                     </a:lnL>
@@ -30781,7 +30831,7 @@
                     <a:bodyPr/>
                     <a:lstStyle/>
                     <a:p>
-                      <a:pPr algn="ctr" fontAlgn="b">
+                      <a:pPr algn="r" fontAlgn="b">
                         <a:defRPr sz="900">
                           <a:solidFill>
                             <a:srgbClr val="6B767D"/>
@@ -30792,7 +30842,7 @@
                       <a:endParaRPr sz="900" b="0"/>
                     </a:p>
                   </a:txBody>
-                  <a:tcPr marL="90000" marR="182880" marT="8095" marB="0" anchor="ctr">
+                  <a:tcPr marL="90000" marR="365760" marT="8095" marB="0" anchor="ctr">
                     <a:lnL>
                       <a:noFill/>
                     </a:lnL>
@@ -30820,7 +30870,7 @@
                     <a:bodyPr/>
                     <a:lstStyle/>
                     <a:p>
-                      <a:pPr algn="ctr" fontAlgn="b">
+                      <a:pPr algn="r" fontAlgn="b">
                         <a:defRPr sz="900">
                           <a:solidFill>
                             <a:srgbClr val="6B767D"/>
@@ -30831,7 +30881,7 @@
                       <a:endParaRPr sz="900" b="0"/>
                     </a:p>
                   </a:txBody>
-                  <a:tcPr marL="90000" marR="182880" marT="8095" marB="0" anchor="ctr">
+                  <a:tcPr marL="90000" marR="365760" marT="8095" marB="0" anchor="ctr">
                     <a:lnL>
                       <a:noFill/>
                     </a:lnL>
@@ -30859,46 +30909,7 @@
                     <a:bodyPr/>
                     <a:lstStyle/>
                     <a:p>
-                      <a:pPr algn="ctr" fontAlgn="b">
-                        <a:defRPr sz="900">
-                          <a:solidFill>
-                            <a:srgbClr val="6B767D"/>
-                          </a:solidFill>
-                          <a:latin typeface="+mn-lt"/>
-                        </a:defRPr>
-                      </a:pPr>
-                      <a:endParaRPr sz="900" b="0"/>
-                    </a:p>
-                  </a:txBody>
-                  <a:tcPr marL="90000" marR="182880" marT="8095" marB="0" anchor="ctr">
-                    <a:lnL>
-                      <a:noFill/>
-                    </a:lnL>
-                    <a:lnR>
-                      <a:noFill/>
-                    </a:lnR>
-                    <a:lnT w="12700" cmpd="sng">
-                      <a:noFill/>
-                    </a:lnT>
-                    <a:lnB w="12700" cmpd="sng">
-                      <a:noFill/>
-                    </a:lnB>
-                    <a:lnTlToBr w="12700" cmpd="sng">
-                      <a:noFill/>
-                      <a:prstDash val="solid"/>
-                    </a:lnTlToBr>
-                    <a:lnBlToTr w="12700" cmpd="sng">
-                      <a:noFill/>
-                      <a:prstDash val="solid"/>
-                    </a:lnBlToTr>
-                  </a:tcPr>
-                </a:tc>
-                <a:tc>
-                  <a:txBody>
-                    <a:bodyPr/>
-                    <a:lstStyle/>
-                    <a:p>
-                      <a:pPr algn="ctr" fontAlgn="b">
+                      <a:pPr algn="r" fontAlgn="b">
                         <a:defRPr sz="900">
                           <a:solidFill>
                             <a:srgbClr val="6B767D"/>
@@ -30909,7 +30920,46 @@
                       <a:endParaRPr sz="900" b="0" dirty="0"/>
                     </a:p>
                   </a:txBody>
-                  <a:tcPr marL="90000" marR="182880" marT="8095" marB="0" anchor="ctr">
+                  <a:tcPr marL="90000" marR="365760" marT="8095" marB="0" anchor="ctr">
+                    <a:lnL>
+                      <a:noFill/>
+                    </a:lnL>
+                    <a:lnR>
+                      <a:noFill/>
+                    </a:lnR>
+                    <a:lnT w="12700" cmpd="sng">
+                      <a:noFill/>
+                    </a:lnT>
+                    <a:lnB w="12700" cmpd="sng">
+                      <a:noFill/>
+                    </a:lnB>
+                    <a:lnTlToBr w="12700" cmpd="sng">
+                      <a:noFill/>
+                      <a:prstDash val="solid"/>
+                    </a:lnTlToBr>
+                    <a:lnBlToTr w="12700" cmpd="sng">
+                      <a:noFill/>
+                      <a:prstDash val="solid"/>
+                    </a:lnBlToTr>
+                  </a:tcPr>
+                </a:tc>
+                <a:tc>
+                  <a:txBody>
+                    <a:bodyPr/>
+                    <a:lstStyle/>
+                    <a:p>
+                      <a:pPr algn="r" fontAlgn="b">
+                        <a:defRPr sz="900">
+                          <a:solidFill>
+                            <a:srgbClr val="6B767D"/>
+                          </a:solidFill>
+                          <a:latin typeface="+mn-lt"/>
+                        </a:defRPr>
+                      </a:pPr>
+                      <a:endParaRPr sz="900" b="0" dirty="0"/>
+                    </a:p>
+                  </a:txBody>
+                  <a:tcPr marL="90000" marR="365760" marT="8095" marB="0" anchor="ctr">
                     <a:lnL>
                       <a:noFill/>
                     </a:lnL>
@@ -31028,7 +31078,7 @@
                     <a:bodyPr/>
                     <a:lstStyle/>
                     <a:p>
-                      <a:pPr algn="ctr" fontAlgn="b">
+                      <a:pPr algn="r" fontAlgn="b">
                         <a:defRPr sz="900">
                           <a:solidFill>
                             <a:srgbClr val="6B767D"/>
@@ -31039,7 +31089,7 @@
                       <a:endParaRPr sz="900" b="0"/>
                     </a:p>
                   </a:txBody>
-                  <a:tcPr marL="90000" marR="182880" marT="8095" marB="0" anchor="ctr">
+                  <a:tcPr marL="90000" marR="365760" marT="8095" marB="0" anchor="ctr">
                     <a:lnL>
                       <a:noFill/>
                     </a:lnL>
@@ -31067,7 +31117,7 @@
                     <a:bodyPr/>
                     <a:lstStyle/>
                     <a:p>
-                      <a:pPr algn="ctr" fontAlgn="b">
+                      <a:pPr algn="r" fontAlgn="b">
                         <a:defRPr sz="900">
                           <a:solidFill>
                             <a:srgbClr val="6B767D"/>
@@ -31078,7 +31128,7 @@
                       <a:endParaRPr sz="900" b="0"/>
                     </a:p>
                   </a:txBody>
-                  <a:tcPr marL="90000" marR="182880" marT="8095" marB="0" anchor="ctr">
+                  <a:tcPr marL="90000" marR="365760" marT="8095" marB="0" anchor="ctr">
                     <a:lnL>
                       <a:noFill/>
                     </a:lnL>
@@ -31106,7 +31156,7 @@
                     <a:bodyPr/>
                     <a:lstStyle/>
                     <a:p>
-                      <a:pPr algn="ctr" fontAlgn="b">
+                      <a:pPr algn="r" fontAlgn="b">
                         <a:defRPr sz="900">
                           <a:solidFill>
                             <a:srgbClr val="6B767D"/>
@@ -31117,7 +31167,7 @@
                       <a:endParaRPr sz="900" b="0"/>
                     </a:p>
                   </a:txBody>
-                  <a:tcPr marL="90000" marR="182880" marT="8095" marB="0" anchor="ctr">
+                  <a:tcPr marL="90000" marR="365760" marT="8095" marB="0" anchor="ctr">
                     <a:lnL>
                       <a:noFill/>
                     </a:lnL>
@@ -31145,7 +31195,7 @@
                     <a:bodyPr/>
                     <a:lstStyle/>
                     <a:p>
-                      <a:pPr algn="ctr" fontAlgn="b">
+                      <a:pPr algn="r" fontAlgn="b">
                         <a:defRPr sz="900">
                           <a:solidFill>
                             <a:srgbClr val="6B767D"/>
@@ -31156,7 +31206,7 @@
                       <a:endParaRPr sz="900" b="0"/>
                     </a:p>
                   </a:txBody>
-                  <a:tcPr marL="90000" marR="182880" marT="8095" marB="0" anchor="ctr">
+                  <a:tcPr marL="90000" marR="365760" marT="8095" marB="0" anchor="ctr">
                     <a:lnL>
                       <a:noFill/>
                     </a:lnL>
@@ -31184,7 +31234,7 @@
                     <a:bodyPr/>
                     <a:lstStyle/>
                     <a:p>
-                      <a:pPr algn="ctr" fontAlgn="b">
+                      <a:pPr algn="r" fontAlgn="b">
                         <a:defRPr sz="900">
                           <a:solidFill>
                             <a:srgbClr val="6B767D"/>
@@ -31195,7 +31245,7 @@
                       <a:endParaRPr sz="900" b="0"/>
                     </a:p>
                   </a:txBody>
-                  <a:tcPr marL="90000" marR="182880" marT="8095" marB="0" anchor="ctr">
+                  <a:tcPr marL="90000" marR="365760" marT="8095" marB="0" anchor="ctr">
                     <a:lnL>
                       <a:noFill/>
                     </a:lnL>
@@ -31223,7 +31273,7 @@
                     <a:bodyPr/>
                     <a:lstStyle/>
                     <a:p>
-                      <a:pPr algn="ctr" fontAlgn="b">
+                      <a:pPr algn="r" fontAlgn="b">
                         <a:defRPr sz="900">
                           <a:solidFill>
                             <a:srgbClr val="6B767D"/>
@@ -31234,7 +31284,7 @@
                       <a:endParaRPr sz="900" b="0" dirty="0"/>
                     </a:p>
                   </a:txBody>
-                  <a:tcPr marL="90000" marR="182880" marT="8095" marB="0" anchor="ctr">
+                  <a:tcPr marL="90000" marR="365760" marT="8095" marB="0" anchor="ctr">
                     <a:lnL>
                       <a:noFill/>
                     </a:lnL>
@@ -31532,14 +31582,14 @@
           <p:nvPr>
             <p:extLst>
               <p:ext uri="{D42A27DB-BD31-4B8C-83A1-F6EECF244321}">
-                <p14:modId xmlns:p14="http://schemas.microsoft.com/office/powerpoint/2010/main" val="2034704758"/>
+                <p14:modId xmlns:p14="http://schemas.microsoft.com/office/powerpoint/2010/main" val="1916141101"/>
               </p:ext>
             </p:extLst>
           </p:nvPr>
         </p:nvGraphicFramePr>
         <p:xfrm>
           <a:off x="587481" y="2649930"/>
-          <a:ext cx="4968257" cy="1418648"/>
+          <a:ext cx="4968257" cy="1555808"/>
         </p:xfrm>
         <a:graphic>
           <a:graphicData uri="http://schemas.openxmlformats.org/drawingml/2006/table">
@@ -31809,7 +31859,7 @@
                     <a:bodyPr/>
                     <a:lstStyle/>
                     <a:p>
-                      <a:pPr marL="0" algn="ctr" defTabSz="914400" rtl="0" eaLnBrk="1" fontAlgn="b" latinLnBrk="0" hangingPunct="1">
+                      <a:pPr marL="0" algn="r" defTabSz="914400" rtl="0" eaLnBrk="1" fontAlgn="b" latinLnBrk="0" hangingPunct="1">
                         <a:defRPr sz="900">
                           <a:solidFill>
                             <a:srgbClr val="6B767D"/>
@@ -31860,7 +31910,7 @@
                       </a:endParaRPr>
                     </a:p>
                   </a:txBody>
-                  <a:tcPr marL="90000" marR="182880" marT="8095" marB="0" anchor="ctr">
+                  <a:tcPr marL="90000" marR="457200" marT="8095" marB="0" anchor="ctr">
                     <a:lnL>
                       <a:noFill/>
                     </a:lnL>
@@ -31888,7 +31938,7 @@
                     <a:bodyPr/>
                     <a:lstStyle/>
                     <a:p>
-                      <a:pPr marL="0" algn="ctr" defTabSz="914400" rtl="0" eaLnBrk="1" fontAlgn="b" latinLnBrk="0" hangingPunct="1">
+                      <a:pPr marL="0" algn="r" defTabSz="914400" rtl="0" eaLnBrk="1" fontAlgn="b" latinLnBrk="0" hangingPunct="1">
                         <a:defRPr sz="900">
                           <a:solidFill>
                             <a:srgbClr val="6B767D"/>
@@ -31927,7 +31977,7 @@
                           <a:ea typeface="+mn-ea"/>
                           <a:cs typeface="+mn-cs"/>
                         </a:rPr>
-                        <a:t>--activity_counts_quarterly_summary.csv[3]}}</a:t>
+                        <a:t>--activity_counts_quarterly_summary.csv[4]}}</a:t>
                       </a:r>
                       <a:endParaRPr sz="900" b="0" kern="1200" dirty="0">
                         <a:solidFill>
@@ -31939,7 +31989,7 @@
                       </a:endParaRPr>
                     </a:p>
                   </a:txBody>
-                  <a:tcPr marL="90000" marR="182880" marT="8095" marB="0" anchor="ctr">
+                  <a:tcPr marL="90000" marR="457200" marT="8095" marB="0" anchor="ctr">
                     <a:lnL>
                       <a:noFill/>
                     </a:lnL>
@@ -32019,7 +32069,7 @@
                     <a:bodyPr/>
                     <a:lstStyle/>
                     <a:p>
-                      <a:pPr algn="ctr" fontAlgn="b">
+                      <a:pPr algn="r" fontAlgn="b">
                         <a:defRPr sz="900">
                           <a:solidFill>
                             <a:srgbClr val="6B767D"/>
@@ -32030,7 +32080,7 @@
                       <a:endParaRPr sz="900" b="0" dirty="0"/>
                     </a:p>
                   </a:txBody>
-                  <a:tcPr marL="90000" marR="182880" marT="8095" marB="0" anchor="ctr">
+                  <a:tcPr marL="90000" marR="457200" marT="8095" marB="0" anchor="ctr">
                     <a:lnL>
                       <a:noFill/>
                     </a:lnL>
@@ -32058,7 +32108,7 @@
                     <a:bodyPr/>
                     <a:lstStyle/>
                     <a:p>
-                      <a:pPr algn="ctr" fontAlgn="b">
+                      <a:pPr algn="r" fontAlgn="b">
                         <a:defRPr sz="900">
                           <a:solidFill>
                             <a:srgbClr val="6B767D"/>
@@ -32069,7 +32119,7 @@
                       <a:endParaRPr sz="900" b="0" dirty="0"/>
                     </a:p>
                   </a:txBody>
-                  <a:tcPr marL="90000" marR="182880" marT="8095" marB="0" anchor="ctr">
+                  <a:tcPr marL="90000" marR="457200" marT="8095" marB="0" anchor="ctr">
                     <a:lnL>
                       <a:noFill/>
                     </a:lnL>
@@ -32149,7 +32199,7 @@
                     <a:bodyPr/>
                     <a:lstStyle/>
                     <a:p>
-                      <a:pPr algn="ctr" fontAlgn="b">
+                      <a:pPr algn="r" fontAlgn="b">
                         <a:defRPr sz="900">
                           <a:solidFill>
                             <a:srgbClr val="6B767D"/>
@@ -32160,7 +32210,7 @@
                       <a:endParaRPr sz="900" b="0"/>
                     </a:p>
                   </a:txBody>
-                  <a:tcPr marL="90000" marR="182880" marT="8095" marB="0" anchor="ctr">
+                  <a:tcPr marL="90000" marR="457200" marT="8095" marB="0" anchor="ctr">
                     <a:lnL>
                       <a:noFill/>
                     </a:lnL>
@@ -32188,7 +32238,7 @@
                     <a:bodyPr/>
                     <a:lstStyle/>
                     <a:p>
-                      <a:pPr algn="ctr" fontAlgn="b">
+                      <a:pPr algn="r" fontAlgn="b">
                         <a:defRPr sz="900">
                           <a:solidFill>
                             <a:srgbClr val="6B767D"/>
@@ -32199,7 +32249,7 @@
                       <a:endParaRPr sz="900" b="0" dirty="0"/>
                     </a:p>
                   </a:txBody>
-                  <a:tcPr marL="90000" marR="182880" marT="8095" marB="0" anchor="ctr">
+                  <a:tcPr marL="90000" marR="457200" marT="8095" marB="0" anchor="ctr">
                     <a:lnL>
                       <a:noFill/>
                     </a:lnL>
@@ -32279,7 +32329,7 @@
                     <a:bodyPr/>
                     <a:lstStyle/>
                     <a:p>
-                      <a:pPr algn="ctr" fontAlgn="b">
+                      <a:pPr algn="r" fontAlgn="b">
                         <a:defRPr sz="900">
                           <a:solidFill>
                             <a:srgbClr val="6B767D"/>
@@ -32290,7 +32340,7 @@
                       <a:endParaRPr sz="900" b="0"/>
                     </a:p>
                   </a:txBody>
-                  <a:tcPr marL="90000" marR="182880" marT="8095" marB="0" anchor="ctr">
+                  <a:tcPr marL="90000" marR="457200" marT="8095" marB="0" anchor="ctr">
                     <a:lnL>
                       <a:noFill/>
                     </a:lnL>
@@ -32318,7 +32368,7 @@
                     <a:bodyPr/>
                     <a:lstStyle/>
                     <a:p>
-                      <a:pPr algn="ctr" fontAlgn="b">
+                      <a:pPr algn="r" fontAlgn="b">
                         <a:defRPr sz="900">
                           <a:solidFill>
                             <a:srgbClr val="6B767D"/>
@@ -32329,7 +32379,7 @@
                       <a:endParaRPr sz="900" b="0" dirty="0"/>
                     </a:p>
                   </a:txBody>
-                  <a:tcPr marL="90000" marR="182880" marT="8095" marB="0" anchor="ctr">
+                  <a:tcPr marL="90000" marR="457200" marT="8095" marB="0" anchor="ctr">
                     <a:lnL>
                       <a:noFill/>
                     </a:lnL>
@@ -32774,14 +32824,14 @@
           <p:nvPr>
             <p:extLst>
               <p:ext uri="{D42A27DB-BD31-4B8C-83A1-F6EECF244321}">
-                <p14:modId xmlns:p14="http://schemas.microsoft.com/office/powerpoint/2010/main" val="3940334898"/>
+                <p14:modId xmlns:p14="http://schemas.microsoft.com/office/powerpoint/2010/main" val="1730602250"/>
               </p:ext>
             </p:extLst>
           </p:nvPr>
         </p:nvGraphicFramePr>
         <p:xfrm>
           <a:off x="2644881" y="1060704"/>
-          <a:ext cx="6400800" cy="2569846"/>
+          <a:ext cx="6400800" cy="2707006"/>
         </p:xfrm>
         <a:graphic>
           <a:graphicData uri="http://schemas.openxmlformats.org/drawingml/2006/table">
@@ -33107,7 +33157,7 @@
                     <a:bodyPr/>
                     <a:lstStyle/>
                     <a:p>
-                      <a:pPr marL="0" algn="ctr" defTabSz="914400" rtl="0" eaLnBrk="1" fontAlgn="b" latinLnBrk="0" hangingPunct="1">
+                      <a:pPr marL="0" algn="r" defTabSz="914400" rtl="0" eaLnBrk="1" fontAlgn="b" latinLnBrk="0" hangingPunct="1">
                         <a:defRPr sz="900">
                           <a:solidFill>
                             <a:srgbClr val="6B767D"/>
@@ -33158,7 +33208,7 @@
                       </a:endParaRPr>
                     </a:p>
                   </a:txBody>
-                  <a:tcPr marL="90000" marR="182880" marT="8095" marB="0" anchor="ctr">
+                  <a:tcPr marL="90000" marR="457200" marT="8095" marB="0" anchor="ctr">
                     <a:lnL>
                       <a:noFill/>
                     </a:lnL>
@@ -33186,86 +33236,7 @@
                     <a:bodyPr/>
                     <a:lstStyle/>
                     <a:p>
-                      <a:pPr marL="0" algn="ctr" defTabSz="914400" rtl="0" eaLnBrk="1" fontAlgn="b" latinLnBrk="0" hangingPunct="1">
-                        <a:defRPr sz="900">
-                          <a:solidFill>
-                            <a:srgbClr val="6B767D"/>
-                          </a:solidFill>
-                          <a:latin typeface="+mn-lt"/>
-                        </a:defRPr>
-                      </a:pPr>
-                      <a:r>
-                        <a:rPr lang="en-GB" sz="900" b="0" kern="1200" dirty="0">
-                          <a:solidFill>
-                            <a:srgbClr val="6B767D"/>
-                          </a:solidFill>
-                          <a:latin typeface="+mn-lt"/>
-                          <a:ea typeface="+mn-ea"/>
-                          <a:cs typeface="+mn-cs"/>
-                        </a:rPr>
-                        <a:t>{{</a:t>
-                      </a:r>
-                      <a:r>
-                        <a:rPr lang="en-GB" sz="900" b="0" kern="1200" dirty="0" err="1">
-                          <a:solidFill>
-                            <a:srgbClr val="6B767D"/>
-                          </a:solidFill>
-                          <a:latin typeface="+mn-lt"/>
-                          <a:ea typeface="+mn-ea"/>
-                          <a:cs typeface="+mn-cs"/>
-                        </a:rPr>
-                        <a:t>col:vhc</a:t>
-                      </a:r>
-                      <a:r>
-                        <a:rPr lang="en-GB" sz="900" b="0" kern="1200" dirty="0">
-                          <a:solidFill>
-                            <a:srgbClr val="6B767D"/>
-                          </a:solidFill>
-                          <a:latin typeface="+mn-lt"/>
-                          <a:ea typeface="+mn-ea"/>
-                          <a:cs typeface="+mn-cs"/>
-                        </a:rPr>
-                        <a:t>--diskspace_monthly_Summary.csv[3]}}</a:t>
-                      </a:r>
-                      <a:endParaRPr sz="900" b="0" kern="1200" dirty="0">
-                        <a:solidFill>
-                          <a:srgbClr val="6B767D"/>
-                        </a:solidFill>
-                        <a:latin typeface="+mn-lt"/>
-                        <a:ea typeface="+mn-ea"/>
-                        <a:cs typeface="+mn-cs"/>
-                      </a:endParaRPr>
-                    </a:p>
-                  </a:txBody>
-                  <a:tcPr marL="90000" marR="182880" marT="8095" marB="0" anchor="ctr">
-                    <a:lnL>
-                      <a:noFill/>
-                    </a:lnL>
-                    <a:lnR>
-                      <a:noFill/>
-                    </a:lnR>
-                    <a:lnT w="12700" cmpd="sng">
-                      <a:noFill/>
-                    </a:lnT>
-                    <a:lnB w="12700" cmpd="sng">
-                      <a:noFill/>
-                    </a:lnB>
-                    <a:lnTlToBr w="12700" cmpd="sng">
-                      <a:noFill/>
-                      <a:prstDash val="solid"/>
-                    </a:lnTlToBr>
-                    <a:lnBlToTr w="12700" cmpd="sng">
-                      <a:noFill/>
-                      <a:prstDash val="solid"/>
-                    </a:lnBlToTr>
-                  </a:tcPr>
-                </a:tc>
-                <a:tc>
-                  <a:txBody>
-                    <a:bodyPr/>
-                    <a:lstStyle/>
-                    <a:p>
-                      <a:pPr marL="0" algn="ctr" defTabSz="914400" rtl="0" eaLnBrk="1" fontAlgn="b" latinLnBrk="0" hangingPunct="1">
+                      <a:pPr marL="0" algn="r" defTabSz="914400" rtl="0" eaLnBrk="1" fontAlgn="b" latinLnBrk="0" hangingPunct="1">
                         <a:defRPr sz="900">
                           <a:solidFill>
                             <a:srgbClr val="6B767D"/>
@@ -33316,7 +33287,86 @@
                       </a:endParaRPr>
                     </a:p>
                   </a:txBody>
-                  <a:tcPr marL="90000" marR="182880" marT="8095" marB="0" anchor="ctr">
+                  <a:tcPr marL="90000" marR="457200" marT="8095" marB="0" anchor="ctr">
+                    <a:lnL>
+                      <a:noFill/>
+                    </a:lnL>
+                    <a:lnR>
+                      <a:noFill/>
+                    </a:lnR>
+                    <a:lnT w="12700" cmpd="sng">
+                      <a:noFill/>
+                    </a:lnT>
+                    <a:lnB w="12700" cmpd="sng">
+                      <a:noFill/>
+                    </a:lnB>
+                    <a:lnTlToBr w="12700" cmpd="sng">
+                      <a:noFill/>
+                      <a:prstDash val="solid"/>
+                    </a:lnTlToBr>
+                    <a:lnBlToTr w="12700" cmpd="sng">
+                      <a:noFill/>
+                      <a:prstDash val="solid"/>
+                    </a:lnBlToTr>
+                  </a:tcPr>
+                </a:tc>
+                <a:tc>
+                  <a:txBody>
+                    <a:bodyPr/>
+                    <a:lstStyle/>
+                    <a:p>
+                      <a:pPr marL="0" algn="r" defTabSz="914400" rtl="0" eaLnBrk="1" fontAlgn="b" latinLnBrk="0" hangingPunct="1">
+                        <a:defRPr sz="900">
+                          <a:solidFill>
+                            <a:srgbClr val="6B767D"/>
+                          </a:solidFill>
+                          <a:latin typeface="+mn-lt"/>
+                        </a:defRPr>
+                      </a:pPr>
+                      <a:r>
+                        <a:rPr lang="en-GB" sz="900" b="0" kern="1200" dirty="0">
+                          <a:solidFill>
+                            <a:srgbClr val="6B767D"/>
+                          </a:solidFill>
+                          <a:latin typeface="+mn-lt"/>
+                          <a:ea typeface="+mn-ea"/>
+                          <a:cs typeface="+mn-cs"/>
+                        </a:rPr>
+                        <a:t>{{</a:t>
+                      </a:r>
+                      <a:r>
+                        <a:rPr lang="en-GB" sz="900" b="0" kern="1200" dirty="0" err="1">
+                          <a:solidFill>
+                            <a:srgbClr val="6B767D"/>
+                          </a:solidFill>
+                          <a:latin typeface="+mn-lt"/>
+                          <a:ea typeface="+mn-ea"/>
+                          <a:cs typeface="+mn-cs"/>
+                        </a:rPr>
+                        <a:t>col:vhc</a:t>
+                      </a:r>
+                      <a:r>
+                        <a:rPr lang="en-GB" sz="900" b="0" kern="1200" dirty="0">
+                          <a:solidFill>
+                            <a:srgbClr val="6B767D"/>
+                          </a:solidFill>
+                          <a:latin typeface="+mn-lt"/>
+                          <a:ea typeface="+mn-ea"/>
+                          <a:cs typeface="+mn-cs"/>
+                        </a:rPr>
+                        <a:t>--diskspace_monthly_Summary.csv[6]}}</a:t>
+                      </a:r>
+                      <a:endParaRPr sz="900" b="0" kern="1200" dirty="0">
+                        <a:solidFill>
+                          <a:srgbClr val="6B767D"/>
+                        </a:solidFill>
+                        <a:latin typeface="+mn-lt"/>
+                        <a:ea typeface="+mn-ea"/>
+                        <a:cs typeface="+mn-cs"/>
+                      </a:endParaRPr>
+                    </a:p>
+                  </a:txBody>
+                  <a:tcPr marL="90000" marR="457200" marT="8095" marB="0" anchor="ctr">
                     <a:lnL>
                       <a:noFill/>
                     </a:lnL>
@@ -33396,7 +33446,46 @@
                     <a:bodyPr/>
                     <a:lstStyle/>
                     <a:p>
-                      <a:pPr algn="ctr" fontAlgn="b">
+                      <a:pPr algn="r" fontAlgn="b">
+                        <a:defRPr sz="900">
+                          <a:solidFill>
+                            <a:srgbClr val="6B767D"/>
+                          </a:solidFill>
+                          <a:latin typeface="+mn-lt"/>
+                        </a:defRPr>
+                      </a:pPr>
+                      <a:endParaRPr sz="900" b="0" dirty="0"/>
+                    </a:p>
+                  </a:txBody>
+                  <a:tcPr marL="90000" marR="457200" marT="8095" marB="0" anchor="ctr">
+                    <a:lnL>
+                      <a:noFill/>
+                    </a:lnL>
+                    <a:lnR>
+                      <a:noFill/>
+                    </a:lnR>
+                    <a:lnT w="12700" cmpd="sng">
+                      <a:noFill/>
+                    </a:lnT>
+                    <a:lnB w="12700" cmpd="sng">
+                      <a:noFill/>
+                    </a:lnB>
+                    <a:lnTlToBr w="12700" cmpd="sng">
+                      <a:noFill/>
+                      <a:prstDash val="solid"/>
+                    </a:lnTlToBr>
+                    <a:lnBlToTr w="12700" cmpd="sng">
+                      <a:noFill/>
+                      <a:prstDash val="solid"/>
+                    </a:lnBlToTr>
+                  </a:tcPr>
+                </a:tc>
+                <a:tc>
+                  <a:txBody>
+                    <a:bodyPr/>
+                    <a:lstStyle/>
+                    <a:p>
+                      <a:pPr algn="r" fontAlgn="b">
                         <a:defRPr sz="900">
                           <a:solidFill>
                             <a:srgbClr val="6B767D"/>
@@ -33407,7 +33496,7 @@
                       <a:endParaRPr sz="900" b="0"/>
                     </a:p>
                   </a:txBody>
-                  <a:tcPr marL="90000" marR="182880" marT="8095" marB="0" anchor="ctr">
+                  <a:tcPr marL="90000" marR="457200" marT="8095" marB="0" anchor="ctr">
                     <a:lnL>
                       <a:noFill/>
                     </a:lnL>
@@ -33435,7 +33524,7 @@
                     <a:bodyPr/>
                     <a:lstStyle/>
                     <a:p>
-                      <a:pPr algn="ctr" fontAlgn="b">
+                      <a:pPr algn="r" fontAlgn="b">
                         <a:defRPr sz="900">
                           <a:solidFill>
                             <a:srgbClr val="6B767D"/>
@@ -33446,46 +33535,7 @@
                       <a:endParaRPr sz="900" b="0"/>
                     </a:p>
                   </a:txBody>
-                  <a:tcPr marL="90000" marR="182880" marT="8095" marB="0" anchor="ctr">
-                    <a:lnL>
-                      <a:noFill/>
-                    </a:lnL>
-                    <a:lnR>
-                      <a:noFill/>
-                    </a:lnR>
-                    <a:lnT w="12700" cmpd="sng">
-                      <a:noFill/>
-                    </a:lnT>
-                    <a:lnB w="12700" cmpd="sng">
-                      <a:noFill/>
-                    </a:lnB>
-                    <a:lnTlToBr w="12700" cmpd="sng">
-                      <a:noFill/>
-                      <a:prstDash val="solid"/>
-                    </a:lnTlToBr>
-                    <a:lnBlToTr w="12700" cmpd="sng">
-                      <a:noFill/>
-                      <a:prstDash val="solid"/>
-                    </a:lnBlToTr>
-                  </a:tcPr>
-                </a:tc>
-                <a:tc>
-                  <a:txBody>
-                    <a:bodyPr/>
-                    <a:lstStyle/>
-                    <a:p>
-                      <a:pPr algn="ctr" fontAlgn="b">
-                        <a:defRPr sz="900">
-                          <a:solidFill>
-                            <a:srgbClr val="6B767D"/>
-                          </a:solidFill>
-                          <a:latin typeface="+mn-lt"/>
-                        </a:defRPr>
-                      </a:pPr>
-                      <a:endParaRPr sz="900" b="0"/>
-                    </a:p>
-                  </a:txBody>
-                  <a:tcPr marL="90000" marR="182880" marT="8095" marB="0" anchor="ctr">
+                  <a:tcPr marL="90000" marR="457200" marT="8095" marB="0" anchor="ctr">
                     <a:lnL>
                       <a:noFill/>
                     </a:lnL>
@@ -33565,7 +33615,7 @@
                     <a:bodyPr/>
                     <a:lstStyle/>
                     <a:p>
-                      <a:pPr algn="ctr" fontAlgn="b">
+                      <a:pPr algn="r" fontAlgn="b">
                         <a:defRPr sz="900">
                           <a:solidFill>
                             <a:srgbClr val="6B767D"/>
@@ -33576,7 +33626,7 @@
                       <a:endParaRPr sz="900" b="0"/>
                     </a:p>
                   </a:txBody>
-                  <a:tcPr marL="90000" marR="182880" marT="8095" marB="0" anchor="ctr">
+                  <a:tcPr marL="90000" marR="457200" marT="8095" marB="0" anchor="ctr">
                     <a:lnL>
                       <a:noFill/>
                     </a:lnL>
@@ -33604,7 +33654,7 @@
                     <a:bodyPr/>
                     <a:lstStyle/>
                     <a:p>
-                      <a:pPr algn="ctr" fontAlgn="b">
+                      <a:pPr algn="r" fontAlgn="b">
                         <a:defRPr sz="900">
                           <a:solidFill>
                             <a:srgbClr val="6B767D"/>
@@ -33615,7 +33665,7 @@
                       <a:endParaRPr sz="900" b="0"/>
                     </a:p>
                   </a:txBody>
-                  <a:tcPr marL="90000" marR="182880" marT="8095" marB="0" anchor="ctr">
+                  <a:tcPr marL="90000" marR="457200" marT="8095" marB="0" anchor="ctr">
                     <a:lnL>
                       <a:noFill/>
                     </a:lnL>
@@ -33643,7 +33693,7 @@
                     <a:bodyPr/>
                     <a:lstStyle/>
                     <a:p>
-                      <a:pPr algn="ctr" fontAlgn="b">
+                      <a:pPr algn="r" fontAlgn="b">
                         <a:defRPr sz="900">
                           <a:solidFill>
                             <a:srgbClr val="6B767D"/>
@@ -33654,7 +33704,7 @@
                       <a:endParaRPr sz="900" b="0"/>
                     </a:p>
                   </a:txBody>
-                  <a:tcPr marL="90000" marR="182880" marT="8095" marB="0" anchor="ctr">
+                  <a:tcPr marL="90000" marR="457200" marT="8095" marB="0" anchor="ctr">
                     <a:lnL>
                       <a:noFill/>
                     </a:lnL>
@@ -33734,7 +33784,7 @@
                     <a:bodyPr/>
                     <a:lstStyle/>
                     <a:p>
-                      <a:pPr algn="ctr" fontAlgn="b">
+                      <a:pPr algn="r" fontAlgn="b">
                         <a:defRPr sz="900">
                           <a:solidFill>
                             <a:srgbClr val="6B767D"/>
@@ -33745,7 +33795,7 @@
                       <a:endParaRPr sz="900" b="0"/>
                     </a:p>
                   </a:txBody>
-                  <a:tcPr marL="90000" marR="182880" marT="8095" marB="0" anchor="ctr">
+                  <a:tcPr marL="90000" marR="457200" marT="8095" marB="0" anchor="ctr">
                     <a:lnL>
                       <a:noFill/>
                     </a:lnL>
@@ -33773,7 +33823,46 @@
                     <a:bodyPr/>
                     <a:lstStyle/>
                     <a:p>
-                      <a:pPr algn="ctr" fontAlgn="b">
+                      <a:pPr algn="r" fontAlgn="b">
+                        <a:defRPr sz="900">
+                          <a:solidFill>
+                            <a:srgbClr val="6B767D"/>
+                          </a:solidFill>
+                          <a:latin typeface="+mn-lt"/>
+                        </a:defRPr>
+                      </a:pPr>
+                      <a:endParaRPr sz="900" b="0" dirty="0"/>
+                    </a:p>
+                  </a:txBody>
+                  <a:tcPr marL="90000" marR="457200" marT="8095" marB="0" anchor="ctr">
+                    <a:lnL>
+                      <a:noFill/>
+                    </a:lnL>
+                    <a:lnR>
+                      <a:noFill/>
+                    </a:lnR>
+                    <a:lnT w="12700" cmpd="sng">
+                      <a:noFill/>
+                    </a:lnT>
+                    <a:lnB w="12700" cmpd="sng">
+                      <a:noFill/>
+                    </a:lnB>
+                    <a:lnTlToBr w="12700" cmpd="sng">
+                      <a:noFill/>
+                      <a:prstDash val="solid"/>
+                    </a:lnTlToBr>
+                    <a:lnBlToTr w="12700" cmpd="sng">
+                      <a:noFill/>
+                      <a:prstDash val="solid"/>
+                    </a:lnBlToTr>
+                  </a:tcPr>
+                </a:tc>
+                <a:tc>
+                  <a:txBody>
+                    <a:bodyPr/>
+                    <a:lstStyle/>
+                    <a:p>
+                      <a:pPr algn="r" fontAlgn="b">
                         <a:defRPr sz="900">
                           <a:solidFill>
                             <a:srgbClr val="6B767D"/>
@@ -33784,46 +33873,7 @@
                       <a:endParaRPr sz="900" b="0"/>
                     </a:p>
                   </a:txBody>
-                  <a:tcPr marL="90000" marR="182880" marT="8095" marB="0" anchor="ctr">
-                    <a:lnL>
-                      <a:noFill/>
-                    </a:lnL>
-                    <a:lnR>
-                      <a:noFill/>
-                    </a:lnR>
-                    <a:lnT w="12700" cmpd="sng">
-                      <a:noFill/>
-                    </a:lnT>
-                    <a:lnB w="12700" cmpd="sng">
-                      <a:noFill/>
-                    </a:lnB>
-                    <a:lnTlToBr w="12700" cmpd="sng">
-                      <a:noFill/>
-                      <a:prstDash val="solid"/>
-                    </a:lnTlToBr>
-                    <a:lnBlToTr w="12700" cmpd="sng">
-                      <a:noFill/>
-                      <a:prstDash val="solid"/>
-                    </a:lnBlToTr>
-                  </a:tcPr>
-                </a:tc>
-                <a:tc>
-                  <a:txBody>
-                    <a:bodyPr/>
-                    <a:lstStyle/>
-                    <a:p>
-                      <a:pPr algn="ctr" fontAlgn="b">
-                        <a:defRPr sz="900">
-                          <a:solidFill>
-                            <a:srgbClr val="6B767D"/>
-                          </a:solidFill>
-                          <a:latin typeface="+mn-lt"/>
-                        </a:defRPr>
-                      </a:pPr>
-                      <a:endParaRPr sz="900" b="0"/>
-                    </a:p>
-                  </a:txBody>
-                  <a:tcPr marL="90000" marR="182880" marT="8095" marB="0" anchor="ctr">
+                  <a:tcPr marL="90000" marR="457200" marT="8095" marB="0" anchor="ctr">
                     <a:lnL>
                       <a:noFill/>
                     </a:lnL>
@@ -33903,7 +33953,7 @@
                     <a:bodyPr/>
                     <a:lstStyle/>
                     <a:p>
-                      <a:pPr algn="ctr" fontAlgn="b">
+                      <a:pPr algn="r" fontAlgn="b">
                         <a:defRPr sz="900">
                           <a:solidFill>
                             <a:srgbClr val="6B767D"/>
@@ -33914,7 +33964,7 @@
                       <a:endParaRPr sz="900" b="0"/>
                     </a:p>
                   </a:txBody>
-                  <a:tcPr marL="90000" marR="182880" marT="8095" marB="0" anchor="ctr">
+                  <a:tcPr marL="90000" marR="457200" marT="8095" marB="0" anchor="ctr">
                     <a:lnL>
                       <a:noFill/>
                     </a:lnL>
@@ -33942,7 +33992,7 @@
                     <a:bodyPr/>
                     <a:lstStyle/>
                     <a:p>
-                      <a:pPr algn="ctr" fontAlgn="b">
+                      <a:pPr algn="r" fontAlgn="b">
                         <a:defRPr sz="900">
                           <a:solidFill>
                             <a:srgbClr val="6B767D"/>
@@ -33953,7 +34003,7 @@
                       <a:endParaRPr sz="900" b="0"/>
                     </a:p>
                   </a:txBody>
-                  <a:tcPr marL="90000" marR="182880" marT="8095" marB="0" anchor="ctr">
+                  <a:tcPr marL="90000" marR="457200" marT="8095" marB="0" anchor="ctr">
                     <a:lnL>
                       <a:noFill/>
                     </a:lnL>
@@ -33981,7 +34031,7 @@
                     <a:bodyPr/>
                     <a:lstStyle/>
                     <a:p>
-                      <a:pPr algn="ctr" fontAlgn="b">
+                      <a:pPr algn="r" fontAlgn="b">
                         <a:defRPr sz="900">
                           <a:solidFill>
                             <a:srgbClr val="6B767D"/>
@@ -33992,7 +34042,7 @@
                       <a:endParaRPr sz="900" b="0"/>
                     </a:p>
                   </a:txBody>
-                  <a:tcPr marL="90000" marR="182880" marT="8095" marB="0" anchor="ctr">
+                  <a:tcPr marL="90000" marR="457200" marT="8095" marB="0" anchor="ctr">
                     <a:lnL>
                       <a:noFill/>
                     </a:lnL>
@@ -34072,7 +34122,85 @@
                     <a:bodyPr/>
                     <a:lstStyle/>
                     <a:p>
-                      <a:pPr algn="ctr" fontAlgn="b">
+                      <a:pPr algn="r" fontAlgn="b">
+                        <a:defRPr sz="900">
+                          <a:solidFill>
+                            <a:srgbClr val="6B767D"/>
+                          </a:solidFill>
+                          <a:latin typeface="+mn-lt"/>
+                        </a:defRPr>
+                      </a:pPr>
+                      <a:endParaRPr sz="900" b="0" dirty="0"/>
+                    </a:p>
+                  </a:txBody>
+                  <a:tcPr marL="90000" marR="457200" marT="8095" marB="0" anchor="ctr">
+                    <a:lnL>
+                      <a:noFill/>
+                    </a:lnL>
+                    <a:lnR>
+                      <a:noFill/>
+                    </a:lnR>
+                    <a:lnT w="12700" cmpd="sng">
+                      <a:noFill/>
+                    </a:lnT>
+                    <a:lnB w="12700" cmpd="sng">
+                      <a:noFill/>
+                    </a:lnB>
+                    <a:lnTlToBr w="12700" cmpd="sng">
+                      <a:noFill/>
+                      <a:prstDash val="solid"/>
+                    </a:lnTlToBr>
+                    <a:lnBlToTr w="12700" cmpd="sng">
+                      <a:noFill/>
+                      <a:prstDash val="solid"/>
+                    </a:lnBlToTr>
+                  </a:tcPr>
+                </a:tc>
+                <a:tc>
+                  <a:txBody>
+                    <a:bodyPr/>
+                    <a:lstStyle/>
+                    <a:p>
+                      <a:pPr algn="r" fontAlgn="b">
+                        <a:defRPr sz="900">
+                          <a:solidFill>
+                            <a:srgbClr val="6B767D"/>
+                          </a:solidFill>
+                          <a:latin typeface="+mn-lt"/>
+                        </a:defRPr>
+                      </a:pPr>
+                      <a:endParaRPr sz="900" b="0" dirty="0"/>
+                    </a:p>
+                  </a:txBody>
+                  <a:tcPr marL="90000" marR="457200" marT="8095" marB="0" anchor="ctr">
+                    <a:lnL>
+                      <a:noFill/>
+                    </a:lnL>
+                    <a:lnR>
+                      <a:noFill/>
+                    </a:lnR>
+                    <a:lnT w="12700" cmpd="sng">
+                      <a:noFill/>
+                    </a:lnT>
+                    <a:lnB w="12700" cmpd="sng">
+                      <a:noFill/>
+                    </a:lnB>
+                    <a:lnTlToBr w="12700" cmpd="sng">
+                      <a:noFill/>
+                      <a:prstDash val="solid"/>
+                    </a:lnTlToBr>
+                    <a:lnBlToTr w="12700" cmpd="sng">
+                      <a:noFill/>
+                      <a:prstDash val="solid"/>
+                    </a:lnBlToTr>
+                  </a:tcPr>
+                </a:tc>
+                <a:tc>
+                  <a:txBody>
+                    <a:bodyPr/>
+                    <a:lstStyle/>
+                    <a:p>
+                      <a:pPr algn="r" fontAlgn="b">
                         <a:defRPr sz="900">
                           <a:solidFill>
                             <a:srgbClr val="6B767D"/>
@@ -34083,85 +34211,7 @@
                       <a:endParaRPr sz="900" b="0"/>
                     </a:p>
                   </a:txBody>
-                  <a:tcPr marL="90000" marR="182880" marT="8095" marB="0" anchor="ctr">
-                    <a:lnL>
-                      <a:noFill/>
-                    </a:lnL>
-                    <a:lnR>
-                      <a:noFill/>
-                    </a:lnR>
-                    <a:lnT w="12700" cmpd="sng">
-                      <a:noFill/>
-                    </a:lnT>
-                    <a:lnB w="12700" cmpd="sng">
-                      <a:noFill/>
-                    </a:lnB>
-                    <a:lnTlToBr w="12700" cmpd="sng">
-                      <a:noFill/>
-                      <a:prstDash val="solid"/>
-                    </a:lnTlToBr>
-                    <a:lnBlToTr w="12700" cmpd="sng">
-                      <a:noFill/>
-                      <a:prstDash val="solid"/>
-                    </a:lnBlToTr>
-                  </a:tcPr>
-                </a:tc>
-                <a:tc>
-                  <a:txBody>
-                    <a:bodyPr/>
-                    <a:lstStyle/>
-                    <a:p>
-                      <a:pPr algn="ctr" fontAlgn="b">
-                        <a:defRPr sz="900">
-                          <a:solidFill>
-                            <a:srgbClr val="6B767D"/>
-                          </a:solidFill>
-                          <a:latin typeface="+mn-lt"/>
-                        </a:defRPr>
-                      </a:pPr>
-                      <a:endParaRPr sz="900" b="0"/>
-                    </a:p>
-                  </a:txBody>
-                  <a:tcPr marL="90000" marR="182880" marT="8095" marB="0" anchor="ctr">
-                    <a:lnL>
-                      <a:noFill/>
-                    </a:lnL>
-                    <a:lnR>
-                      <a:noFill/>
-                    </a:lnR>
-                    <a:lnT w="12700" cmpd="sng">
-                      <a:noFill/>
-                    </a:lnT>
-                    <a:lnB w="12700" cmpd="sng">
-                      <a:noFill/>
-                    </a:lnB>
-                    <a:lnTlToBr w="12700" cmpd="sng">
-                      <a:noFill/>
-                      <a:prstDash val="solid"/>
-                    </a:lnTlToBr>
-                    <a:lnBlToTr w="12700" cmpd="sng">
-                      <a:noFill/>
-                      <a:prstDash val="solid"/>
-                    </a:lnBlToTr>
-                  </a:tcPr>
-                </a:tc>
-                <a:tc>
-                  <a:txBody>
-                    <a:bodyPr/>
-                    <a:lstStyle/>
-                    <a:p>
-                      <a:pPr algn="ctr" fontAlgn="b">
-                        <a:defRPr sz="900">
-                          <a:solidFill>
-                            <a:srgbClr val="6B767D"/>
-                          </a:solidFill>
-                          <a:latin typeface="+mn-lt"/>
-                        </a:defRPr>
-                      </a:pPr>
-                      <a:endParaRPr sz="900" b="0"/>
-                    </a:p>
-                  </a:txBody>
-                  <a:tcPr marL="90000" marR="182880" marT="8095" marB="0" anchor="ctr">
+                  <a:tcPr marL="90000" marR="457200" marT="8095" marB="0" anchor="ctr">
                     <a:lnL>
                       <a:noFill/>
                     </a:lnL>
@@ -34241,7 +34291,7 @@
                     <a:bodyPr/>
                     <a:lstStyle/>
                     <a:p>
-                      <a:pPr algn="ctr" fontAlgn="b">
+                      <a:pPr algn="r" fontAlgn="b">
                         <a:defRPr sz="900">
                           <a:solidFill>
                             <a:srgbClr val="6B767D"/>
@@ -34252,7 +34302,7 @@
                       <a:endParaRPr sz="900" b="0"/>
                     </a:p>
                   </a:txBody>
-                  <a:tcPr marL="90000" marR="182880" marT="8095" marB="0" anchor="ctr">
+                  <a:tcPr marL="90000" marR="457200" marT="8095" marB="0" anchor="ctr">
                     <a:lnL>
                       <a:noFill/>
                     </a:lnL>
@@ -34280,7 +34330,46 @@
                     <a:bodyPr/>
                     <a:lstStyle/>
                     <a:p>
-                      <a:pPr algn="ctr" fontAlgn="b">
+                      <a:pPr algn="r" fontAlgn="b">
+                        <a:defRPr sz="900">
+                          <a:solidFill>
+                            <a:srgbClr val="6B767D"/>
+                          </a:solidFill>
+                          <a:latin typeface="+mn-lt"/>
+                        </a:defRPr>
+                      </a:pPr>
+                      <a:endParaRPr sz="900" b="0" dirty="0"/>
+                    </a:p>
+                  </a:txBody>
+                  <a:tcPr marL="90000" marR="457200" marT="8095" marB="0" anchor="ctr">
+                    <a:lnL>
+                      <a:noFill/>
+                    </a:lnL>
+                    <a:lnR>
+                      <a:noFill/>
+                    </a:lnR>
+                    <a:lnT w="12700" cmpd="sng">
+                      <a:noFill/>
+                    </a:lnT>
+                    <a:lnB w="12700" cmpd="sng">
+                      <a:noFill/>
+                    </a:lnB>
+                    <a:lnTlToBr w="12700" cmpd="sng">
+                      <a:noFill/>
+                      <a:prstDash val="solid"/>
+                    </a:lnTlToBr>
+                    <a:lnBlToTr w="12700" cmpd="sng">
+                      <a:noFill/>
+                      <a:prstDash val="solid"/>
+                    </a:lnBlToTr>
+                  </a:tcPr>
+                </a:tc>
+                <a:tc>
+                  <a:txBody>
+                    <a:bodyPr/>
+                    <a:lstStyle/>
+                    <a:p>
+                      <a:pPr algn="r" fontAlgn="b">
                         <a:defRPr sz="900">
                           <a:solidFill>
                             <a:srgbClr val="6B767D"/>
@@ -34291,46 +34380,7 @@
                       <a:endParaRPr sz="900" b="0"/>
                     </a:p>
                   </a:txBody>
-                  <a:tcPr marL="90000" marR="182880" marT="8095" marB="0" anchor="ctr">
-                    <a:lnL>
-                      <a:noFill/>
-                    </a:lnL>
-                    <a:lnR>
-                      <a:noFill/>
-                    </a:lnR>
-                    <a:lnT w="12700" cmpd="sng">
-                      <a:noFill/>
-                    </a:lnT>
-                    <a:lnB w="12700" cmpd="sng">
-                      <a:noFill/>
-                    </a:lnB>
-                    <a:lnTlToBr w="12700" cmpd="sng">
-                      <a:noFill/>
-                      <a:prstDash val="solid"/>
-                    </a:lnTlToBr>
-                    <a:lnBlToTr w="12700" cmpd="sng">
-                      <a:noFill/>
-                      <a:prstDash val="solid"/>
-                    </a:lnBlToTr>
-                  </a:tcPr>
-                </a:tc>
-                <a:tc>
-                  <a:txBody>
-                    <a:bodyPr/>
-                    <a:lstStyle/>
-                    <a:p>
-                      <a:pPr algn="ctr" fontAlgn="b">
-                        <a:defRPr sz="900">
-                          <a:solidFill>
-                            <a:srgbClr val="6B767D"/>
-                          </a:solidFill>
-                          <a:latin typeface="+mn-lt"/>
-                        </a:defRPr>
-                      </a:pPr>
-                      <a:endParaRPr sz="900" b="0"/>
-                    </a:p>
-                  </a:txBody>
-                  <a:tcPr marL="90000" marR="182880" marT="8095" marB="0" anchor="ctr">
+                  <a:tcPr marL="90000" marR="457200" marT="8095" marB="0" anchor="ctr">
                     <a:lnL>
                       <a:noFill/>
                     </a:lnL>
@@ -34410,7 +34460,7 @@
                     <a:bodyPr/>
                     <a:lstStyle/>
                     <a:p>
-                      <a:pPr algn="ctr" fontAlgn="b">
+                      <a:pPr algn="r" fontAlgn="b">
                         <a:defRPr sz="900">
                           <a:solidFill>
                             <a:srgbClr val="6B767D"/>
@@ -34421,7 +34471,7 @@
                       <a:endParaRPr sz="900" b="0"/>
                     </a:p>
                   </a:txBody>
-                  <a:tcPr marL="90000" marR="182880" marT="8095" marB="0" anchor="ctr">
+                  <a:tcPr marL="90000" marR="457200" marT="8095" marB="0" anchor="ctr">
                     <a:lnL>
                       <a:noFill/>
                     </a:lnL>
@@ -34449,46 +34499,7 @@
                     <a:bodyPr/>
                     <a:lstStyle/>
                     <a:p>
-                      <a:pPr algn="ctr" fontAlgn="b">
-                        <a:defRPr sz="900">
-                          <a:solidFill>
-                            <a:srgbClr val="6B767D"/>
-                          </a:solidFill>
-                          <a:latin typeface="+mn-lt"/>
-                        </a:defRPr>
-                      </a:pPr>
-                      <a:endParaRPr sz="900" b="0"/>
-                    </a:p>
-                  </a:txBody>
-                  <a:tcPr marL="90000" marR="182880" marT="8095" marB="0" anchor="ctr">
-                    <a:lnL>
-                      <a:noFill/>
-                    </a:lnL>
-                    <a:lnR>
-                      <a:noFill/>
-                    </a:lnR>
-                    <a:lnT w="12700" cmpd="sng">
-                      <a:noFill/>
-                    </a:lnT>
-                    <a:lnB w="12700" cmpd="sng">
-                      <a:noFill/>
-                    </a:lnB>
-                    <a:lnTlToBr w="12700" cmpd="sng">
-                      <a:noFill/>
-                      <a:prstDash val="solid"/>
-                    </a:lnTlToBr>
-                    <a:lnBlToTr w="12700" cmpd="sng">
-                      <a:noFill/>
-                      <a:prstDash val="solid"/>
-                    </a:lnBlToTr>
-                  </a:tcPr>
-                </a:tc>
-                <a:tc>
-                  <a:txBody>
-                    <a:bodyPr/>
-                    <a:lstStyle/>
-                    <a:p>
-                      <a:pPr algn="ctr" fontAlgn="b">
+                      <a:pPr algn="r" fontAlgn="b">
                         <a:defRPr sz="900">
                           <a:solidFill>
                             <a:srgbClr val="6B767D"/>
@@ -34499,7 +34510,46 @@
                       <a:endParaRPr sz="900" b="0" dirty="0"/>
                     </a:p>
                   </a:txBody>
-                  <a:tcPr marL="90000" marR="182880" marT="8095" marB="0" anchor="ctr">
+                  <a:tcPr marL="90000" marR="457200" marT="8095" marB="0" anchor="ctr">
+                    <a:lnL>
+                      <a:noFill/>
+                    </a:lnL>
+                    <a:lnR>
+                      <a:noFill/>
+                    </a:lnR>
+                    <a:lnT w="12700" cmpd="sng">
+                      <a:noFill/>
+                    </a:lnT>
+                    <a:lnB w="12700" cmpd="sng">
+                      <a:noFill/>
+                    </a:lnB>
+                    <a:lnTlToBr w="12700" cmpd="sng">
+                      <a:noFill/>
+                      <a:prstDash val="solid"/>
+                    </a:lnTlToBr>
+                    <a:lnBlToTr w="12700" cmpd="sng">
+                      <a:noFill/>
+                      <a:prstDash val="solid"/>
+                    </a:lnBlToTr>
+                  </a:tcPr>
+                </a:tc>
+                <a:tc>
+                  <a:txBody>
+                    <a:bodyPr/>
+                    <a:lstStyle/>
+                    <a:p>
+                      <a:pPr algn="r" fontAlgn="b">
+                        <a:defRPr sz="900">
+                          <a:solidFill>
+                            <a:srgbClr val="6B767D"/>
+                          </a:solidFill>
+                          <a:latin typeface="+mn-lt"/>
+                        </a:defRPr>
+                      </a:pPr>
+                      <a:endParaRPr sz="900" b="0" dirty="0"/>
+                    </a:p>
+                  </a:txBody>
+                  <a:tcPr marL="90000" marR="457200" marT="8095" marB="0" anchor="ctr">
                     <a:lnL>
                       <a:noFill/>
                     </a:lnL>
@@ -34579,7 +34629,7 @@
                     <a:bodyPr/>
                     <a:lstStyle/>
                     <a:p>
-                      <a:pPr algn="ctr" fontAlgn="b">
+                      <a:pPr algn="r" fontAlgn="b">
                         <a:defRPr sz="900">
                           <a:solidFill>
                             <a:srgbClr val="6B767D"/>
@@ -34590,7 +34640,7 @@
                       <a:endParaRPr sz="900" b="0"/>
                     </a:p>
                   </a:txBody>
-                  <a:tcPr marL="90000" marR="182880" marT="8095" marB="0" anchor="ctr">
+                  <a:tcPr marL="90000" marR="457200" marT="8095" marB="0" anchor="ctr">
                     <a:lnL>
                       <a:noFill/>
                     </a:lnL>
@@ -34618,46 +34668,7 @@
                     <a:bodyPr/>
                     <a:lstStyle/>
                     <a:p>
-                      <a:pPr algn="ctr" fontAlgn="b">
-                        <a:defRPr sz="900">
-                          <a:solidFill>
-                            <a:srgbClr val="6B767D"/>
-                          </a:solidFill>
-                          <a:latin typeface="+mn-lt"/>
-                        </a:defRPr>
-                      </a:pPr>
-                      <a:endParaRPr sz="900" b="0"/>
-                    </a:p>
-                  </a:txBody>
-                  <a:tcPr marL="90000" marR="182880" marT="8095" marB="0" anchor="ctr">
-                    <a:lnL>
-                      <a:noFill/>
-                    </a:lnL>
-                    <a:lnR>
-                      <a:noFill/>
-                    </a:lnR>
-                    <a:lnT w="12700" cmpd="sng">
-                      <a:noFill/>
-                    </a:lnT>
-                    <a:lnB w="12700" cmpd="sng">
-                      <a:noFill/>
-                    </a:lnB>
-                    <a:lnTlToBr w="12700" cmpd="sng">
-                      <a:noFill/>
-                      <a:prstDash val="solid"/>
-                    </a:lnTlToBr>
-                    <a:lnBlToTr w="12700" cmpd="sng">
-                      <a:noFill/>
-                      <a:prstDash val="solid"/>
-                    </a:lnBlToTr>
-                  </a:tcPr>
-                </a:tc>
-                <a:tc>
-                  <a:txBody>
-                    <a:bodyPr/>
-                    <a:lstStyle/>
-                    <a:p>
-                      <a:pPr algn="ctr" fontAlgn="b">
+                      <a:pPr algn="r" fontAlgn="b">
                         <a:defRPr sz="900">
                           <a:solidFill>
                             <a:srgbClr val="6B767D"/>
@@ -34668,7 +34679,46 @@
                       <a:endParaRPr sz="900" b="0" dirty="0"/>
                     </a:p>
                   </a:txBody>
-                  <a:tcPr marL="90000" marR="182880" marT="8095" marB="0" anchor="ctr">
+                  <a:tcPr marL="90000" marR="457200" marT="8095" marB="0" anchor="ctr">
+                    <a:lnL>
+                      <a:noFill/>
+                    </a:lnL>
+                    <a:lnR>
+                      <a:noFill/>
+                    </a:lnR>
+                    <a:lnT w="12700" cmpd="sng">
+                      <a:noFill/>
+                    </a:lnT>
+                    <a:lnB w="12700" cmpd="sng">
+                      <a:noFill/>
+                    </a:lnB>
+                    <a:lnTlToBr w="12700" cmpd="sng">
+                      <a:noFill/>
+                      <a:prstDash val="solid"/>
+                    </a:lnTlToBr>
+                    <a:lnBlToTr w="12700" cmpd="sng">
+                      <a:noFill/>
+                      <a:prstDash val="solid"/>
+                    </a:lnBlToTr>
+                  </a:tcPr>
+                </a:tc>
+                <a:tc>
+                  <a:txBody>
+                    <a:bodyPr/>
+                    <a:lstStyle/>
+                    <a:p>
+                      <a:pPr algn="r" fontAlgn="b">
+                        <a:defRPr sz="900">
+                          <a:solidFill>
+                            <a:srgbClr val="6B767D"/>
+                          </a:solidFill>
+                          <a:latin typeface="+mn-lt"/>
+                        </a:defRPr>
+                      </a:pPr>
+                      <a:endParaRPr sz="900" b="0" dirty="0"/>
+                    </a:p>
+                  </a:txBody>
+                  <a:tcPr marL="90000" marR="457200" marT="8095" marB="0" anchor="ctr">
                     <a:lnL>
                       <a:noFill/>
                     </a:lnL>
@@ -34748,7 +34798,7 @@
                     <a:bodyPr/>
                     <a:lstStyle/>
                     <a:p>
-                      <a:pPr algn="ctr" fontAlgn="b">
+                      <a:pPr algn="r" fontAlgn="b">
                         <a:defRPr sz="900">
                           <a:solidFill>
                             <a:srgbClr val="6B767D"/>
@@ -34759,7 +34809,7 @@
                       <a:endParaRPr sz="900" b="0"/>
                     </a:p>
                   </a:txBody>
-                  <a:tcPr marL="90000" marR="182880" marT="8095" marB="0" anchor="ctr">
+                  <a:tcPr marL="90000" marR="457200" marT="8095" marB="0" anchor="ctr">
                     <a:lnL>
                       <a:noFill/>
                     </a:lnL>
@@ -34787,46 +34837,7 @@
                     <a:bodyPr/>
                     <a:lstStyle/>
                     <a:p>
-                      <a:pPr algn="ctr" fontAlgn="b">
-                        <a:defRPr sz="900">
-                          <a:solidFill>
-                            <a:srgbClr val="6B767D"/>
-                          </a:solidFill>
-                          <a:latin typeface="+mn-lt"/>
-                        </a:defRPr>
-                      </a:pPr>
-                      <a:endParaRPr sz="900" b="0"/>
-                    </a:p>
-                  </a:txBody>
-                  <a:tcPr marL="90000" marR="182880" marT="8095" marB="0" anchor="ctr">
-                    <a:lnL>
-                      <a:noFill/>
-                    </a:lnL>
-                    <a:lnR>
-                      <a:noFill/>
-                    </a:lnR>
-                    <a:lnT w="12700" cmpd="sng">
-                      <a:noFill/>
-                    </a:lnT>
-                    <a:lnB w="12700" cmpd="sng">
-                      <a:noFill/>
-                    </a:lnB>
-                    <a:lnTlToBr w="12700" cmpd="sng">
-                      <a:noFill/>
-                      <a:prstDash val="solid"/>
-                    </a:lnTlToBr>
-                    <a:lnBlToTr w="12700" cmpd="sng">
-                      <a:noFill/>
-                      <a:prstDash val="solid"/>
-                    </a:lnBlToTr>
-                  </a:tcPr>
-                </a:tc>
-                <a:tc>
-                  <a:txBody>
-                    <a:bodyPr/>
-                    <a:lstStyle/>
-                    <a:p>
-                      <a:pPr algn="ctr" fontAlgn="b">
+                      <a:pPr algn="r" fontAlgn="b">
                         <a:defRPr sz="900">
                           <a:solidFill>
                             <a:srgbClr val="6B767D"/>
@@ -34837,7 +34848,46 @@
                       <a:endParaRPr sz="900" b="0" dirty="0"/>
                     </a:p>
                   </a:txBody>
-                  <a:tcPr marL="90000" marR="182880" marT="8095" marB="0" anchor="ctr">
+                  <a:tcPr marL="90000" marR="457200" marT="8095" marB="0" anchor="ctr">
+                    <a:lnL>
+                      <a:noFill/>
+                    </a:lnL>
+                    <a:lnR>
+                      <a:noFill/>
+                    </a:lnR>
+                    <a:lnT w="12700" cmpd="sng">
+                      <a:noFill/>
+                    </a:lnT>
+                    <a:lnB w="12700" cmpd="sng">
+                      <a:noFill/>
+                    </a:lnB>
+                    <a:lnTlToBr w="12700" cmpd="sng">
+                      <a:noFill/>
+                      <a:prstDash val="solid"/>
+                    </a:lnTlToBr>
+                    <a:lnBlToTr w="12700" cmpd="sng">
+                      <a:noFill/>
+                      <a:prstDash val="solid"/>
+                    </a:lnBlToTr>
+                  </a:tcPr>
+                </a:tc>
+                <a:tc>
+                  <a:txBody>
+                    <a:bodyPr/>
+                    <a:lstStyle/>
+                    <a:p>
+                      <a:pPr algn="r" fontAlgn="b">
+                        <a:defRPr sz="900">
+                          <a:solidFill>
+                            <a:srgbClr val="6B767D"/>
+                          </a:solidFill>
+                          <a:latin typeface="+mn-lt"/>
+                        </a:defRPr>
+                      </a:pPr>
+                      <a:endParaRPr sz="900" b="0" dirty="0"/>
+                    </a:p>
+                  </a:txBody>
+                  <a:tcPr marL="90000" marR="457200" marT="8095" marB="0" anchor="ctr">
                     <a:lnL>
                       <a:noFill/>
                     </a:lnL>
@@ -34917,7 +34967,7 @@
                     <a:bodyPr/>
                     <a:lstStyle/>
                     <a:p>
-                      <a:pPr algn="ctr" fontAlgn="b">
+                      <a:pPr algn="r" fontAlgn="b">
                         <a:defRPr sz="900">
                           <a:solidFill>
                             <a:srgbClr val="6B767D"/>
@@ -34928,7 +34978,7 @@
                       <a:endParaRPr sz="900" b="0"/>
                     </a:p>
                   </a:txBody>
-                  <a:tcPr marL="90000" marR="182880" marT="8095" marB="0" anchor="ctr">
+                  <a:tcPr marL="90000" marR="457200" marT="8095" marB="0" anchor="ctr">
                     <a:lnL>
                       <a:noFill/>
                     </a:lnL>
@@ -34956,46 +35006,7 @@
                     <a:bodyPr/>
                     <a:lstStyle/>
                     <a:p>
-                      <a:pPr algn="ctr" fontAlgn="b">
-                        <a:defRPr sz="900">
-                          <a:solidFill>
-                            <a:srgbClr val="6B767D"/>
-                          </a:solidFill>
-                          <a:latin typeface="+mn-lt"/>
-                        </a:defRPr>
-                      </a:pPr>
-                      <a:endParaRPr sz="900" b="0"/>
-                    </a:p>
-                  </a:txBody>
-                  <a:tcPr marL="90000" marR="182880" marT="8095" marB="0" anchor="ctr">
-                    <a:lnL>
-                      <a:noFill/>
-                    </a:lnL>
-                    <a:lnR>
-                      <a:noFill/>
-                    </a:lnR>
-                    <a:lnT w="12700" cmpd="sng">
-                      <a:noFill/>
-                    </a:lnT>
-                    <a:lnB w="12700" cmpd="sng">
-                      <a:noFill/>
-                    </a:lnB>
-                    <a:lnTlToBr w="12700" cmpd="sng">
-                      <a:noFill/>
-                      <a:prstDash val="solid"/>
-                    </a:lnTlToBr>
-                    <a:lnBlToTr w="12700" cmpd="sng">
-                      <a:noFill/>
-                      <a:prstDash val="solid"/>
-                    </a:lnBlToTr>
-                  </a:tcPr>
-                </a:tc>
-                <a:tc>
-                  <a:txBody>
-                    <a:bodyPr/>
-                    <a:lstStyle/>
-                    <a:p>
-                      <a:pPr algn="ctr" fontAlgn="b">
+                      <a:pPr algn="r" fontAlgn="b">
                         <a:defRPr sz="900">
                           <a:solidFill>
                             <a:srgbClr val="6B767D"/>
@@ -35006,7 +35017,46 @@
                       <a:endParaRPr sz="900" b="0" dirty="0"/>
                     </a:p>
                   </a:txBody>
-                  <a:tcPr marL="90000" marR="182880" marT="8095" marB="0" anchor="ctr">
+                  <a:tcPr marL="90000" marR="457200" marT="8095" marB="0" anchor="ctr">
+                    <a:lnL>
+                      <a:noFill/>
+                    </a:lnL>
+                    <a:lnR>
+                      <a:noFill/>
+                    </a:lnR>
+                    <a:lnT w="12700" cmpd="sng">
+                      <a:noFill/>
+                    </a:lnT>
+                    <a:lnB w="12700" cmpd="sng">
+                      <a:noFill/>
+                    </a:lnB>
+                    <a:lnTlToBr w="12700" cmpd="sng">
+                      <a:noFill/>
+                      <a:prstDash val="solid"/>
+                    </a:lnTlToBr>
+                    <a:lnBlToTr w="12700" cmpd="sng">
+                      <a:noFill/>
+                      <a:prstDash val="solid"/>
+                    </a:lnBlToTr>
+                  </a:tcPr>
+                </a:tc>
+                <a:tc>
+                  <a:txBody>
+                    <a:bodyPr/>
+                    <a:lstStyle/>
+                    <a:p>
+                      <a:pPr algn="r" fontAlgn="b">
+                        <a:defRPr sz="900">
+                          <a:solidFill>
+                            <a:srgbClr val="6B767D"/>
+                          </a:solidFill>
+                          <a:latin typeface="+mn-lt"/>
+                        </a:defRPr>
+                      </a:pPr>
+                      <a:endParaRPr sz="900" b="0" dirty="0"/>
+                    </a:p>
+                  </a:txBody>
+                  <a:tcPr marL="90000" marR="457200" marT="8095" marB="0" anchor="ctr">
                     <a:lnL>
                       <a:noFill/>
                     </a:lnL>
@@ -35086,7 +35136,7 @@
                     <a:bodyPr/>
                     <a:lstStyle/>
                     <a:p>
-                      <a:pPr algn="ctr" fontAlgn="b">
+                      <a:pPr algn="r" fontAlgn="b">
                         <a:defRPr sz="900">
                           <a:solidFill>
                             <a:srgbClr val="6B767D"/>
@@ -35097,7 +35147,7 @@
                       <a:endParaRPr sz="900" b="0"/>
                     </a:p>
                   </a:txBody>
-                  <a:tcPr marL="90000" marR="182880" marT="8095" marB="0" anchor="ctr">
+                  <a:tcPr marL="90000" marR="457200" marT="8095" marB="0" anchor="ctr">
                     <a:lnL>
                       <a:noFill/>
                     </a:lnL>
@@ -35125,46 +35175,7 @@
                     <a:bodyPr/>
                     <a:lstStyle/>
                     <a:p>
-                      <a:pPr algn="ctr" fontAlgn="b">
-                        <a:defRPr sz="900">
-                          <a:solidFill>
-                            <a:srgbClr val="6B767D"/>
-                          </a:solidFill>
-                          <a:latin typeface="+mn-lt"/>
-                        </a:defRPr>
-                      </a:pPr>
-                      <a:endParaRPr sz="900" b="0"/>
-                    </a:p>
-                  </a:txBody>
-                  <a:tcPr marL="90000" marR="182880" marT="8095" marB="0" anchor="ctr">
-                    <a:lnL>
-                      <a:noFill/>
-                    </a:lnL>
-                    <a:lnR>
-                      <a:noFill/>
-                    </a:lnR>
-                    <a:lnT w="12700" cmpd="sng">
-                      <a:noFill/>
-                    </a:lnT>
-                    <a:lnB w="12700" cmpd="sng">
-                      <a:noFill/>
-                    </a:lnB>
-                    <a:lnTlToBr w="12700" cmpd="sng">
-                      <a:noFill/>
-                      <a:prstDash val="solid"/>
-                    </a:lnTlToBr>
-                    <a:lnBlToTr w="12700" cmpd="sng">
-                      <a:noFill/>
-                      <a:prstDash val="solid"/>
-                    </a:lnBlToTr>
-                  </a:tcPr>
-                </a:tc>
-                <a:tc>
-                  <a:txBody>
-                    <a:bodyPr/>
-                    <a:lstStyle/>
-                    <a:p>
-                      <a:pPr algn="ctr" fontAlgn="b">
+                      <a:pPr algn="r" fontAlgn="b">
                         <a:defRPr sz="900">
                           <a:solidFill>
                             <a:srgbClr val="6B767D"/>
@@ -35175,7 +35186,46 @@
                       <a:endParaRPr sz="900" b="0" dirty="0"/>
                     </a:p>
                   </a:txBody>
-                  <a:tcPr marL="90000" marR="182880" marT="8095" marB="0" anchor="ctr">
+                  <a:tcPr marL="90000" marR="457200" marT="8095" marB="0" anchor="ctr">
+                    <a:lnL>
+                      <a:noFill/>
+                    </a:lnL>
+                    <a:lnR>
+                      <a:noFill/>
+                    </a:lnR>
+                    <a:lnT w="12700" cmpd="sng">
+                      <a:noFill/>
+                    </a:lnT>
+                    <a:lnB w="12700" cmpd="sng">
+                      <a:noFill/>
+                    </a:lnB>
+                    <a:lnTlToBr w="12700" cmpd="sng">
+                      <a:noFill/>
+                      <a:prstDash val="solid"/>
+                    </a:lnTlToBr>
+                    <a:lnBlToTr w="12700" cmpd="sng">
+                      <a:noFill/>
+                      <a:prstDash val="solid"/>
+                    </a:lnBlToTr>
+                  </a:tcPr>
+                </a:tc>
+                <a:tc>
+                  <a:txBody>
+                    <a:bodyPr/>
+                    <a:lstStyle/>
+                    <a:p>
+                      <a:pPr algn="r" fontAlgn="b">
+                        <a:defRPr sz="900">
+                          <a:solidFill>
+                            <a:srgbClr val="6B767D"/>
+                          </a:solidFill>
+                          <a:latin typeface="+mn-lt"/>
+                        </a:defRPr>
+                      </a:pPr>
+                      <a:endParaRPr sz="900" b="0" dirty="0"/>
+                    </a:p>
+                  </a:txBody>
+                  <a:tcPr marL="90000" marR="457200" marT="8095" marB="0" anchor="ctr">
                     <a:lnL>
                       <a:noFill/>
                     </a:lnL>
@@ -35481,14 +35531,14 @@
           <p:nvPr>
             <p:extLst>
               <p:ext uri="{D42A27DB-BD31-4B8C-83A1-F6EECF244321}">
-                <p14:modId xmlns:p14="http://schemas.microsoft.com/office/powerpoint/2010/main" val="2721928458"/>
+                <p14:modId xmlns:p14="http://schemas.microsoft.com/office/powerpoint/2010/main" val="2894043678"/>
               </p:ext>
             </p:extLst>
           </p:nvPr>
         </p:nvGraphicFramePr>
         <p:xfrm>
           <a:off x="2644881" y="1534940"/>
-          <a:ext cx="6400800" cy="1169372"/>
+          <a:ext cx="6400800" cy="1306532"/>
         </p:xfrm>
         <a:graphic>
           <a:graphicData uri="http://schemas.openxmlformats.org/drawingml/2006/table">
@@ -35814,7 +35864,7 @@
                     <a:bodyPr/>
                     <a:lstStyle/>
                     <a:p>
-                      <a:pPr marL="0" algn="ctr" defTabSz="914400" rtl="0" eaLnBrk="1" fontAlgn="b" latinLnBrk="0" hangingPunct="1">
+                      <a:pPr marL="0" algn="r" defTabSz="914400" rtl="0" eaLnBrk="1" fontAlgn="b" latinLnBrk="0" hangingPunct="1">
                         <a:defRPr sz="900">
                           <a:solidFill>
                             <a:srgbClr val="6B767D"/>
@@ -35865,7 +35915,7 @@
                       </a:endParaRPr>
                     </a:p>
                   </a:txBody>
-                  <a:tcPr marL="90000" marR="182880" marT="8095" marB="0" anchor="ctr">
+                  <a:tcPr marL="90000" marR="457200" marT="8095" marB="0" anchor="ctr">
                     <a:lnL>
                       <a:noFill/>
                     </a:lnL>
@@ -35893,86 +35943,7 @@
                     <a:bodyPr/>
                     <a:lstStyle/>
                     <a:p>
-                      <a:pPr marL="0" algn="ctr" defTabSz="914400" rtl="0" eaLnBrk="1" fontAlgn="b" latinLnBrk="0" hangingPunct="1">
-                        <a:defRPr sz="900">
-                          <a:solidFill>
-                            <a:srgbClr val="6B767D"/>
-                          </a:solidFill>
-                          <a:latin typeface="+mn-lt"/>
-                        </a:defRPr>
-                      </a:pPr>
-                      <a:r>
-                        <a:rPr lang="en-GB" sz="900" b="0" kern="1200" dirty="0">
-                          <a:solidFill>
-                            <a:srgbClr val="6B767D"/>
-                          </a:solidFill>
-                          <a:latin typeface="+mn-lt"/>
-                          <a:ea typeface="+mn-ea"/>
-                          <a:cs typeface="+mn-cs"/>
-                        </a:rPr>
-                        <a:t>{{</a:t>
-                      </a:r>
-                      <a:r>
-                        <a:rPr lang="en-GB" sz="900" b="0" kern="1200" dirty="0" err="1">
-                          <a:solidFill>
-                            <a:srgbClr val="6B767D"/>
-                          </a:solidFill>
-                          <a:latin typeface="+mn-lt"/>
-                          <a:ea typeface="+mn-ea"/>
-                          <a:cs typeface="+mn-cs"/>
-                        </a:rPr>
-                        <a:t>col:vhc</a:t>
-                      </a:r>
-                      <a:r>
-                        <a:rPr lang="en-GB" sz="900" b="0" kern="1200" dirty="0">
-                          <a:solidFill>
-                            <a:srgbClr val="6B767D"/>
-                          </a:solidFill>
-                          <a:latin typeface="+mn-lt"/>
-                          <a:ea typeface="+mn-ea"/>
-                          <a:cs typeface="+mn-cs"/>
-                        </a:rPr>
-                        <a:t>--diskspace_quarterly_Summary.csv[3]}}</a:t>
-                      </a:r>
-                      <a:endParaRPr sz="900" b="0" kern="1200" dirty="0">
-                        <a:solidFill>
-                          <a:srgbClr val="6B767D"/>
-                        </a:solidFill>
-                        <a:latin typeface="+mn-lt"/>
-                        <a:ea typeface="+mn-ea"/>
-                        <a:cs typeface="+mn-cs"/>
-                      </a:endParaRPr>
-                    </a:p>
-                  </a:txBody>
-                  <a:tcPr marL="90000" marR="182880" marT="8095" marB="0" anchor="ctr">
-                    <a:lnL>
-                      <a:noFill/>
-                    </a:lnL>
-                    <a:lnR>
-                      <a:noFill/>
-                    </a:lnR>
-                    <a:lnT w="12700" cmpd="sng">
-                      <a:noFill/>
-                    </a:lnT>
-                    <a:lnB w="12700" cmpd="sng">
-                      <a:noFill/>
-                    </a:lnB>
-                    <a:lnTlToBr w="12700" cmpd="sng">
-                      <a:noFill/>
-                      <a:prstDash val="solid"/>
-                    </a:lnTlToBr>
-                    <a:lnBlToTr w="12700" cmpd="sng">
-                      <a:noFill/>
-                      <a:prstDash val="solid"/>
-                    </a:lnBlToTr>
-                  </a:tcPr>
-                </a:tc>
-                <a:tc>
-                  <a:txBody>
-                    <a:bodyPr/>
-                    <a:lstStyle/>
-                    <a:p>
-                      <a:pPr marL="0" algn="ctr" defTabSz="914400" rtl="0" eaLnBrk="1" fontAlgn="b" latinLnBrk="0" hangingPunct="1">
+                      <a:pPr marL="0" algn="r" defTabSz="914400" rtl="0" eaLnBrk="1" fontAlgn="b" latinLnBrk="0" hangingPunct="1">
                         <a:defRPr sz="900">
                           <a:solidFill>
                             <a:srgbClr val="6B767D"/>
@@ -36023,7 +35994,97 @@
                       </a:endParaRPr>
                     </a:p>
                   </a:txBody>
-                  <a:tcPr marL="90000" marR="182880" marT="8095" marB="0" anchor="ctr">
+                  <a:tcPr marL="90000" marR="457200" marT="8095" marB="0" anchor="ctr">
+                    <a:lnL>
+                      <a:noFill/>
+                    </a:lnL>
+                    <a:lnR>
+                      <a:noFill/>
+                    </a:lnR>
+                    <a:lnT w="12700" cmpd="sng">
+                      <a:noFill/>
+                    </a:lnT>
+                    <a:lnB w="12700" cmpd="sng">
+                      <a:noFill/>
+                    </a:lnB>
+                    <a:lnTlToBr w="12700" cmpd="sng">
+                      <a:noFill/>
+                      <a:prstDash val="solid"/>
+                    </a:lnTlToBr>
+                    <a:lnBlToTr w="12700" cmpd="sng">
+                      <a:noFill/>
+                      <a:prstDash val="solid"/>
+                    </a:lnBlToTr>
+                  </a:tcPr>
+                </a:tc>
+                <a:tc>
+                  <a:txBody>
+                    <a:bodyPr/>
+                    <a:lstStyle/>
+                    <a:p>
+                      <a:pPr marL="0" algn="r" defTabSz="914400" rtl="0" eaLnBrk="1" fontAlgn="b" latinLnBrk="0" hangingPunct="1">
+                        <a:defRPr sz="900">
+                          <a:solidFill>
+                            <a:srgbClr val="6B767D"/>
+                          </a:solidFill>
+                          <a:latin typeface="+mn-lt"/>
+                        </a:defRPr>
+                      </a:pPr>
+                      <a:r>
+                        <a:rPr lang="en-GB" sz="900" b="0" kern="1200" dirty="0">
+                          <a:solidFill>
+                            <a:srgbClr val="6B767D"/>
+                          </a:solidFill>
+                          <a:latin typeface="+mn-lt"/>
+                          <a:ea typeface="+mn-ea"/>
+                          <a:cs typeface="+mn-cs"/>
+                        </a:rPr>
+                        <a:t>{{</a:t>
+                      </a:r>
+                      <a:r>
+                        <a:rPr lang="en-GB" sz="900" b="0" kern="1200" dirty="0" err="1">
+                          <a:solidFill>
+                            <a:srgbClr val="6B767D"/>
+                          </a:solidFill>
+                          <a:latin typeface="+mn-lt"/>
+                          <a:ea typeface="+mn-ea"/>
+                          <a:cs typeface="+mn-cs"/>
+                        </a:rPr>
+                        <a:t>col:vhc</a:t>
+                      </a:r>
+                      <a:r>
+                        <a:rPr lang="en-GB" sz="900" b="0" kern="1200" dirty="0">
+                          <a:solidFill>
+                            <a:srgbClr val="6B767D"/>
+                          </a:solidFill>
+                          <a:latin typeface="+mn-lt"/>
+                          <a:ea typeface="+mn-ea"/>
+                          <a:cs typeface="+mn-cs"/>
+                        </a:rPr>
+                        <a:t>--diskspace_quarterly_Summary.</a:t>
+                      </a:r>
+                      <a:r>
+                        <a:rPr lang="en-GB" sz="900" b="0" kern="1200">
+                          <a:solidFill>
+                            <a:srgbClr val="6B767D"/>
+                          </a:solidFill>
+                          <a:latin typeface="+mn-lt"/>
+                          <a:ea typeface="+mn-ea"/>
+                          <a:cs typeface="+mn-cs"/>
+                        </a:rPr>
+                        <a:t>csv[6]}}</a:t>
+                      </a:r>
+                      <a:endParaRPr sz="900" b="0" kern="1200" dirty="0">
+                        <a:solidFill>
+                          <a:srgbClr val="6B767D"/>
+                        </a:solidFill>
+                        <a:latin typeface="+mn-lt"/>
+                        <a:ea typeface="+mn-ea"/>
+                        <a:cs typeface="+mn-cs"/>
+                      </a:endParaRPr>
+                    </a:p>
+                  </a:txBody>
+                  <a:tcPr marL="90000" marR="457200" marT="8095" marB="0" anchor="ctr">
                     <a:lnL>
                       <a:noFill/>
                     </a:lnL>
@@ -36103,7 +36164,7 @@
                     <a:bodyPr/>
                     <a:lstStyle/>
                     <a:p>
-                      <a:pPr algn="ctr" fontAlgn="b">
+                      <a:pPr algn="r" fontAlgn="b">
                         <a:defRPr sz="900">
                           <a:solidFill>
                             <a:srgbClr val="6B767D"/>
@@ -36114,7 +36175,7 @@
                       <a:endParaRPr sz="900" b="0" dirty="0"/>
                     </a:p>
                   </a:txBody>
-                  <a:tcPr marL="90000" marR="182880" marT="8095" marB="0" anchor="ctr">
+                  <a:tcPr marL="90000" marR="457200" marT="8095" marB="0" anchor="ctr">
                     <a:lnL>
                       <a:noFill/>
                     </a:lnL>
@@ -36142,7 +36203,46 @@
                     <a:bodyPr/>
                     <a:lstStyle/>
                     <a:p>
-                      <a:pPr algn="ctr" fontAlgn="b">
+                      <a:pPr algn="r" fontAlgn="b">
+                        <a:defRPr sz="900">
+                          <a:solidFill>
+                            <a:srgbClr val="6B767D"/>
+                          </a:solidFill>
+                          <a:latin typeface="+mn-lt"/>
+                        </a:defRPr>
+                      </a:pPr>
+                      <a:endParaRPr sz="900" b="0" dirty="0"/>
+                    </a:p>
+                  </a:txBody>
+                  <a:tcPr marL="90000" marR="457200" marT="8095" marB="0" anchor="ctr">
+                    <a:lnL>
+                      <a:noFill/>
+                    </a:lnL>
+                    <a:lnR>
+                      <a:noFill/>
+                    </a:lnR>
+                    <a:lnT w="12700" cmpd="sng">
+                      <a:noFill/>
+                    </a:lnT>
+                    <a:lnB w="12700" cmpd="sng">
+                      <a:noFill/>
+                    </a:lnB>
+                    <a:lnTlToBr w="12700" cmpd="sng">
+                      <a:noFill/>
+                      <a:prstDash val="solid"/>
+                    </a:lnTlToBr>
+                    <a:lnBlToTr w="12700" cmpd="sng">
+                      <a:noFill/>
+                      <a:prstDash val="solid"/>
+                    </a:lnBlToTr>
+                  </a:tcPr>
+                </a:tc>
+                <a:tc>
+                  <a:txBody>
+                    <a:bodyPr/>
+                    <a:lstStyle/>
+                    <a:p>
+                      <a:pPr algn="r" fontAlgn="b">
                         <a:defRPr sz="900">
                           <a:solidFill>
                             <a:srgbClr val="6B767D"/>
@@ -36153,46 +36253,7 @@
                       <a:endParaRPr sz="900" b="0"/>
                     </a:p>
                   </a:txBody>
-                  <a:tcPr marL="90000" marR="182880" marT="8095" marB="0" anchor="ctr">
-                    <a:lnL>
-                      <a:noFill/>
-                    </a:lnL>
-                    <a:lnR>
-                      <a:noFill/>
-                    </a:lnR>
-                    <a:lnT w="12700" cmpd="sng">
-                      <a:noFill/>
-                    </a:lnT>
-                    <a:lnB w="12700" cmpd="sng">
-                      <a:noFill/>
-                    </a:lnB>
-                    <a:lnTlToBr w="12700" cmpd="sng">
-                      <a:noFill/>
-                      <a:prstDash val="solid"/>
-                    </a:lnTlToBr>
-                    <a:lnBlToTr w="12700" cmpd="sng">
-                      <a:noFill/>
-                      <a:prstDash val="solid"/>
-                    </a:lnBlToTr>
-                  </a:tcPr>
-                </a:tc>
-                <a:tc>
-                  <a:txBody>
-                    <a:bodyPr/>
-                    <a:lstStyle/>
-                    <a:p>
-                      <a:pPr algn="ctr" fontAlgn="b">
-                        <a:defRPr sz="900">
-                          <a:solidFill>
-                            <a:srgbClr val="6B767D"/>
-                          </a:solidFill>
-                          <a:latin typeface="+mn-lt"/>
-                        </a:defRPr>
-                      </a:pPr>
-                      <a:endParaRPr sz="900" b="0"/>
-                    </a:p>
-                  </a:txBody>
-                  <a:tcPr marL="90000" marR="182880" marT="8095" marB="0" anchor="ctr">
+                  <a:tcPr marL="90000" marR="457200" marT="8095" marB="0" anchor="ctr">
                     <a:lnL>
                       <a:noFill/>
                     </a:lnL>
@@ -36272,7 +36333,7 @@
                     <a:bodyPr/>
                     <a:lstStyle/>
                     <a:p>
-                      <a:pPr algn="ctr" fontAlgn="b">
+                      <a:pPr algn="r" fontAlgn="b">
                         <a:defRPr sz="900">
                           <a:solidFill>
                             <a:srgbClr val="6B767D"/>
@@ -36283,7 +36344,7 @@
                       <a:endParaRPr sz="900" b="0"/>
                     </a:p>
                   </a:txBody>
-                  <a:tcPr marL="90000" marR="182880" marT="8095" marB="0" anchor="ctr">
+                  <a:tcPr marL="90000" marR="457200" marT="8095" marB="0" anchor="ctr">
                     <a:lnL>
                       <a:noFill/>
                     </a:lnL>
@@ -36311,46 +36372,7 @@
                     <a:bodyPr/>
                     <a:lstStyle/>
                     <a:p>
-                      <a:pPr algn="ctr" fontAlgn="b">
-                        <a:defRPr sz="900">
-                          <a:solidFill>
-                            <a:srgbClr val="6B767D"/>
-                          </a:solidFill>
-                          <a:latin typeface="+mn-lt"/>
-                        </a:defRPr>
-                      </a:pPr>
-                      <a:endParaRPr sz="900" b="0"/>
-                    </a:p>
-                  </a:txBody>
-                  <a:tcPr marL="90000" marR="182880" marT="8095" marB="0" anchor="ctr">
-                    <a:lnL>
-                      <a:noFill/>
-                    </a:lnL>
-                    <a:lnR>
-                      <a:noFill/>
-                    </a:lnR>
-                    <a:lnT w="12700" cmpd="sng">
-                      <a:noFill/>
-                    </a:lnT>
-                    <a:lnB w="12700" cmpd="sng">
-                      <a:noFill/>
-                    </a:lnB>
-                    <a:lnTlToBr w="12700" cmpd="sng">
-                      <a:noFill/>
-                      <a:prstDash val="solid"/>
-                    </a:lnTlToBr>
-                    <a:lnBlToTr w="12700" cmpd="sng">
-                      <a:noFill/>
-                      <a:prstDash val="solid"/>
-                    </a:lnBlToTr>
-                  </a:tcPr>
-                </a:tc>
-                <a:tc>
-                  <a:txBody>
-                    <a:bodyPr/>
-                    <a:lstStyle/>
-                    <a:p>
-                      <a:pPr algn="ctr" fontAlgn="b">
+                      <a:pPr algn="r" fontAlgn="b">
                         <a:defRPr sz="900">
                           <a:solidFill>
                             <a:srgbClr val="6B767D"/>
@@ -36361,7 +36383,46 @@
                       <a:endParaRPr sz="900" b="0" dirty="0"/>
                     </a:p>
                   </a:txBody>
-                  <a:tcPr marL="90000" marR="182880" marT="8095" marB="0" anchor="ctr">
+                  <a:tcPr marL="90000" marR="457200" marT="8095" marB="0" anchor="ctr">
+                    <a:lnL>
+                      <a:noFill/>
+                    </a:lnL>
+                    <a:lnR>
+                      <a:noFill/>
+                    </a:lnR>
+                    <a:lnT w="12700" cmpd="sng">
+                      <a:noFill/>
+                    </a:lnT>
+                    <a:lnB w="12700" cmpd="sng">
+                      <a:noFill/>
+                    </a:lnB>
+                    <a:lnTlToBr w="12700" cmpd="sng">
+                      <a:noFill/>
+                      <a:prstDash val="solid"/>
+                    </a:lnTlToBr>
+                    <a:lnBlToTr w="12700" cmpd="sng">
+                      <a:noFill/>
+                      <a:prstDash val="solid"/>
+                    </a:lnBlToTr>
+                  </a:tcPr>
+                </a:tc>
+                <a:tc>
+                  <a:txBody>
+                    <a:bodyPr/>
+                    <a:lstStyle/>
+                    <a:p>
+                      <a:pPr algn="r" fontAlgn="b">
+                        <a:defRPr sz="900">
+                          <a:solidFill>
+                            <a:srgbClr val="6B767D"/>
+                          </a:solidFill>
+                          <a:latin typeface="+mn-lt"/>
+                        </a:defRPr>
+                      </a:pPr>
+                      <a:endParaRPr sz="900" b="0" dirty="0"/>
+                    </a:p>
+                  </a:txBody>
+                  <a:tcPr marL="90000" marR="457200" marT="8095" marB="0" anchor="ctr">
                     <a:lnL>
                       <a:noFill/>
                     </a:lnL>
@@ -36441,7 +36502,7 @@
                     <a:bodyPr/>
                     <a:lstStyle/>
                     <a:p>
-                      <a:pPr algn="ctr" fontAlgn="b">
+                      <a:pPr algn="r" fontAlgn="b">
                         <a:defRPr sz="900">
                           <a:solidFill>
                             <a:srgbClr val="6B767D"/>
@@ -36452,7 +36513,7 @@
                       <a:endParaRPr sz="900" b="0"/>
                     </a:p>
                   </a:txBody>
-                  <a:tcPr marL="90000" marR="182880" marT="8095" marB="0" anchor="ctr">
+                  <a:tcPr marL="90000" marR="457200" marT="8095" marB="0" anchor="ctr">
                     <a:lnL>
                       <a:noFill/>
                     </a:lnL>
@@ -36480,7 +36541,7 @@
                     <a:bodyPr/>
                     <a:lstStyle/>
                     <a:p>
-                      <a:pPr algn="ctr" fontAlgn="b">
+                      <a:pPr algn="r" fontAlgn="b">
                         <a:defRPr sz="900">
                           <a:solidFill>
                             <a:srgbClr val="6B767D"/>
@@ -36491,7 +36552,7 @@
                       <a:endParaRPr sz="900" b="0"/>
                     </a:p>
                   </a:txBody>
-                  <a:tcPr marL="90000" marR="182880" marT="8095" marB="0" anchor="ctr">
+                  <a:tcPr marL="90000" marR="457200" marT="8095" marB="0" anchor="ctr">
                     <a:lnL>
                       <a:noFill/>
                     </a:lnL>
@@ -36519,7 +36580,7 @@
                     <a:bodyPr/>
                     <a:lstStyle/>
                     <a:p>
-                      <a:pPr algn="ctr" fontAlgn="b">
+                      <a:pPr algn="r" fontAlgn="b">
                         <a:defRPr sz="900">
                           <a:solidFill>
                             <a:srgbClr val="6B767D"/>
@@ -36530,7 +36591,7 @@
                       <a:endParaRPr sz="900" b="0" dirty="0"/>
                     </a:p>
                   </a:txBody>
-                  <a:tcPr marL="90000" marR="182880" marT="8095" marB="0" anchor="ctr">
+                  <a:tcPr marL="90000" marR="457200" marT="8095" marB="0" anchor="ctr">
                     <a:lnL>
                       <a:noFill/>
                     </a:lnL>

</xml_diff>

<commit_message>
Update slides: footnotes, cpu/io restore, trends labels, delaytime fixes, new visuals
-update slide 9 footnotes
-restore cpu & io slides from backup, reorder to earlier version
-verify cpu trends graphs for cod adjustment and update labels
-change slide 23 delay time color to red, move label to bottom
-update delaytimepct to show 1 decimal percentage
-add visualization for top 25 users by query-count and cpu
-add cpu % scale to slide 25 concurrency level
</commit_message>
<xml_diff>
--- a/Solutions/ppt/Vantage Health Check Trends v1.0.pptx
+++ b/Solutions/ppt/Vantage Health Check Trends v1.0.pptx
@@ -196,6 +196,14 @@
     </p:ext>
   </p:extLst>
 </p:presentation>
+</file>
+
+<file path=ppt/revisionInfo.xml><?xml version="1.0" encoding="utf-8"?>
+<p1510:revInfo xmlns:a="http://schemas.openxmlformats.org/drawingml/2006/main" xmlns:r="http://schemas.openxmlformats.org/officeDocument/2006/relationships" xmlns:p1510="http://schemas.microsoft.com/office/powerpoint/2015/10/main">
+  <p1510:revLst>
+    <p1510:client id="{63387007-A822-497D-AB40-ABE17D3982D0}" v="4" dt="2025-09-01T11:45:39.420"/>
+  </p1510:revLst>
+</p1510:revInfo>
 </file>
 
 <file path=ppt/changesInfos/changesInfo1.xml><?xml version="1.0" encoding="utf-8"?>
@@ -693,6 +701,69 @@
     </pc:docChg>
   </pc:docChgLst>
   <pc:docChgLst>
+    <pc:chgData name="Munir, Hassan" userId="72b44764-6718-4eb5-979c-fc4e67a1d4a7" providerId="ADAL" clId="{8680B1E9-D71C-445B-BE6E-20EA72A4C78E}"/>
+    <pc:docChg chg="undo custSel modSld">
+      <pc:chgData name="Munir, Hassan" userId="72b44764-6718-4eb5-979c-fc4e67a1d4a7" providerId="ADAL" clId="{8680B1E9-D71C-445B-BE6E-20EA72A4C78E}" dt="2025-08-04T17:45:13.578" v="1" actId="478"/>
+      <pc:docMkLst>
+        <pc:docMk/>
+      </pc:docMkLst>
+      <pc:sldChg chg="addSp delSp mod">
+        <pc:chgData name="Munir, Hassan" userId="72b44764-6718-4eb5-979c-fc4e67a1d4a7" providerId="ADAL" clId="{8680B1E9-D71C-445B-BE6E-20EA72A4C78E}" dt="2025-08-04T17:45:13.578" v="1" actId="478"/>
+        <pc:sldMkLst>
+          <pc:docMk/>
+          <pc:sldMk cId="2195720891" sldId="2142532964"/>
+        </pc:sldMkLst>
+        <pc:spChg chg="add del">
+          <ac:chgData name="Munir, Hassan" userId="72b44764-6718-4eb5-979c-fc4e67a1d4a7" providerId="ADAL" clId="{8680B1E9-D71C-445B-BE6E-20EA72A4C78E}" dt="2025-08-04T17:45:13.578" v="1" actId="478"/>
+          <ac:spMkLst>
+            <pc:docMk/>
+            <pc:sldMk cId="2195720891" sldId="2142532964"/>
+            <ac:spMk id="4" creationId="{A0064DF2-22E2-9F88-BDE0-343B36310EB7}"/>
+          </ac:spMkLst>
+        </pc:spChg>
+      </pc:sldChg>
+    </pc:docChg>
+  </pc:docChgLst>
+  <pc:docChgLst>
+    <pc:chgData name="Munir, Hassan" userId="72b44764-6718-4eb5-979c-fc4e67a1d4a7" providerId="ADAL" clId="{0820F524-D92C-499F-A328-B1D058DD73B2}"/>
+    <pc:docChg chg="modSld">
+      <pc:chgData name="Munir, Hassan" userId="72b44764-6718-4eb5-979c-fc4e67a1d4a7" providerId="ADAL" clId="{0820F524-D92C-499F-A328-B1D058DD73B2}" dt="2025-09-01T11:47:01.634" v="7" actId="1076"/>
+      <pc:docMkLst>
+        <pc:docMk/>
+      </pc:docMkLst>
+      <pc:sldChg chg="addSp modSp mod">
+        <pc:chgData name="Munir, Hassan" userId="72b44764-6718-4eb5-979c-fc4e67a1d4a7" providerId="ADAL" clId="{0820F524-D92C-499F-A328-B1D058DD73B2}" dt="2025-09-01T11:45:13.690" v="2"/>
+        <pc:sldMkLst>
+          <pc:docMk/>
+          <pc:sldMk cId="96529050" sldId="2142532963"/>
+        </pc:sldMkLst>
+        <pc:spChg chg="add mod">
+          <ac:chgData name="Munir, Hassan" userId="72b44764-6718-4eb5-979c-fc4e67a1d4a7" providerId="ADAL" clId="{0820F524-D92C-499F-A328-B1D058DD73B2}" dt="2025-09-01T11:45:13.690" v="2"/>
+          <ac:spMkLst>
+            <pc:docMk/>
+            <pc:sldMk cId="96529050" sldId="2142532963"/>
+            <ac:spMk id="5" creationId="{02AC4F6B-5470-E49C-09DF-A88FDA1E4E54}"/>
+          </ac:spMkLst>
+        </pc:spChg>
+      </pc:sldChg>
+      <pc:sldChg chg="addSp modSp mod">
+        <pc:chgData name="Munir, Hassan" userId="72b44764-6718-4eb5-979c-fc4e67a1d4a7" providerId="ADAL" clId="{0820F524-D92C-499F-A328-B1D058DD73B2}" dt="2025-09-01T11:47:01.634" v="7" actId="1076"/>
+        <pc:sldMkLst>
+          <pc:docMk/>
+          <pc:sldMk cId="334679512" sldId="2147483644"/>
+        </pc:sldMkLst>
+        <pc:spChg chg="add mod">
+          <ac:chgData name="Munir, Hassan" userId="72b44764-6718-4eb5-979c-fc4e67a1d4a7" providerId="ADAL" clId="{0820F524-D92C-499F-A328-B1D058DD73B2}" dt="2025-09-01T11:47:01.634" v="7" actId="1076"/>
+          <ac:spMkLst>
+            <pc:docMk/>
+            <pc:sldMk cId="334679512" sldId="2147483644"/>
+            <ac:spMk id="5" creationId="{F779FA3A-30C7-F602-84A9-490AF1D441F5}"/>
+          </ac:spMkLst>
+        </pc:spChg>
+      </pc:sldChg>
+    </pc:docChg>
+  </pc:docChgLst>
+  <pc:docChgLst>
     <pc:chgData name="Munir, Hassan" userId="72b44764-6718-4eb5-979c-fc4e67a1d4a7" providerId="ADAL" clId="{F90DD41F-CB6C-45B3-81D7-AA78D2369A69}"/>
     <pc:docChg chg="custSel modSld">
       <pc:chgData name="Munir, Hassan" userId="72b44764-6718-4eb5-979c-fc4e67a1d4a7" providerId="ADAL" clId="{F90DD41F-CB6C-45B3-81D7-AA78D2369A69}" dt="2025-05-12T16:59:05.061" v="0" actId="478"/>
@@ -705,14 +776,6 @@
           <pc:docMk/>
           <pc:sldMk cId="3514927063" sldId="312"/>
         </pc:sldMkLst>
-        <pc:grpChg chg="del">
-          <ac:chgData name="Munir, Hassan" userId="72b44764-6718-4eb5-979c-fc4e67a1d4a7" providerId="ADAL" clId="{F90DD41F-CB6C-45B3-81D7-AA78D2369A69}" dt="2025-05-12T16:59:05.061" v="0" actId="478"/>
-          <ac:grpSpMkLst>
-            <pc:docMk/>
-            <pc:sldMk cId="3514927063" sldId="312"/>
-            <ac:grpSpMk id="11" creationId="{9E713A27-2149-FD75-0C4C-2D3A2A83167F}"/>
-          </ac:grpSpMkLst>
-        </pc:grpChg>
       </pc:sldChg>
     </pc:docChg>
   </pc:docChgLst>
@@ -813,7 +876,7 @@
           <a:p>
             <a:fld id="{91CB54DF-B86B-46FB-8D6A-C2382CF829E1}" type="datetimeFigureOut">
               <a:rPr lang="en-US" smtClean="0"/>
-              <a:t>5/12/2025</a:t>
+              <a:t>9/1/2025</a:t>
             </a:fld>
             <a:endParaRPr lang="en-US" dirty="0"/>
           </a:p>
@@ -990,7 +1053,7 @@
           <a:p>
             <a:fld id="{A0D39379-ACCC-A94F-B10E-ED7DE222C28C}" type="datetimeFigureOut">
               <a:rPr lang="en-US"/>
-              <a:t>5/12/2025</a:t>
+              <a:t>9/1/2025</a:t>
             </a:fld>
             <a:endParaRPr lang="en-US" dirty="0"/>
           </a:p>
@@ -1255,6 +1318,90 @@
     </a:lvl9pPr>
   </p:notesStyle>
 </p:notesMaster>
+</file>
+
+<file path=ppt/notesSlides/notesSlide1.xml><?xml version="1.0" encoding="utf-8"?>
+<p:notes xmlns:a="http://schemas.openxmlformats.org/drawingml/2006/main" xmlns:r="http://schemas.openxmlformats.org/officeDocument/2006/relationships" xmlns:p="http://schemas.openxmlformats.org/presentationml/2006/main">
+  <p:cSld>
+    <p:spTree>
+      <p:nvGrpSpPr>
+        <p:cNvPr id="1" name=""/>
+        <p:cNvGrpSpPr/>
+        <p:nvPr/>
+      </p:nvGrpSpPr>
+      <p:grpSpPr>
+        <a:xfrm>
+          <a:off x="0" y="0"/>
+          <a:ext cx="0" cy="0"/>
+          <a:chOff x="0" y="0"/>
+          <a:chExt cx="0" cy="0"/>
+        </a:xfrm>
+      </p:grpSpPr>
+      <p:sp>
+        <p:nvSpPr>
+          <p:cNvPr id="2" name="Slide Image Placeholder 1"/>
+          <p:cNvSpPr>
+            <a:spLocks noGrp="1" noRot="1" noChangeAspect="1"/>
+          </p:cNvSpPr>
+          <p:nvPr>
+            <p:ph type="sldImg"/>
+          </p:nvPr>
+        </p:nvSpPr>
+        <p:spPr/>
+      </p:sp>
+      <p:sp>
+        <p:nvSpPr>
+          <p:cNvPr id="3" name="Notes Placeholder 2"/>
+          <p:cNvSpPr>
+            <a:spLocks noGrp="1"/>
+          </p:cNvSpPr>
+          <p:nvPr>
+            <p:ph type="body" idx="1"/>
+          </p:nvPr>
+        </p:nvSpPr>
+        <p:spPr/>
+        <p:txBody>
+          <a:bodyPr/>
+          <a:lstStyle/>
+          <a:p>
+            <a:endParaRPr lang="en-US" dirty="0"/>
+          </a:p>
+        </p:txBody>
+      </p:sp>
+      <p:sp>
+        <p:nvSpPr>
+          <p:cNvPr id="4" name="Slide Number Placeholder 3"/>
+          <p:cNvSpPr>
+            <a:spLocks noGrp="1"/>
+          </p:cNvSpPr>
+          <p:nvPr>
+            <p:ph type="sldNum" sz="quarter" idx="5"/>
+          </p:nvPr>
+        </p:nvSpPr>
+        <p:spPr/>
+        <p:txBody>
+          <a:bodyPr/>
+          <a:lstStyle/>
+          <a:p>
+            <a:fld id="{830CB422-1C33-CB43-B2F9-92730F80FF20}" type="slidenum">
+              <a:rPr lang="en-US" smtClean="0"/>
+              <a:t>11</a:t>
+            </a:fld>
+            <a:endParaRPr lang="en-US" dirty="0"/>
+          </a:p>
+        </p:txBody>
+      </p:sp>
+    </p:spTree>
+    <p:extLst>
+      <p:ext uri="{BB962C8B-B14F-4D97-AF65-F5344CB8AC3E}">
+        <p14:creationId xmlns:p14="http://schemas.microsoft.com/office/powerpoint/2010/main" val="1131604710"/>
+      </p:ext>
+    </p:extLst>
+  </p:cSld>
+  <p:clrMapOvr>
+    <a:masterClrMapping/>
+  </p:clrMapOvr>
+</p:notes>
 </file>
 
 <file path=ppt/slideLayouts/slideLayout1.xml><?xml version="1.0" encoding="utf-8"?>
@@ -24123,6 +24270,140 @@
           </a:p>
         </p:txBody>
       </p:sp>
+      <p:sp>
+        <p:nvSpPr>
+          <p:cNvPr id="5" name="TextBox 4">
+            <a:extLst>
+              <a:ext uri="{FF2B5EF4-FFF2-40B4-BE49-F238E27FC236}">
+                <a16:creationId xmlns:a16="http://schemas.microsoft.com/office/drawing/2014/main" id="{02AC4F6B-5470-E49C-09DF-A88FDA1E4E54}"/>
+              </a:ext>
+            </a:extLst>
+          </p:cNvPr>
+          <p:cNvSpPr txBox="1"/>
+          <p:nvPr/>
+        </p:nvSpPr>
+        <p:spPr>
+          <a:xfrm>
+            <a:off x="1142259" y="5360432"/>
+            <a:ext cx="9703293" cy="442806"/>
+          </a:xfrm>
+          <a:prstGeom prst="rect">
+            <a:avLst/>
+          </a:prstGeom>
+          <a:noFill/>
+        </p:spPr>
+        <p:txBody>
+          <a:bodyPr wrap="square" lIns="0" tIns="0" rIns="0" bIns="0" rtlCol="0">
+            <a:noAutofit/>
+          </a:bodyPr>
+          <a:lstStyle>
+            <a:defPPr>
+              <a:defRPr lang="en-US"/>
+            </a:defPPr>
+            <a:lvl1pPr marL="0" algn="l" defTabSz="914400" rtl="0" eaLnBrk="1" latinLnBrk="0" hangingPunct="1">
+              <a:defRPr sz="1800" kern="1200">
+                <a:solidFill>
+                  <a:schemeClr val="tx1"/>
+                </a:solidFill>
+                <a:latin typeface="+mn-lt"/>
+                <a:ea typeface="+mn-ea"/>
+                <a:cs typeface="+mn-cs"/>
+              </a:defRPr>
+            </a:lvl1pPr>
+            <a:lvl2pPr marL="457200" algn="l" defTabSz="914400" rtl="0" eaLnBrk="1" latinLnBrk="0" hangingPunct="1">
+              <a:defRPr sz="1800" kern="1200">
+                <a:solidFill>
+                  <a:schemeClr val="tx1"/>
+                </a:solidFill>
+                <a:latin typeface="+mn-lt"/>
+                <a:ea typeface="+mn-ea"/>
+                <a:cs typeface="+mn-cs"/>
+              </a:defRPr>
+            </a:lvl2pPr>
+            <a:lvl3pPr marL="914400" algn="l" defTabSz="914400" rtl="0" eaLnBrk="1" latinLnBrk="0" hangingPunct="1">
+              <a:defRPr sz="1800" kern="1200">
+                <a:solidFill>
+                  <a:schemeClr val="tx1"/>
+                </a:solidFill>
+                <a:latin typeface="+mn-lt"/>
+                <a:ea typeface="+mn-ea"/>
+                <a:cs typeface="+mn-cs"/>
+              </a:defRPr>
+            </a:lvl3pPr>
+            <a:lvl4pPr marL="1371600" algn="l" defTabSz="914400" rtl="0" eaLnBrk="1" latinLnBrk="0" hangingPunct="1">
+              <a:defRPr sz="1800" kern="1200">
+                <a:solidFill>
+                  <a:schemeClr val="tx1"/>
+                </a:solidFill>
+                <a:latin typeface="+mn-lt"/>
+                <a:ea typeface="+mn-ea"/>
+                <a:cs typeface="+mn-cs"/>
+              </a:defRPr>
+            </a:lvl4pPr>
+            <a:lvl5pPr marL="1828800" algn="l" defTabSz="914400" rtl="0" eaLnBrk="1" latinLnBrk="0" hangingPunct="1">
+              <a:defRPr sz="1800" kern="1200">
+                <a:solidFill>
+                  <a:schemeClr val="tx1"/>
+                </a:solidFill>
+                <a:latin typeface="+mn-lt"/>
+                <a:ea typeface="+mn-ea"/>
+                <a:cs typeface="+mn-cs"/>
+              </a:defRPr>
+            </a:lvl5pPr>
+            <a:lvl6pPr marL="2286000" algn="l" defTabSz="914400" rtl="0" eaLnBrk="1" latinLnBrk="0" hangingPunct="1">
+              <a:defRPr sz="1800" kern="1200">
+                <a:solidFill>
+                  <a:schemeClr val="tx1"/>
+                </a:solidFill>
+                <a:latin typeface="+mn-lt"/>
+                <a:ea typeface="+mn-ea"/>
+                <a:cs typeface="+mn-cs"/>
+              </a:defRPr>
+            </a:lvl6pPr>
+            <a:lvl7pPr marL="2743200" algn="l" defTabSz="914400" rtl="0" eaLnBrk="1" latinLnBrk="0" hangingPunct="1">
+              <a:defRPr sz="1800" kern="1200">
+                <a:solidFill>
+                  <a:schemeClr val="tx1"/>
+                </a:solidFill>
+                <a:latin typeface="+mn-lt"/>
+                <a:ea typeface="+mn-ea"/>
+                <a:cs typeface="+mn-cs"/>
+              </a:defRPr>
+            </a:lvl7pPr>
+            <a:lvl8pPr marL="3200400" algn="l" defTabSz="914400" rtl="0" eaLnBrk="1" latinLnBrk="0" hangingPunct="1">
+              <a:defRPr sz="1800" kern="1200">
+                <a:solidFill>
+                  <a:schemeClr val="tx1"/>
+                </a:solidFill>
+                <a:latin typeface="+mn-lt"/>
+                <a:ea typeface="+mn-ea"/>
+                <a:cs typeface="+mn-cs"/>
+              </a:defRPr>
+            </a:lvl8pPr>
+            <a:lvl9pPr marL="3657600" algn="l" defTabSz="914400" rtl="0" eaLnBrk="1" latinLnBrk="0" hangingPunct="1">
+              <a:defRPr sz="1800" kern="1200">
+                <a:solidFill>
+                  <a:schemeClr val="tx1"/>
+                </a:solidFill>
+                <a:latin typeface="+mn-lt"/>
+                <a:ea typeface="+mn-ea"/>
+                <a:cs typeface="+mn-cs"/>
+              </a:defRPr>
+            </a:lvl9pPr>
+          </a:lstStyle>
+          <a:p>
+            <a:pPr>
+              <a:spcAft>
+                <a:spcPts val="800"/>
+              </a:spcAft>
+            </a:pPr>
+            <a:r>
+              <a:rPr lang="en-US" sz="1200" dirty="0"/>
+              <a:t>Average CPU Use% is calculated against enabled capacity under COD. For instance, with 54% of total CPU enabled, utilization can go as high as 100% of the enabled capacity</a:t>
+            </a:r>
+          </a:p>
+        </p:txBody>
+      </p:sp>
     </p:spTree>
     <p:extLst>
       <p:ext uri="{BB962C8B-B14F-4D97-AF65-F5344CB8AC3E}">
@@ -24565,6 +24846,140 @@
                 <a:schemeClr val="tx1"/>
               </a:solidFill>
             </a:endParaRPr>
+          </a:p>
+        </p:txBody>
+      </p:sp>
+      <p:sp>
+        <p:nvSpPr>
+          <p:cNvPr id="5" name="TextBox 4">
+            <a:extLst>
+              <a:ext uri="{FF2B5EF4-FFF2-40B4-BE49-F238E27FC236}">
+                <a16:creationId xmlns:a16="http://schemas.microsoft.com/office/drawing/2014/main" id="{F779FA3A-30C7-F602-84A9-490AF1D441F5}"/>
+              </a:ext>
+            </a:extLst>
+          </p:cNvPr>
+          <p:cNvSpPr txBox="1"/>
+          <p:nvPr/>
+        </p:nvSpPr>
+        <p:spPr>
+          <a:xfrm>
+            <a:off x="1143000" y="5358384"/>
+            <a:ext cx="9703293" cy="442806"/>
+          </a:xfrm>
+          <a:prstGeom prst="rect">
+            <a:avLst/>
+          </a:prstGeom>
+          <a:noFill/>
+        </p:spPr>
+        <p:txBody>
+          <a:bodyPr wrap="square" lIns="0" tIns="0" rIns="0" bIns="0" rtlCol="0">
+            <a:noAutofit/>
+          </a:bodyPr>
+          <a:lstStyle>
+            <a:defPPr>
+              <a:defRPr lang="en-US"/>
+            </a:defPPr>
+            <a:lvl1pPr marL="0" algn="l" defTabSz="914400" rtl="0" eaLnBrk="1" latinLnBrk="0" hangingPunct="1">
+              <a:defRPr sz="1800" kern="1200">
+                <a:solidFill>
+                  <a:schemeClr val="tx1"/>
+                </a:solidFill>
+                <a:latin typeface="+mn-lt"/>
+                <a:ea typeface="+mn-ea"/>
+                <a:cs typeface="+mn-cs"/>
+              </a:defRPr>
+            </a:lvl1pPr>
+            <a:lvl2pPr marL="457200" algn="l" defTabSz="914400" rtl="0" eaLnBrk="1" latinLnBrk="0" hangingPunct="1">
+              <a:defRPr sz="1800" kern="1200">
+                <a:solidFill>
+                  <a:schemeClr val="tx1"/>
+                </a:solidFill>
+                <a:latin typeface="+mn-lt"/>
+                <a:ea typeface="+mn-ea"/>
+                <a:cs typeface="+mn-cs"/>
+              </a:defRPr>
+            </a:lvl2pPr>
+            <a:lvl3pPr marL="914400" algn="l" defTabSz="914400" rtl="0" eaLnBrk="1" latinLnBrk="0" hangingPunct="1">
+              <a:defRPr sz="1800" kern="1200">
+                <a:solidFill>
+                  <a:schemeClr val="tx1"/>
+                </a:solidFill>
+                <a:latin typeface="+mn-lt"/>
+                <a:ea typeface="+mn-ea"/>
+                <a:cs typeface="+mn-cs"/>
+              </a:defRPr>
+            </a:lvl3pPr>
+            <a:lvl4pPr marL="1371600" algn="l" defTabSz="914400" rtl="0" eaLnBrk="1" latinLnBrk="0" hangingPunct="1">
+              <a:defRPr sz="1800" kern="1200">
+                <a:solidFill>
+                  <a:schemeClr val="tx1"/>
+                </a:solidFill>
+                <a:latin typeface="+mn-lt"/>
+                <a:ea typeface="+mn-ea"/>
+                <a:cs typeface="+mn-cs"/>
+              </a:defRPr>
+            </a:lvl4pPr>
+            <a:lvl5pPr marL="1828800" algn="l" defTabSz="914400" rtl="0" eaLnBrk="1" latinLnBrk="0" hangingPunct="1">
+              <a:defRPr sz="1800" kern="1200">
+                <a:solidFill>
+                  <a:schemeClr val="tx1"/>
+                </a:solidFill>
+                <a:latin typeface="+mn-lt"/>
+                <a:ea typeface="+mn-ea"/>
+                <a:cs typeface="+mn-cs"/>
+              </a:defRPr>
+            </a:lvl5pPr>
+            <a:lvl6pPr marL="2286000" algn="l" defTabSz="914400" rtl="0" eaLnBrk="1" latinLnBrk="0" hangingPunct="1">
+              <a:defRPr sz="1800" kern="1200">
+                <a:solidFill>
+                  <a:schemeClr val="tx1"/>
+                </a:solidFill>
+                <a:latin typeface="+mn-lt"/>
+                <a:ea typeface="+mn-ea"/>
+                <a:cs typeface="+mn-cs"/>
+              </a:defRPr>
+            </a:lvl6pPr>
+            <a:lvl7pPr marL="2743200" algn="l" defTabSz="914400" rtl="0" eaLnBrk="1" latinLnBrk="0" hangingPunct="1">
+              <a:defRPr sz="1800" kern="1200">
+                <a:solidFill>
+                  <a:schemeClr val="tx1"/>
+                </a:solidFill>
+                <a:latin typeface="+mn-lt"/>
+                <a:ea typeface="+mn-ea"/>
+                <a:cs typeface="+mn-cs"/>
+              </a:defRPr>
+            </a:lvl7pPr>
+            <a:lvl8pPr marL="3200400" algn="l" defTabSz="914400" rtl="0" eaLnBrk="1" latinLnBrk="0" hangingPunct="1">
+              <a:defRPr sz="1800" kern="1200">
+                <a:solidFill>
+                  <a:schemeClr val="tx1"/>
+                </a:solidFill>
+                <a:latin typeface="+mn-lt"/>
+                <a:ea typeface="+mn-ea"/>
+                <a:cs typeface="+mn-cs"/>
+              </a:defRPr>
+            </a:lvl8pPr>
+            <a:lvl9pPr marL="3657600" algn="l" defTabSz="914400" rtl="0" eaLnBrk="1" latinLnBrk="0" hangingPunct="1">
+              <a:defRPr sz="1800" kern="1200">
+                <a:solidFill>
+                  <a:schemeClr val="tx1"/>
+                </a:solidFill>
+                <a:latin typeface="+mn-lt"/>
+                <a:ea typeface="+mn-ea"/>
+                <a:cs typeface="+mn-cs"/>
+              </a:defRPr>
+            </a:lvl9pPr>
+          </a:lstStyle>
+          <a:p>
+            <a:pPr>
+              <a:spcAft>
+                <a:spcPts val="800"/>
+              </a:spcAft>
+            </a:pPr>
+            <a:r>
+              <a:rPr lang="en-US" sz="1200" dirty="0"/>
+              <a:t>Peak CPU Use% is calculated against enabled capacity under COD. For instance, with 54% of total CPU enabled, utilization can go as high as 100% of the enabled capacity</a:t>
+            </a:r>
           </a:p>
         </p:txBody>
       </p:sp>

</xml_diff>